<commit_message>
Updates to functional tests, in-line with new design plan. New functional tests are largely skeletons, for completion as new features are added
</commit_message>
<xml_diff>
--- a/documents/Design.pptx
+++ b/documents/Design.pptx
@@ -11,17 +11,22 @@
     <p:sldId id="262" r:id="rId5"/>
     <p:sldId id="258" r:id="rId6"/>
     <p:sldId id="259" r:id="rId7"/>
-    <p:sldId id="260" r:id="rId8"/>
+    <p:sldId id="273" r:id="rId8"/>
     <p:sldId id="263" r:id="rId9"/>
     <p:sldId id="264" r:id="rId10"/>
-    <p:sldId id="265" r:id="rId11"/>
-    <p:sldId id="266" r:id="rId12"/>
-    <p:sldId id="267" r:id="rId13"/>
-    <p:sldId id="268" r:id="rId14"/>
-    <p:sldId id="269" r:id="rId15"/>
-    <p:sldId id="270" r:id="rId16"/>
-    <p:sldId id="271" r:id="rId17"/>
-    <p:sldId id="272" r:id="rId18"/>
+    <p:sldId id="276" r:id="rId11"/>
+    <p:sldId id="277" r:id="rId12"/>
+    <p:sldId id="265" r:id="rId13"/>
+    <p:sldId id="266" r:id="rId14"/>
+    <p:sldId id="279" r:id="rId15"/>
+    <p:sldId id="267" r:id="rId16"/>
+    <p:sldId id="268" r:id="rId17"/>
+    <p:sldId id="269" r:id="rId18"/>
+    <p:sldId id="270" r:id="rId19"/>
+    <p:sldId id="271" r:id="rId20"/>
+    <p:sldId id="274" r:id="rId21"/>
+    <p:sldId id="272" r:id="rId22"/>
+    <p:sldId id="275" r:id="rId23"/>
   </p:sldIdLst>
   <p:sldSz cx="12192000" cy="6858000"/>
   <p:notesSz cx="6858000" cy="9144000"/>
@@ -140,6 +145,217 @@
 </p:cmAuthorLst>
 </file>
 
+<file path=ppt/revisionInfo.xml><?xml version="1.0" encoding="utf-8"?>
+<p1510:revInfo xmlns:a="http://schemas.openxmlformats.org/drawingml/2006/main" xmlns:r="http://schemas.openxmlformats.org/officeDocument/2006/relationships" xmlns:p1510="http://schemas.microsoft.com/office/powerpoint/2015/10/main">
+  <p1510:revLst>
+    <p1510:client id="{4DFDA945-E2B5-4F7B-AAFF-AF16EDADDE14}" v="13" dt="2020-03-18T09:28:14.089"/>
+  </p1510:revLst>
+</p1510:revInfo>
+</file>
+
+<file path=ppt/changesInfos/changesInfo1.xml><?xml version="1.0" encoding="utf-8"?>
+<pc:chgInfo xmlns:a="http://schemas.openxmlformats.org/drawingml/2006/main" xmlns:r="http://schemas.openxmlformats.org/officeDocument/2006/relationships" xmlns:ac="http://schemas.microsoft.com/office/drawing/2013/main/command" xmlns:pc="http://schemas.microsoft.com/office/powerpoint/2013/main/command">
+  <pc:docChgLst>
+    <pc:chgData name="Alasdair Vincent" userId="f16fae25c47a012e" providerId="LiveId" clId="{4DFDA945-E2B5-4F7B-AAFF-AF16EDADDE14}"/>
+    <pc:docChg chg="custSel addSld delSld modSld sldOrd">
+      <pc:chgData name="Alasdair Vincent" userId="f16fae25c47a012e" providerId="LiveId" clId="{4DFDA945-E2B5-4F7B-AAFF-AF16EDADDE14}" dt="2020-03-18T09:28:25.588" v="213"/>
+      <pc:docMkLst>
+        <pc:docMk/>
+      </pc:docMkLst>
+      <pc:sldChg chg="modSp">
+        <pc:chgData name="Alasdair Vincent" userId="f16fae25c47a012e" providerId="LiveId" clId="{4DFDA945-E2B5-4F7B-AAFF-AF16EDADDE14}" dt="2020-03-18T08:21:34.528" v="18" actId="20577"/>
+        <pc:sldMkLst>
+          <pc:docMk/>
+          <pc:sldMk cId="530173661" sldId="259"/>
+        </pc:sldMkLst>
+        <pc:spChg chg="mod">
+          <ac:chgData name="Alasdair Vincent" userId="f16fae25c47a012e" providerId="LiveId" clId="{4DFDA945-E2B5-4F7B-AAFF-AF16EDADDE14}" dt="2020-03-18T08:21:34.528" v="18" actId="20577"/>
+          <ac:spMkLst>
+            <pc:docMk/>
+            <pc:sldMk cId="530173661" sldId="259"/>
+            <ac:spMk id="4" creationId="{4A96EE38-2796-407B-BDBB-B3CEF18EBBEC}"/>
+          </ac:spMkLst>
+        </pc:spChg>
+      </pc:sldChg>
+      <pc:sldChg chg="del">
+        <pc:chgData name="Alasdair Vincent" userId="f16fae25c47a012e" providerId="LiveId" clId="{4DFDA945-E2B5-4F7B-AAFF-AF16EDADDE14}" dt="2020-03-18T08:22:00.099" v="20" actId="47"/>
+        <pc:sldMkLst>
+          <pc:docMk/>
+          <pc:sldMk cId="2846055649" sldId="260"/>
+        </pc:sldMkLst>
+      </pc:sldChg>
+      <pc:sldChg chg="modSp">
+        <pc:chgData name="Alasdair Vincent" userId="f16fae25c47a012e" providerId="LiveId" clId="{4DFDA945-E2B5-4F7B-AAFF-AF16EDADDE14}" dt="2020-03-18T08:35:46.134" v="208" actId="1076"/>
+        <pc:sldMkLst>
+          <pc:docMk/>
+          <pc:sldMk cId="4045679085" sldId="266"/>
+        </pc:sldMkLst>
+        <pc:spChg chg="mod">
+          <ac:chgData name="Alasdair Vincent" userId="f16fae25c47a012e" providerId="LiveId" clId="{4DFDA945-E2B5-4F7B-AAFF-AF16EDADDE14}" dt="2020-03-18T08:35:46.134" v="208" actId="1076"/>
+          <ac:spMkLst>
+            <pc:docMk/>
+            <pc:sldMk cId="4045679085" sldId="266"/>
+            <ac:spMk id="35" creationId="{4560DB08-261E-4807-AD22-EE490FB943F7}"/>
+          </ac:spMkLst>
+        </pc:spChg>
+        <pc:spChg chg="mod">
+          <ac:chgData name="Alasdair Vincent" userId="f16fae25c47a012e" providerId="LiveId" clId="{4DFDA945-E2B5-4F7B-AAFF-AF16EDADDE14}" dt="2020-03-18T08:13:12.138" v="3" actId="20577"/>
+          <ac:spMkLst>
+            <pc:docMk/>
+            <pc:sldMk cId="4045679085" sldId="266"/>
+            <ac:spMk id="36" creationId="{B589E5E6-C441-44DB-8ED4-D16C34A04601}"/>
+          </ac:spMkLst>
+        </pc:spChg>
+        <pc:spChg chg="mod">
+          <ac:chgData name="Alasdair Vincent" userId="f16fae25c47a012e" providerId="LiveId" clId="{4DFDA945-E2B5-4F7B-AAFF-AF16EDADDE14}" dt="2020-03-18T08:29:54.976" v="44" actId="6549"/>
+          <ac:spMkLst>
+            <pc:docMk/>
+            <pc:sldMk cId="4045679085" sldId="266"/>
+            <ac:spMk id="45" creationId="{1EDE913D-829A-48A3-9DEE-F30FFCFF262A}"/>
+          </ac:spMkLst>
+        </pc:spChg>
+        <pc:spChg chg="mod">
+          <ac:chgData name="Alasdair Vincent" userId="f16fae25c47a012e" providerId="LiveId" clId="{4DFDA945-E2B5-4F7B-AAFF-AF16EDADDE14}" dt="2020-03-18T08:35:46.134" v="208" actId="1076"/>
+          <ac:spMkLst>
+            <pc:docMk/>
+            <pc:sldMk cId="4045679085" sldId="266"/>
+            <ac:spMk id="49" creationId="{A2B63347-3D06-4C06-BF60-723A9E9247F1}"/>
+          </ac:spMkLst>
+        </pc:spChg>
+        <pc:spChg chg="mod">
+          <ac:chgData name="Alasdair Vincent" userId="f16fae25c47a012e" providerId="LiveId" clId="{4DFDA945-E2B5-4F7B-AAFF-AF16EDADDE14}" dt="2020-03-18T08:35:28.430" v="192" actId="1037"/>
+          <ac:spMkLst>
+            <pc:docMk/>
+            <pc:sldMk cId="4045679085" sldId="266"/>
+            <ac:spMk id="51" creationId="{B4DFFC09-9EBC-4659-8DE3-1DCA90530F50}"/>
+          </ac:spMkLst>
+        </pc:spChg>
+        <pc:grpChg chg="mod">
+          <ac:chgData name="Alasdair Vincent" userId="f16fae25c47a012e" providerId="LiveId" clId="{4DFDA945-E2B5-4F7B-AAFF-AF16EDADDE14}" dt="2020-03-18T08:35:28.430" v="192" actId="1037"/>
+          <ac:grpSpMkLst>
+            <pc:docMk/>
+            <pc:sldMk cId="4045679085" sldId="266"/>
+            <ac:grpSpMk id="44" creationId="{06645BF3-C5EB-432D-B881-A2D8E04FAB9C}"/>
+          </ac:grpSpMkLst>
+        </pc:grpChg>
+      </pc:sldChg>
+      <pc:sldChg chg="modSp">
+        <pc:chgData name="Alasdair Vincent" userId="f16fae25c47a012e" providerId="LiveId" clId="{4DFDA945-E2B5-4F7B-AAFF-AF16EDADDE14}" dt="2020-03-18T08:34:15.440" v="73" actId="1038"/>
+        <pc:sldMkLst>
+          <pc:docMk/>
+          <pc:sldMk cId="1704796993" sldId="268"/>
+        </pc:sldMkLst>
+        <pc:spChg chg="mod">
+          <ac:chgData name="Alasdair Vincent" userId="f16fae25c47a012e" providerId="LiveId" clId="{4DFDA945-E2B5-4F7B-AAFF-AF16EDADDE14}" dt="2020-03-18T08:34:08.270" v="52" actId="14100"/>
+          <ac:spMkLst>
+            <pc:docMk/>
+            <pc:sldMk cId="1704796993" sldId="268"/>
+            <ac:spMk id="34" creationId="{D21C5CF6-DFA9-4676-9E53-001243547971}"/>
+          </ac:spMkLst>
+        </pc:spChg>
+        <pc:spChg chg="mod">
+          <ac:chgData name="Alasdair Vincent" userId="f16fae25c47a012e" providerId="LiveId" clId="{4DFDA945-E2B5-4F7B-AAFF-AF16EDADDE14}" dt="2020-03-18T08:13:17.979" v="7" actId="20577"/>
+          <ac:spMkLst>
+            <pc:docMk/>
+            <pc:sldMk cId="1704796993" sldId="268"/>
+            <ac:spMk id="36" creationId="{B589E5E6-C441-44DB-8ED4-D16C34A04601}"/>
+          </ac:spMkLst>
+        </pc:spChg>
+        <pc:spChg chg="mod">
+          <ac:chgData name="Alasdair Vincent" userId="f16fae25c47a012e" providerId="LiveId" clId="{4DFDA945-E2B5-4F7B-AAFF-AF16EDADDE14}" dt="2020-03-18T08:34:15.440" v="73" actId="1038"/>
+          <ac:spMkLst>
+            <pc:docMk/>
+            <pc:sldMk cId="1704796993" sldId="268"/>
+            <ac:spMk id="48" creationId="{A8123991-DFC5-456F-81EF-E1A12EF639BF}"/>
+          </ac:spMkLst>
+        </pc:spChg>
+      </pc:sldChg>
+      <pc:sldChg chg="modSp">
+        <pc:chgData name="Alasdair Vincent" userId="f16fae25c47a012e" providerId="LiveId" clId="{4DFDA945-E2B5-4F7B-AAFF-AF16EDADDE14}" dt="2020-03-18T08:34:48.105" v="111" actId="1037"/>
+        <pc:sldMkLst>
+          <pc:docMk/>
+          <pc:sldMk cId="1135085949" sldId="270"/>
+        </pc:sldMkLst>
+        <pc:spChg chg="mod">
+          <ac:chgData name="Alasdair Vincent" userId="f16fae25c47a012e" providerId="LiveId" clId="{4DFDA945-E2B5-4F7B-AAFF-AF16EDADDE14}" dt="2020-03-18T08:34:43.485" v="75" actId="14100"/>
+          <ac:spMkLst>
+            <pc:docMk/>
+            <pc:sldMk cId="1135085949" sldId="270"/>
+            <ac:spMk id="34" creationId="{D21C5CF6-DFA9-4676-9E53-001243547971}"/>
+          </ac:spMkLst>
+        </pc:spChg>
+        <pc:spChg chg="mod">
+          <ac:chgData name="Alasdair Vincent" userId="f16fae25c47a012e" providerId="LiveId" clId="{4DFDA945-E2B5-4F7B-AAFF-AF16EDADDE14}" dt="2020-03-18T08:13:23.353" v="11" actId="20577"/>
+          <ac:spMkLst>
+            <pc:docMk/>
+            <pc:sldMk cId="1135085949" sldId="270"/>
+            <ac:spMk id="36" creationId="{B589E5E6-C441-44DB-8ED4-D16C34A04601}"/>
+          </ac:spMkLst>
+        </pc:spChg>
+        <pc:spChg chg="mod">
+          <ac:chgData name="Alasdair Vincent" userId="f16fae25c47a012e" providerId="LiveId" clId="{4DFDA945-E2B5-4F7B-AAFF-AF16EDADDE14}" dt="2020-03-18T08:34:48.105" v="111" actId="1037"/>
+          <ac:spMkLst>
+            <pc:docMk/>
+            <pc:sldMk cId="1135085949" sldId="270"/>
+            <ac:spMk id="48" creationId="{A8123991-DFC5-456F-81EF-E1A12EF639BF}"/>
+          </ac:spMkLst>
+        </pc:spChg>
+      </pc:sldChg>
+      <pc:sldChg chg="add">
+        <pc:chgData name="Alasdair Vincent" userId="f16fae25c47a012e" providerId="LiveId" clId="{4DFDA945-E2B5-4F7B-AAFF-AF16EDADDE14}" dt="2020-03-18T08:21:57.404" v="19"/>
+        <pc:sldMkLst>
+          <pc:docMk/>
+          <pc:sldMk cId="3925559518" sldId="273"/>
+        </pc:sldMkLst>
+      </pc:sldChg>
+      <pc:sldChg chg="add ord">
+        <pc:chgData name="Alasdair Vincent" userId="f16fae25c47a012e" providerId="LiveId" clId="{4DFDA945-E2B5-4F7B-AAFF-AF16EDADDE14}" dt="2020-03-18T09:28:22.111" v="211"/>
+        <pc:sldMkLst>
+          <pc:docMk/>
+          <pc:sldMk cId="873542540" sldId="274"/>
+        </pc:sldMkLst>
+      </pc:sldChg>
+      <pc:sldChg chg="add ord">
+        <pc:chgData name="Alasdair Vincent" userId="f16fae25c47a012e" providerId="LiveId" clId="{4DFDA945-E2B5-4F7B-AAFF-AF16EDADDE14}" dt="2020-03-18T09:28:25.588" v="213"/>
+        <pc:sldMkLst>
+          <pc:docMk/>
+          <pc:sldMk cId="2934466975" sldId="275"/>
+        </pc:sldMkLst>
+      </pc:sldChg>
+      <pc:sldChg chg="modSp add">
+        <pc:chgData name="Alasdair Vincent" userId="f16fae25c47a012e" providerId="LiveId" clId="{4DFDA945-E2B5-4F7B-AAFF-AF16EDADDE14}" dt="2020-03-18T08:25:41.764" v="39" actId="20577"/>
+        <pc:sldMkLst>
+          <pc:docMk/>
+          <pc:sldMk cId="1901133113" sldId="276"/>
+        </pc:sldMkLst>
+        <pc:spChg chg="mod">
+          <ac:chgData name="Alasdair Vincent" userId="f16fae25c47a012e" providerId="LiveId" clId="{4DFDA945-E2B5-4F7B-AAFF-AF16EDADDE14}" dt="2020-03-18T08:25:41.764" v="39" actId="20577"/>
+          <ac:spMkLst>
+            <pc:docMk/>
+            <pc:sldMk cId="1901133113" sldId="276"/>
+            <ac:spMk id="4" creationId="{00000000-0000-0000-0000-000000000000}"/>
+          </ac:spMkLst>
+        </pc:spChg>
+      </pc:sldChg>
+      <pc:sldChg chg="add">
+        <pc:chgData name="Alasdair Vincent" userId="f16fae25c47a012e" providerId="LiveId" clId="{4DFDA945-E2B5-4F7B-AAFF-AF16EDADDE14}" dt="2020-03-18T08:25:51.314" v="40"/>
+        <pc:sldMkLst>
+          <pc:docMk/>
+          <pc:sldMk cId="3846574755" sldId="277"/>
+        </pc:sldMkLst>
+      </pc:sldChg>
+      <pc:sldChg chg="add">
+        <pc:chgData name="Alasdair Vincent" userId="f16fae25c47a012e" providerId="LiveId" clId="{4DFDA945-E2B5-4F7B-AAFF-AF16EDADDE14}" dt="2020-03-18T08:29:21.441" v="41"/>
+        <pc:sldMkLst>
+          <pc:docMk/>
+          <pc:sldMk cId="484274913" sldId="279"/>
+        </pc:sldMkLst>
+      </pc:sldChg>
+    </pc:docChg>
+  </pc:docChgLst>
+</pc:chgInfo>
+</file>
+
 <file path=ppt/comments/comment1.xml><?xml version="1.0" encoding="utf-8"?>
 <p:cmLst xmlns:a="http://schemas.openxmlformats.org/drawingml/2006/main" xmlns:r="http://schemas.openxmlformats.org/officeDocument/2006/relationships" xmlns:p="http://schemas.openxmlformats.org/presentationml/2006/main">
   <p:cm authorId="1" dt="2020-03-03T16:27:33.665" idx="1">
@@ -318,7 +534,7 @@
           <a:p>
             <a:fld id="{FD45BEEB-65D0-4EF7-B3AA-8A98DD3CB55B}" type="datetimeFigureOut">
               <a:rPr lang="en-GB" smtClean="0"/>
-              <a:t>10/03/2020</a:t>
+              <a:t>18/03/2020</a:t>
             </a:fld>
             <a:endParaRPr lang="en-GB"/>
           </a:p>
@@ -518,7 +734,7 @@
           <a:p>
             <a:fld id="{FD45BEEB-65D0-4EF7-B3AA-8A98DD3CB55B}" type="datetimeFigureOut">
               <a:rPr lang="en-GB" smtClean="0"/>
-              <a:t>10/03/2020</a:t>
+              <a:t>18/03/2020</a:t>
             </a:fld>
             <a:endParaRPr lang="en-GB"/>
           </a:p>
@@ -728,7 +944,7 @@
           <a:p>
             <a:fld id="{FD45BEEB-65D0-4EF7-B3AA-8A98DD3CB55B}" type="datetimeFigureOut">
               <a:rPr lang="en-GB" smtClean="0"/>
-              <a:t>10/03/2020</a:t>
+              <a:t>18/03/2020</a:t>
             </a:fld>
             <a:endParaRPr lang="en-GB"/>
           </a:p>
@@ -928,7 +1144,7 @@
           <a:p>
             <a:fld id="{FD45BEEB-65D0-4EF7-B3AA-8A98DD3CB55B}" type="datetimeFigureOut">
               <a:rPr lang="en-GB" smtClean="0"/>
-              <a:t>10/03/2020</a:t>
+              <a:t>18/03/2020</a:t>
             </a:fld>
             <a:endParaRPr lang="en-GB"/>
           </a:p>
@@ -1204,7 +1420,7 @@
           <a:p>
             <a:fld id="{FD45BEEB-65D0-4EF7-B3AA-8A98DD3CB55B}" type="datetimeFigureOut">
               <a:rPr lang="en-GB" smtClean="0"/>
-              <a:t>10/03/2020</a:t>
+              <a:t>18/03/2020</a:t>
             </a:fld>
             <a:endParaRPr lang="en-GB"/>
           </a:p>
@@ -1472,7 +1688,7 @@
           <a:p>
             <a:fld id="{FD45BEEB-65D0-4EF7-B3AA-8A98DD3CB55B}" type="datetimeFigureOut">
               <a:rPr lang="en-GB" smtClean="0"/>
-              <a:t>10/03/2020</a:t>
+              <a:t>18/03/2020</a:t>
             </a:fld>
             <a:endParaRPr lang="en-GB"/>
           </a:p>
@@ -1887,7 +2103,7 @@
           <a:p>
             <a:fld id="{FD45BEEB-65D0-4EF7-B3AA-8A98DD3CB55B}" type="datetimeFigureOut">
               <a:rPr lang="en-GB" smtClean="0"/>
-              <a:t>10/03/2020</a:t>
+              <a:t>18/03/2020</a:t>
             </a:fld>
             <a:endParaRPr lang="en-GB"/>
           </a:p>
@@ -2029,7 +2245,7 @@
           <a:p>
             <a:fld id="{FD45BEEB-65D0-4EF7-B3AA-8A98DD3CB55B}" type="datetimeFigureOut">
               <a:rPr lang="en-GB" smtClean="0"/>
-              <a:t>10/03/2020</a:t>
+              <a:t>18/03/2020</a:t>
             </a:fld>
             <a:endParaRPr lang="en-GB"/>
           </a:p>
@@ -2142,7 +2358,7 @@
           <a:p>
             <a:fld id="{FD45BEEB-65D0-4EF7-B3AA-8A98DD3CB55B}" type="datetimeFigureOut">
               <a:rPr lang="en-GB" smtClean="0"/>
-              <a:t>10/03/2020</a:t>
+              <a:t>18/03/2020</a:t>
             </a:fld>
             <a:endParaRPr lang="en-GB"/>
           </a:p>
@@ -2455,7 +2671,7 @@
           <a:p>
             <a:fld id="{FD45BEEB-65D0-4EF7-B3AA-8A98DD3CB55B}" type="datetimeFigureOut">
               <a:rPr lang="en-GB" smtClean="0"/>
-              <a:t>10/03/2020</a:t>
+              <a:t>18/03/2020</a:t>
             </a:fld>
             <a:endParaRPr lang="en-GB"/>
           </a:p>
@@ -2744,7 +2960,7 @@
           <a:p>
             <a:fld id="{FD45BEEB-65D0-4EF7-B3AA-8A98DD3CB55B}" type="datetimeFigureOut">
               <a:rPr lang="en-GB" smtClean="0"/>
-              <a:t>10/03/2020</a:t>
+              <a:t>18/03/2020</a:t>
             </a:fld>
             <a:endParaRPr lang="en-GB"/>
           </a:p>
@@ -2987,7 +3203,7 @@
           <a:p>
             <a:fld id="{FD45BEEB-65D0-4EF7-B3AA-8A98DD3CB55B}" type="datetimeFigureOut">
               <a:rPr lang="en-GB" smtClean="0"/>
-              <a:t>10/03/2020</a:t>
+              <a:t>18/03/2020</a:t>
             </a:fld>
             <a:endParaRPr lang="en-GB"/>
           </a:p>
@@ -3492,6 +3708,153 @@
       </p:grpSpPr>
       <p:sp>
         <p:nvSpPr>
+          <p:cNvPr id="4" name="Title 3"/>
+          <p:cNvSpPr>
+            <a:spLocks noGrp="1"/>
+          </p:cNvSpPr>
+          <p:nvPr>
+            <p:ph type="title"/>
+          </p:nvPr>
+        </p:nvSpPr>
+        <p:spPr/>
+        <p:txBody>
+          <a:bodyPr/>
+          <a:lstStyle/>
+          <a:p>
+            <a:r>
+              <a:rPr lang="en-GB" dirty="0"/>
+              <a:t>Pages and Wireframes</a:t>
+            </a:r>
+          </a:p>
+        </p:txBody>
+      </p:sp>
+      <p:sp>
+        <p:nvSpPr>
+          <p:cNvPr id="5" name="Text Placeholder 4"/>
+          <p:cNvSpPr>
+            <a:spLocks noGrp="1"/>
+          </p:cNvSpPr>
+          <p:nvPr>
+            <p:ph type="body" idx="1"/>
+          </p:nvPr>
+        </p:nvSpPr>
+        <p:spPr/>
+        <p:txBody>
+          <a:bodyPr/>
+          <a:lstStyle/>
+          <a:p>
+            <a:endParaRPr lang="en-GB" dirty="0"/>
+          </a:p>
+        </p:txBody>
+      </p:sp>
+    </p:spTree>
+    <p:extLst>
+      <p:ext uri="{BB962C8B-B14F-4D97-AF65-F5344CB8AC3E}">
+        <p14:creationId xmlns:p14="http://schemas.microsoft.com/office/powerpoint/2010/main" val="1901133113"/>
+      </p:ext>
+    </p:extLst>
+  </p:cSld>
+  <p:clrMapOvr>
+    <a:masterClrMapping/>
+  </p:clrMapOvr>
+</p:sld>
+</file>
+
+<file path=ppt/slides/slide11.xml><?xml version="1.0" encoding="utf-8"?>
+<p:sld xmlns:a="http://schemas.openxmlformats.org/drawingml/2006/main" xmlns:r="http://schemas.openxmlformats.org/officeDocument/2006/relationships" xmlns:p="http://schemas.openxmlformats.org/presentationml/2006/main">
+  <p:cSld>
+    <p:spTree>
+      <p:nvGrpSpPr>
+        <p:cNvPr id="1" name=""/>
+        <p:cNvGrpSpPr/>
+        <p:nvPr/>
+      </p:nvGrpSpPr>
+      <p:grpSpPr>
+        <a:xfrm>
+          <a:off x="0" y="0"/>
+          <a:ext cx="0" cy="0"/>
+          <a:chOff x="0" y="0"/>
+          <a:chExt cx="0" cy="0"/>
+        </a:xfrm>
+      </p:grpSpPr>
+      <p:sp>
+        <p:nvSpPr>
+          <p:cNvPr id="4" name="Title 3"/>
+          <p:cNvSpPr>
+            <a:spLocks noGrp="1"/>
+          </p:cNvSpPr>
+          <p:nvPr>
+            <p:ph type="title"/>
+          </p:nvPr>
+        </p:nvSpPr>
+        <p:spPr/>
+        <p:txBody>
+          <a:bodyPr>
+            <a:normAutofit/>
+          </a:bodyPr>
+          <a:lstStyle/>
+          <a:p>
+            <a:r>
+              <a:rPr lang="en-GB" sz="3000" dirty="0"/>
+              <a:t>Home Page</a:t>
+            </a:r>
+          </a:p>
+        </p:txBody>
+      </p:sp>
+      <p:sp>
+        <p:nvSpPr>
+          <p:cNvPr id="5" name="Text Placeholder 4"/>
+          <p:cNvSpPr>
+            <a:spLocks noGrp="1"/>
+          </p:cNvSpPr>
+          <p:nvPr>
+            <p:ph type="body" idx="1"/>
+          </p:nvPr>
+        </p:nvSpPr>
+        <p:spPr/>
+        <p:txBody>
+          <a:bodyPr/>
+          <a:lstStyle/>
+          <a:p>
+            <a:r>
+              <a:rPr lang="en-GB" dirty="0"/>
+              <a:t>Overview, wireframe, div structure, tests</a:t>
+            </a:r>
+          </a:p>
+        </p:txBody>
+      </p:sp>
+    </p:spTree>
+    <p:extLst>
+      <p:ext uri="{BB962C8B-B14F-4D97-AF65-F5344CB8AC3E}">
+        <p14:creationId xmlns:p14="http://schemas.microsoft.com/office/powerpoint/2010/main" val="3846574755"/>
+      </p:ext>
+    </p:extLst>
+  </p:cSld>
+  <p:clrMapOvr>
+    <a:masterClrMapping/>
+  </p:clrMapOvr>
+</p:sld>
+</file>
+
+<file path=ppt/slides/slide12.xml><?xml version="1.0" encoding="utf-8"?>
+<p:sld xmlns:a="http://schemas.openxmlformats.org/drawingml/2006/main" xmlns:r="http://schemas.openxmlformats.org/officeDocument/2006/relationships" xmlns:p="http://schemas.openxmlformats.org/presentationml/2006/main">
+  <p:cSld>
+    <p:spTree>
+      <p:nvGrpSpPr>
+        <p:cNvPr id="1" name=""/>
+        <p:cNvGrpSpPr/>
+        <p:nvPr/>
+      </p:nvGrpSpPr>
+      <p:grpSpPr>
+        <a:xfrm>
+          <a:off x="0" y="0"/>
+          <a:ext cx="0" cy="0"/>
+          <a:chOff x="0" y="0"/>
+          <a:chExt cx="0" cy="0"/>
+        </a:xfrm>
+      </p:grpSpPr>
+      <p:sp>
+        <p:nvSpPr>
           <p:cNvPr id="2" name="Title 1">
             <a:extLst>
               <a:ext uri="{FF2B5EF4-FFF2-40B4-BE49-F238E27FC236}">
@@ -3641,7 +4004,7 @@
 </p:sld>
 </file>
 
-<file path=ppt/slides/slide11.xml><?xml version="1.0" encoding="utf-8"?>
+<file path=ppt/slides/slide13.xml><?xml version="1.0" encoding="utf-8"?>
 <p:sld xmlns:a="http://schemas.openxmlformats.org/drawingml/2006/main" xmlns:r="http://schemas.openxmlformats.org/officeDocument/2006/relationships" xmlns:p="http://schemas.openxmlformats.org/presentationml/2006/main">
   <p:cSld>
     <p:spTree>
@@ -4461,7 +4824,7 @@
         </p:nvSpPr>
         <p:spPr>
           <a:xfrm>
-            <a:off x="3693200" y="3093651"/>
+            <a:off x="3550157" y="2864185"/>
             <a:ext cx="1806029" cy="488984"/>
           </a:xfrm>
           <a:prstGeom prst="roundRect">
@@ -4572,7 +4935,7 @@
                   </a:schemeClr>
                 </a:solidFill>
               </a:rPr>
-              <a:t>[image preview frame]</a:t>
+              <a:t>[image pane]</a:t>
             </a:r>
           </a:p>
         </p:txBody>
@@ -4591,7 +4954,7 @@
         </p:nvGrpSpPr>
         <p:grpSpPr>
           <a:xfrm>
-            <a:off x="8036852" y="3093651"/>
+            <a:off x="6851321" y="2849104"/>
             <a:ext cx="813100" cy="793561"/>
             <a:chOff x="7895215" y="3116023"/>
             <a:chExt cx="813100" cy="793561"/>
@@ -4857,6 +5220,70 @@
                   </a:schemeClr>
                 </a:solidFill>
               </a:rPr>
+              <a:t>Item (7) </a:t>
+            </a:r>
+            <a:r>
+              <a:rPr lang="en-GB" sz="1200" i="1" dirty="0">
+                <a:solidFill>
+                  <a:schemeClr val="tx1">
+                    <a:lumMod val="50000"/>
+                    <a:lumOff val="50000"/>
+                  </a:schemeClr>
+                </a:solidFill>
+              </a:rPr>
+              <a:t>could </a:t>
+            </a:r>
+            <a:r>
+              <a:rPr lang="en-GB" sz="1200" dirty="0">
+                <a:solidFill>
+                  <a:schemeClr val="tx1">
+                    <a:lumMod val="50000"/>
+                    <a:lumOff val="50000"/>
+                  </a:schemeClr>
+                </a:solidFill>
+              </a:rPr>
+              <a:t>be template across all </a:t>
+            </a:r>
+            <a:r>
+              <a:rPr lang="en-GB" sz="1200" i="1" dirty="0">
+                <a:solidFill>
+                  <a:schemeClr val="tx1">
+                    <a:lumMod val="50000"/>
+                    <a:lumOff val="50000"/>
+                  </a:schemeClr>
+                </a:solidFill>
+              </a:rPr>
+              <a:t>app</a:t>
+            </a:r>
+            <a:r>
+              <a:rPr lang="en-GB" sz="1200" dirty="0">
+                <a:solidFill>
+                  <a:schemeClr val="tx1">
+                    <a:lumMod val="50000"/>
+                    <a:lumOff val="50000"/>
+                  </a:schemeClr>
+                </a:solidFill>
+              </a:rPr>
+              <a:t> pages, with some logic to display (and similarly for the “previous” button)</a:t>
+            </a:r>
+          </a:p>
+          <a:p>
+            <a:pPr marL="171450" indent="-171450">
+              <a:spcAft>
+                <a:spcPts val="400"/>
+              </a:spcAft>
+              <a:buFont typeface="Arial" panose="020B0604020202020204" pitchFamily="34" charset="0"/>
+              <a:buChar char="•"/>
+            </a:pPr>
+            <a:r>
+              <a:rPr lang="en-GB" sz="1200" dirty="0">
+                <a:solidFill>
+                  <a:schemeClr val="tx1">
+                    <a:lumMod val="50000"/>
+                    <a:lumOff val="50000"/>
+                  </a:schemeClr>
+                </a:solidFill>
+              </a:rPr>
               <a:t>When the “choose image” button is clicked, no information needs to be sent to the server. Instead, the filename can be cached locally for the next screen.</a:t>
             </a:r>
           </a:p>
@@ -5267,7 +5694,7 @@
         </p:nvSpPr>
         <p:spPr>
           <a:xfrm>
-            <a:off x="3348006" y="3182083"/>
+            <a:off x="3204963" y="2952617"/>
             <a:ext cx="285008" cy="284495"/>
           </a:xfrm>
           <a:prstGeom prst="ellipse">
@@ -5405,7 +5832,7 @@
         </p:nvSpPr>
         <p:spPr>
           <a:xfrm>
-            <a:off x="7752965" y="3195895"/>
+            <a:off x="6567434" y="2951348"/>
             <a:ext cx="285008" cy="284495"/>
           </a:xfrm>
           <a:prstGeom prst="ellipse">
@@ -5471,7 +5898,908 @@
 </p:sld>
 </file>
 
-<file path=ppt/slides/slide12.xml><?xml version="1.0" encoding="utf-8"?>
+<file path=ppt/slides/slide14.xml><?xml version="1.0" encoding="utf-8"?>
+<p:sld xmlns:a="http://schemas.openxmlformats.org/drawingml/2006/main" xmlns:r="http://schemas.openxmlformats.org/officeDocument/2006/relationships" xmlns:p="http://schemas.openxmlformats.org/presentationml/2006/main">
+  <p:cSld>
+    <p:spTree>
+      <p:nvGrpSpPr>
+        <p:cNvPr id="1" name=""/>
+        <p:cNvGrpSpPr/>
+        <p:nvPr/>
+      </p:nvGrpSpPr>
+      <p:grpSpPr>
+        <a:xfrm>
+          <a:off x="0" y="0"/>
+          <a:ext cx="0" cy="0"/>
+          <a:chOff x="0" y="0"/>
+          <a:chExt cx="0" cy="0"/>
+        </a:xfrm>
+      </p:grpSpPr>
+      <p:pic>
+        <p:nvPicPr>
+          <p:cNvPr id="39" name="Picture 38"/>
+          <p:cNvPicPr>
+            <a:picLocks noChangeAspect="1"/>
+          </p:cNvPicPr>
+          <p:nvPr/>
+        </p:nvPicPr>
+        <p:blipFill>
+          <a:blip r:embed="rId2"/>
+          <a:stretch>
+            <a:fillRect/>
+          </a:stretch>
+        </p:blipFill>
+        <p:spPr>
+          <a:xfrm>
+            <a:off x="1554086" y="78957"/>
+            <a:ext cx="9083827" cy="6700085"/>
+          </a:xfrm>
+          <a:prstGeom prst="rect">
+            <a:avLst/>
+          </a:prstGeom>
+        </p:spPr>
+      </p:pic>
+      <p:sp>
+        <p:nvSpPr>
+          <p:cNvPr id="6" name="Rectangle 5"/>
+          <p:cNvSpPr/>
+          <p:nvPr/>
+        </p:nvSpPr>
+        <p:spPr>
+          <a:xfrm>
+            <a:off x="1594562" y="133003"/>
+            <a:ext cx="9000000" cy="791998"/>
+          </a:xfrm>
+          <a:prstGeom prst="rect">
+            <a:avLst/>
+          </a:prstGeom>
+          <a:solidFill>
+            <a:schemeClr val="bg1">
+              <a:alpha val="70000"/>
+            </a:schemeClr>
+          </a:solidFill>
+          <a:ln>
+            <a:solidFill>
+              <a:schemeClr val="bg1">
+                <a:lumMod val="65000"/>
+              </a:schemeClr>
+            </a:solidFill>
+          </a:ln>
+        </p:spPr>
+        <p:style>
+          <a:lnRef idx="2">
+            <a:schemeClr val="accent1">
+              <a:shade val="50000"/>
+            </a:schemeClr>
+          </a:lnRef>
+          <a:fillRef idx="1">
+            <a:schemeClr val="accent1"/>
+          </a:fillRef>
+          <a:effectRef idx="0">
+            <a:schemeClr val="accent1"/>
+          </a:effectRef>
+          <a:fontRef idx="minor">
+            <a:schemeClr val="lt1"/>
+          </a:fontRef>
+        </p:style>
+        <p:txBody>
+          <a:bodyPr rtlCol="0" anchor="ctr"/>
+          <a:lstStyle/>
+          <a:p>
+            <a:r>
+              <a:rPr lang="en-GB" sz="1600" i="1" dirty="0">
+                <a:solidFill>
+                  <a:schemeClr val="tx1"/>
+                </a:solidFill>
+              </a:rPr>
+              <a:t>&lt;</a:t>
+            </a:r>
+            <a:r>
+              <a:rPr lang="en-GB" sz="1600" i="1" dirty="0" err="1">
+                <a:solidFill>
+                  <a:schemeClr val="tx1"/>
+                </a:solidFill>
+              </a:rPr>
+              <a:t>nav</a:t>
+            </a:r>
+            <a:r>
+              <a:rPr lang="en-GB" sz="1600" i="1" dirty="0">
+                <a:solidFill>
+                  <a:schemeClr val="tx1"/>
+                </a:solidFill>
+              </a:rPr>
+              <a:t> class=“</a:t>
+            </a:r>
+            <a:r>
+              <a:rPr lang="en-GB" sz="1600" i="1" dirty="0" err="1">
+                <a:solidFill>
+                  <a:schemeClr val="tx1"/>
+                </a:solidFill>
+              </a:rPr>
+              <a:t>navbar</a:t>
+            </a:r>
+            <a:r>
+              <a:rPr lang="en-GB" sz="1600" i="1" dirty="0">
+                <a:solidFill>
+                  <a:schemeClr val="tx1"/>
+                </a:solidFill>
+              </a:rPr>
+              <a:t> </a:t>
+            </a:r>
+            <a:r>
+              <a:rPr lang="en-GB" sz="1600" i="1" dirty="0" err="1">
+                <a:solidFill>
+                  <a:schemeClr val="tx1"/>
+                </a:solidFill>
+              </a:rPr>
+              <a:t>navbar</a:t>
+            </a:r>
+            <a:r>
+              <a:rPr lang="en-GB" sz="1600" i="1" dirty="0">
+                <a:solidFill>
+                  <a:schemeClr val="tx1"/>
+                </a:solidFill>
+              </a:rPr>
+              <a:t>-expand-</a:t>
+            </a:r>
+            <a:r>
+              <a:rPr lang="en-GB" sz="1600" i="1" dirty="0" err="1">
+                <a:solidFill>
+                  <a:schemeClr val="tx1"/>
+                </a:solidFill>
+              </a:rPr>
+              <a:t>lg</a:t>
+            </a:r>
+            <a:r>
+              <a:rPr lang="en-GB" sz="1600" i="1" dirty="0">
+                <a:solidFill>
+                  <a:schemeClr val="tx1"/>
+                </a:solidFill>
+              </a:rPr>
+              <a:t> (etc.)”&gt;</a:t>
+            </a:r>
+          </a:p>
+        </p:txBody>
+      </p:sp>
+      <p:sp>
+        <p:nvSpPr>
+          <p:cNvPr id="7" name="Rectangle 6"/>
+          <p:cNvSpPr/>
+          <p:nvPr/>
+        </p:nvSpPr>
+        <p:spPr>
+          <a:xfrm>
+            <a:off x="3223035" y="925002"/>
+            <a:ext cx="5721432" cy="5854039"/>
+          </a:xfrm>
+          <a:prstGeom prst="rect">
+            <a:avLst/>
+          </a:prstGeom>
+          <a:solidFill>
+            <a:schemeClr val="bg1">
+              <a:alpha val="50000"/>
+            </a:schemeClr>
+          </a:solidFill>
+          <a:ln>
+            <a:solidFill>
+              <a:schemeClr val="bg1">
+                <a:lumMod val="65000"/>
+              </a:schemeClr>
+            </a:solidFill>
+          </a:ln>
+        </p:spPr>
+        <p:style>
+          <a:lnRef idx="2">
+            <a:schemeClr val="accent1">
+              <a:shade val="50000"/>
+            </a:schemeClr>
+          </a:lnRef>
+          <a:fillRef idx="1">
+            <a:schemeClr val="accent1"/>
+          </a:fillRef>
+          <a:effectRef idx="0">
+            <a:schemeClr val="accent1"/>
+          </a:effectRef>
+          <a:fontRef idx="minor">
+            <a:schemeClr val="lt1"/>
+          </a:fontRef>
+        </p:style>
+        <p:txBody>
+          <a:bodyPr lIns="36000" rIns="36000" rtlCol="0" anchor="t"/>
+          <a:lstStyle/>
+          <a:p>
+            <a:r>
+              <a:rPr lang="en-GB" sz="1200" i="1" dirty="0">
+                <a:solidFill>
+                  <a:schemeClr val="tx1"/>
+                </a:solidFill>
+              </a:rPr>
+              <a:t>&lt;div class=“container”&gt;</a:t>
+            </a:r>
+          </a:p>
+        </p:txBody>
+      </p:sp>
+      <p:sp>
+        <p:nvSpPr>
+          <p:cNvPr id="8" name="Rectangle 7"/>
+          <p:cNvSpPr/>
+          <p:nvPr/>
+        </p:nvSpPr>
+        <p:spPr>
+          <a:xfrm>
+            <a:off x="3275852" y="1189299"/>
+            <a:ext cx="5623702" cy="914100"/>
+          </a:xfrm>
+          <a:prstGeom prst="rect">
+            <a:avLst/>
+          </a:prstGeom>
+          <a:solidFill>
+            <a:schemeClr val="bg1">
+              <a:alpha val="0"/>
+            </a:schemeClr>
+          </a:solidFill>
+          <a:ln>
+            <a:solidFill>
+              <a:schemeClr val="bg1">
+                <a:lumMod val="65000"/>
+              </a:schemeClr>
+            </a:solidFill>
+          </a:ln>
+        </p:spPr>
+        <p:style>
+          <a:lnRef idx="2">
+            <a:schemeClr val="accent1">
+              <a:shade val="50000"/>
+            </a:schemeClr>
+          </a:lnRef>
+          <a:fillRef idx="1">
+            <a:schemeClr val="accent1"/>
+          </a:fillRef>
+          <a:effectRef idx="0">
+            <a:schemeClr val="accent1"/>
+          </a:effectRef>
+          <a:fontRef idx="minor">
+            <a:schemeClr val="lt1"/>
+          </a:fontRef>
+        </p:style>
+        <p:txBody>
+          <a:bodyPr lIns="36000" rIns="36000" rtlCol="0" anchor="t"/>
+          <a:lstStyle/>
+          <a:p>
+            <a:pPr marL="176213"/>
+            <a:r>
+              <a:rPr lang="en-GB" sz="1200" i="1" dirty="0">
+                <a:solidFill>
+                  <a:schemeClr val="tx1"/>
+                </a:solidFill>
+              </a:rPr>
+              <a:t>&lt;div class=“row”&gt;</a:t>
+            </a:r>
+          </a:p>
+        </p:txBody>
+      </p:sp>
+      <p:sp>
+        <p:nvSpPr>
+          <p:cNvPr id="9" name="Rectangle 8"/>
+          <p:cNvSpPr/>
+          <p:nvPr/>
+        </p:nvSpPr>
+        <p:spPr>
+          <a:xfrm>
+            <a:off x="3275852" y="2153995"/>
+            <a:ext cx="5623702" cy="648000"/>
+          </a:xfrm>
+          <a:prstGeom prst="rect">
+            <a:avLst/>
+          </a:prstGeom>
+          <a:solidFill>
+            <a:schemeClr val="bg1">
+              <a:alpha val="0"/>
+            </a:schemeClr>
+          </a:solidFill>
+          <a:ln>
+            <a:solidFill>
+              <a:schemeClr val="bg1">
+                <a:lumMod val="65000"/>
+              </a:schemeClr>
+            </a:solidFill>
+          </a:ln>
+        </p:spPr>
+        <p:style>
+          <a:lnRef idx="2">
+            <a:schemeClr val="accent1">
+              <a:shade val="50000"/>
+            </a:schemeClr>
+          </a:lnRef>
+          <a:fillRef idx="1">
+            <a:schemeClr val="accent1"/>
+          </a:fillRef>
+          <a:effectRef idx="0">
+            <a:schemeClr val="accent1"/>
+          </a:effectRef>
+          <a:fontRef idx="minor">
+            <a:schemeClr val="lt1"/>
+          </a:fontRef>
+        </p:style>
+        <p:txBody>
+          <a:bodyPr lIns="36000" rIns="36000" rtlCol="0" anchor="t"/>
+          <a:lstStyle/>
+          <a:p>
+            <a:pPr marL="176213"/>
+            <a:r>
+              <a:rPr lang="en-GB" sz="1200" i="1" dirty="0">
+                <a:solidFill>
+                  <a:schemeClr val="tx1"/>
+                </a:solidFill>
+              </a:rPr>
+              <a:t>&lt;div class=“row”&gt;</a:t>
+            </a:r>
+          </a:p>
+        </p:txBody>
+      </p:sp>
+      <p:sp>
+        <p:nvSpPr>
+          <p:cNvPr id="12" name="Rectangle 11"/>
+          <p:cNvSpPr/>
+          <p:nvPr/>
+        </p:nvSpPr>
+        <p:spPr>
+          <a:xfrm>
+            <a:off x="3282711" y="2838447"/>
+            <a:ext cx="5623702" cy="852310"/>
+          </a:xfrm>
+          <a:prstGeom prst="rect">
+            <a:avLst/>
+          </a:prstGeom>
+          <a:solidFill>
+            <a:schemeClr val="bg1">
+              <a:alpha val="0"/>
+            </a:schemeClr>
+          </a:solidFill>
+          <a:ln>
+            <a:solidFill>
+              <a:schemeClr val="bg1">
+                <a:lumMod val="65000"/>
+              </a:schemeClr>
+            </a:solidFill>
+          </a:ln>
+        </p:spPr>
+        <p:style>
+          <a:lnRef idx="2">
+            <a:schemeClr val="accent1">
+              <a:shade val="50000"/>
+            </a:schemeClr>
+          </a:lnRef>
+          <a:fillRef idx="1">
+            <a:schemeClr val="accent1"/>
+          </a:fillRef>
+          <a:effectRef idx="0">
+            <a:schemeClr val="accent1"/>
+          </a:effectRef>
+          <a:fontRef idx="minor">
+            <a:schemeClr val="lt1"/>
+          </a:fontRef>
+        </p:style>
+        <p:txBody>
+          <a:bodyPr lIns="36000" rIns="36000" rtlCol="0" anchor="t"/>
+          <a:lstStyle/>
+          <a:p>
+            <a:pPr marL="176213"/>
+            <a:r>
+              <a:rPr lang="en-GB" sz="1200" i="1" dirty="0">
+                <a:solidFill>
+                  <a:schemeClr val="tx1"/>
+                </a:solidFill>
+              </a:rPr>
+              <a:t>&lt;div class=“row”&gt;</a:t>
+            </a:r>
+          </a:p>
+        </p:txBody>
+      </p:sp>
+      <p:sp>
+        <p:nvSpPr>
+          <p:cNvPr id="13" name="Rectangle 12"/>
+          <p:cNvSpPr/>
+          <p:nvPr/>
+        </p:nvSpPr>
+        <p:spPr>
+          <a:xfrm>
+            <a:off x="3271900" y="3746184"/>
+            <a:ext cx="5623702" cy="2950179"/>
+          </a:xfrm>
+          <a:prstGeom prst="rect">
+            <a:avLst/>
+          </a:prstGeom>
+          <a:solidFill>
+            <a:schemeClr val="bg1">
+              <a:alpha val="0"/>
+            </a:schemeClr>
+          </a:solidFill>
+          <a:ln>
+            <a:solidFill>
+              <a:schemeClr val="bg1">
+                <a:lumMod val="65000"/>
+              </a:schemeClr>
+            </a:solidFill>
+          </a:ln>
+        </p:spPr>
+        <p:style>
+          <a:lnRef idx="2">
+            <a:schemeClr val="accent1">
+              <a:shade val="50000"/>
+            </a:schemeClr>
+          </a:lnRef>
+          <a:fillRef idx="1">
+            <a:schemeClr val="accent1"/>
+          </a:fillRef>
+          <a:effectRef idx="0">
+            <a:schemeClr val="accent1"/>
+          </a:effectRef>
+          <a:fontRef idx="minor">
+            <a:schemeClr val="lt1"/>
+          </a:fontRef>
+        </p:style>
+        <p:txBody>
+          <a:bodyPr lIns="36000" rIns="36000" rtlCol="0" anchor="t"/>
+          <a:lstStyle/>
+          <a:p>
+            <a:pPr marL="176213"/>
+            <a:r>
+              <a:rPr lang="en-GB" sz="1200" i="1" dirty="0">
+                <a:solidFill>
+                  <a:schemeClr val="tx1"/>
+                </a:solidFill>
+              </a:rPr>
+              <a:t>&lt;div class=“row” &gt;</a:t>
+            </a:r>
+          </a:p>
+        </p:txBody>
+      </p:sp>
+      <p:sp>
+        <p:nvSpPr>
+          <p:cNvPr id="14" name="Rectangle 13"/>
+          <p:cNvSpPr/>
+          <p:nvPr/>
+        </p:nvSpPr>
+        <p:spPr>
+          <a:xfrm>
+            <a:off x="3325092" y="1606293"/>
+            <a:ext cx="5533566" cy="442451"/>
+          </a:xfrm>
+          <a:prstGeom prst="rect">
+            <a:avLst/>
+          </a:prstGeom>
+          <a:solidFill>
+            <a:schemeClr val="bg1">
+              <a:alpha val="0"/>
+            </a:schemeClr>
+          </a:solidFill>
+          <a:ln>
+            <a:solidFill>
+              <a:schemeClr val="bg1">
+                <a:lumMod val="65000"/>
+              </a:schemeClr>
+            </a:solidFill>
+          </a:ln>
+        </p:spPr>
+        <p:style>
+          <a:lnRef idx="2">
+            <a:schemeClr val="accent1">
+              <a:shade val="50000"/>
+            </a:schemeClr>
+          </a:lnRef>
+          <a:fillRef idx="1">
+            <a:schemeClr val="accent1"/>
+          </a:fillRef>
+          <a:effectRef idx="0">
+            <a:schemeClr val="accent1"/>
+          </a:effectRef>
+          <a:fontRef idx="minor">
+            <a:schemeClr val="lt1"/>
+          </a:fontRef>
+        </p:style>
+        <p:txBody>
+          <a:bodyPr lIns="36000" rIns="36000" rtlCol="0" anchor="t"/>
+          <a:lstStyle/>
+          <a:p>
+            <a:pPr marL="360363"/>
+            <a:r>
+              <a:rPr lang="en-GB" sz="1200" i="1" dirty="0">
+                <a:solidFill>
+                  <a:schemeClr val="tx1"/>
+                </a:solidFill>
+              </a:rPr>
+              <a:t>&lt;div class=“col-12” id=“</a:t>
+            </a:r>
+            <a:r>
+              <a:rPr lang="en-GB" sz="1200" i="1" dirty="0" err="1">
+                <a:solidFill>
+                  <a:schemeClr val="tx1"/>
+                </a:solidFill>
+              </a:rPr>
+              <a:t>nav</a:t>
+            </a:r>
+            <a:r>
+              <a:rPr lang="en-GB" sz="1200" i="1" dirty="0">
+                <a:solidFill>
+                  <a:schemeClr val="tx1"/>
+                </a:solidFill>
+              </a:rPr>
+              <a:t>-app-steps”&gt;</a:t>
+            </a:r>
+          </a:p>
+        </p:txBody>
+      </p:sp>
+      <p:sp>
+        <p:nvSpPr>
+          <p:cNvPr id="15" name="Rectangle 14"/>
+          <p:cNvSpPr/>
+          <p:nvPr/>
+        </p:nvSpPr>
+        <p:spPr>
+          <a:xfrm>
+            <a:off x="3338951" y="2356545"/>
+            <a:ext cx="5533566" cy="386655"/>
+          </a:xfrm>
+          <a:prstGeom prst="rect">
+            <a:avLst/>
+          </a:prstGeom>
+          <a:solidFill>
+            <a:schemeClr val="bg1">
+              <a:alpha val="0"/>
+            </a:schemeClr>
+          </a:solidFill>
+          <a:ln>
+            <a:solidFill>
+              <a:schemeClr val="bg1">
+                <a:lumMod val="65000"/>
+              </a:schemeClr>
+            </a:solidFill>
+          </a:ln>
+        </p:spPr>
+        <p:style>
+          <a:lnRef idx="2">
+            <a:schemeClr val="accent1">
+              <a:shade val="50000"/>
+            </a:schemeClr>
+          </a:lnRef>
+          <a:fillRef idx="1">
+            <a:schemeClr val="accent1"/>
+          </a:fillRef>
+          <a:effectRef idx="0">
+            <a:schemeClr val="accent1"/>
+          </a:effectRef>
+          <a:fontRef idx="minor">
+            <a:schemeClr val="lt1"/>
+          </a:fontRef>
+        </p:style>
+        <p:txBody>
+          <a:bodyPr lIns="36000" rIns="36000" rtlCol="0" anchor="ctr"/>
+          <a:lstStyle/>
+          <a:p>
+            <a:pPr marL="360363"/>
+            <a:r>
+              <a:rPr lang="en-GB" sz="1200" i="1" dirty="0">
+                <a:solidFill>
+                  <a:schemeClr val="tx1"/>
+                </a:solidFill>
+              </a:rPr>
+              <a:t>&lt;div class=“col-12” id=“txt-step-description”&gt;</a:t>
+            </a:r>
+          </a:p>
+        </p:txBody>
+      </p:sp>
+      <p:sp>
+        <p:nvSpPr>
+          <p:cNvPr id="16" name="Rectangle 15"/>
+          <p:cNvSpPr/>
+          <p:nvPr/>
+        </p:nvSpPr>
+        <p:spPr>
+          <a:xfrm>
+            <a:off x="4618885" y="3062465"/>
+            <a:ext cx="2929730" cy="585076"/>
+          </a:xfrm>
+          <a:prstGeom prst="rect">
+            <a:avLst/>
+          </a:prstGeom>
+          <a:solidFill>
+            <a:schemeClr val="bg1">
+              <a:alpha val="0"/>
+            </a:schemeClr>
+          </a:solidFill>
+          <a:ln>
+            <a:solidFill>
+              <a:schemeClr val="bg1">
+                <a:lumMod val="65000"/>
+              </a:schemeClr>
+            </a:solidFill>
+          </a:ln>
+        </p:spPr>
+        <p:style>
+          <a:lnRef idx="2">
+            <a:schemeClr val="accent1">
+              <a:shade val="50000"/>
+            </a:schemeClr>
+          </a:lnRef>
+          <a:fillRef idx="1">
+            <a:schemeClr val="accent1"/>
+          </a:fillRef>
+          <a:effectRef idx="0">
+            <a:schemeClr val="accent1"/>
+          </a:effectRef>
+          <a:fontRef idx="minor">
+            <a:schemeClr val="lt1"/>
+          </a:fontRef>
+        </p:style>
+        <p:txBody>
+          <a:bodyPr lIns="36000" rIns="36000" rtlCol="0" anchor="ctr"/>
+          <a:lstStyle/>
+          <a:p>
+            <a:r>
+              <a:rPr lang="en-GB" sz="1200" i="1" dirty="0">
+                <a:solidFill>
+                  <a:schemeClr val="tx1"/>
+                </a:solidFill>
+              </a:rPr>
+              <a:t>&lt;div class=“col-8” id=“</a:t>
+            </a:r>
+            <a:r>
+              <a:rPr lang="en-GB" sz="1200" i="1" dirty="0" err="1">
+                <a:solidFill>
+                  <a:schemeClr val="tx1"/>
+                </a:solidFill>
+              </a:rPr>
+              <a:t>btn</a:t>
+            </a:r>
+            <a:r>
+              <a:rPr lang="en-GB" sz="1200" i="1" dirty="0">
+                <a:solidFill>
+                  <a:schemeClr val="tx1"/>
+                </a:solidFill>
+              </a:rPr>
+              <a:t>-image-selector”&gt;</a:t>
+            </a:r>
+          </a:p>
+        </p:txBody>
+      </p:sp>
+      <p:sp>
+        <p:nvSpPr>
+          <p:cNvPr id="17" name="Rectangle 16"/>
+          <p:cNvSpPr/>
+          <p:nvPr/>
+        </p:nvSpPr>
+        <p:spPr>
+          <a:xfrm>
+            <a:off x="3357431" y="4158143"/>
+            <a:ext cx="5533566" cy="2459991"/>
+          </a:xfrm>
+          <a:prstGeom prst="rect">
+            <a:avLst/>
+          </a:prstGeom>
+          <a:solidFill>
+            <a:schemeClr val="bg1">
+              <a:alpha val="0"/>
+            </a:schemeClr>
+          </a:solidFill>
+          <a:ln>
+            <a:solidFill>
+              <a:schemeClr val="bg1">
+                <a:lumMod val="65000"/>
+              </a:schemeClr>
+            </a:solidFill>
+          </a:ln>
+        </p:spPr>
+        <p:style>
+          <a:lnRef idx="2">
+            <a:schemeClr val="accent1">
+              <a:shade val="50000"/>
+            </a:schemeClr>
+          </a:lnRef>
+          <a:fillRef idx="1">
+            <a:schemeClr val="accent1"/>
+          </a:fillRef>
+          <a:effectRef idx="0">
+            <a:schemeClr val="accent1"/>
+          </a:effectRef>
+          <a:fontRef idx="minor">
+            <a:schemeClr val="lt1"/>
+          </a:fontRef>
+        </p:style>
+        <p:txBody>
+          <a:bodyPr lIns="36000" rIns="36000" rtlCol="0" anchor="t"/>
+          <a:lstStyle/>
+          <a:p>
+            <a:pPr marL="360363"/>
+            <a:r>
+              <a:rPr lang="en-GB" sz="1200" i="1" dirty="0">
+                <a:solidFill>
+                  <a:schemeClr val="tx1"/>
+                </a:solidFill>
+              </a:rPr>
+              <a:t>&lt;div class=“col-12” id=“</a:t>
+            </a:r>
+            <a:r>
+              <a:rPr lang="en-GB" sz="1200" i="1" dirty="0" err="1">
+                <a:solidFill>
+                  <a:schemeClr val="tx1"/>
+                </a:solidFill>
+              </a:rPr>
+              <a:t>img</a:t>
+            </a:r>
+            <a:r>
+              <a:rPr lang="en-GB" sz="1200" i="1" dirty="0">
+                <a:solidFill>
+                  <a:schemeClr val="tx1"/>
+                </a:solidFill>
+              </a:rPr>
+              <a:t>-selected-image”&gt;</a:t>
+            </a:r>
+          </a:p>
+        </p:txBody>
+      </p:sp>
+      <p:sp>
+        <p:nvSpPr>
+          <p:cNvPr id="40" name="Rectangle 39"/>
+          <p:cNvSpPr/>
+          <p:nvPr/>
+        </p:nvSpPr>
+        <p:spPr>
+          <a:xfrm>
+            <a:off x="7596347" y="3067218"/>
+            <a:ext cx="1262311" cy="585076"/>
+          </a:xfrm>
+          <a:prstGeom prst="rect">
+            <a:avLst/>
+          </a:prstGeom>
+          <a:solidFill>
+            <a:schemeClr val="bg1">
+              <a:alpha val="0"/>
+            </a:schemeClr>
+          </a:solidFill>
+          <a:ln>
+            <a:solidFill>
+              <a:schemeClr val="bg1">
+                <a:lumMod val="65000"/>
+              </a:schemeClr>
+            </a:solidFill>
+          </a:ln>
+        </p:spPr>
+        <p:style>
+          <a:lnRef idx="2">
+            <a:schemeClr val="accent1">
+              <a:shade val="50000"/>
+            </a:schemeClr>
+          </a:lnRef>
+          <a:fillRef idx="1">
+            <a:schemeClr val="accent1"/>
+          </a:fillRef>
+          <a:effectRef idx="0">
+            <a:schemeClr val="accent1"/>
+          </a:effectRef>
+          <a:fontRef idx="minor">
+            <a:schemeClr val="lt1"/>
+          </a:fontRef>
+        </p:style>
+        <p:txBody>
+          <a:bodyPr lIns="36000" rIns="36000" rtlCol="0" anchor="ctr"/>
+          <a:lstStyle/>
+          <a:p>
+            <a:r>
+              <a:rPr lang="en-GB" sz="1200" i="1" dirty="0">
+                <a:solidFill>
+                  <a:schemeClr val="tx1"/>
+                </a:solidFill>
+              </a:rPr>
+              <a:t>&lt;div class=“col-2” id=“</a:t>
+            </a:r>
+            <a:r>
+              <a:rPr lang="en-GB" sz="1200" i="1" dirty="0" err="1">
+                <a:solidFill>
+                  <a:schemeClr val="tx1"/>
+                </a:solidFill>
+              </a:rPr>
+              <a:t>btn</a:t>
+            </a:r>
+            <a:r>
+              <a:rPr lang="en-GB" sz="1200" i="1" dirty="0">
+                <a:solidFill>
+                  <a:schemeClr val="tx1"/>
+                </a:solidFill>
+              </a:rPr>
+              <a:t>-next&gt;</a:t>
+            </a:r>
+          </a:p>
+        </p:txBody>
+      </p:sp>
+      <p:sp>
+        <p:nvSpPr>
+          <p:cNvPr id="41" name="Rectangle 40"/>
+          <p:cNvSpPr/>
+          <p:nvPr/>
+        </p:nvSpPr>
+        <p:spPr>
+          <a:xfrm>
+            <a:off x="3310606" y="3062465"/>
+            <a:ext cx="1262311" cy="585076"/>
+          </a:xfrm>
+          <a:prstGeom prst="rect">
+            <a:avLst/>
+          </a:prstGeom>
+          <a:solidFill>
+            <a:schemeClr val="bg1">
+              <a:alpha val="0"/>
+            </a:schemeClr>
+          </a:solidFill>
+          <a:ln>
+            <a:solidFill>
+              <a:schemeClr val="bg1">
+                <a:lumMod val="65000"/>
+              </a:schemeClr>
+            </a:solidFill>
+          </a:ln>
+        </p:spPr>
+        <p:style>
+          <a:lnRef idx="2">
+            <a:schemeClr val="accent1">
+              <a:shade val="50000"/>
+            </a:schemeClr>
+          </a:lnRef>
+          <a:fillRef idx="1">
+            <a:schemeClr val="accent1"/>
+          </a:fillRef>
+          <a:effectRef idx="0">
+            <a:schemeClr val="accent1"/>
+          </a:effectRef>
+          <a:fontRef idx="minor">
+            <a:schemeClr val="lt1"/>
+          </a:fontRef>
+        </p:style>
+        <p:txBody>
+          <a:bodyPr lIns="36000" rIns="36000" rtlCol="0" anchor="ctr"/>
+          <a:lstStyle/>
+          <a:p>
+            <a:r>
+              <a:rPr lang="en-GB" sz="1200" i="1" dirty="0">
+                <a:solidFill>
+                  <a:schemeClr val="tx1"/>
+                </a:solidFill>
+              </a:rPr>
+              <a:t>&lt;div class=“col-2” id=“</a:t>
+            </a:r>
+            <a:r>
+              <a:rPr lang="en-GB" sz="1200" i="1" dirty="0" err="1">
+                <a:solidFill>
+                  <a:schemeClr val="tx1"/>
+                </a:solidFill>
+              </a:rPr>
+              <a:t>btn</a:t>
+            </a:r>
+            <a:r>
+              <a:rPr lang="en-GB" sz="1200" i="1" dirty="0">
+                <a:solidFill>
+                  <a:schemeClr val="tx1"/>
+                </a:solidFill>
+              </a:rPr>
+              <a:t>-previous&gt;</a:t>
+            </a:r>
+          </a:p>
+        </p:txBody>
+      </p:sp>
+    </p:spTree>
+    <p:extLst>
+      <p:ext uri="{BB962C8B-B14F-4D97-AF65-F5344CB8AC3E}">
+        <p14:creationId xmlns:p14="http://schemas.microsoft.com/office/powerpoint/2010/main" val="484274913"/>
+      </p:ext>
+    </p:extLst>
+  </p:cSld>
+  <p:clrMapOvr>
+    <a:masterClrMapping/>
+  </p:clrMapOvr>
+</p:sld>
+</file>
+
+<file path=ppt/slides/slide15.xml><?xml version="1.0" encoding="utf-8"?>
 <p:sld xmlns:a="http://schemas.openxmlformats.org/drawingml/2006/main" xmlns:r="http://schemas.openxmlformats.org/officeDocument/2006/relationships" xmlns:p="http://schemas.openxmlformats.org/presentationml/2006/main">
   <p:cSld>
     <p:spTree>
@@ -5661,7 +6989,7 @@
 </p:sld>
 </file>
 
-<file path=ppt/slides/slide13.xml><?xml version="1.0" encoding="utf-8"?>
+<file path=ppt/slides/slide16.xml><?xml version="1.0" encoding="utf-8"?>
 <p:sld xmlns:a="http://schemas.openxmlformats.org/drawingml/2006/main" xmlns:r="http://schemas.openxmlformats.org/officeDocument/2006/relationships" xmlns:p="http://schemas.openxmlformats.org/presentationml/2006/main">
   <p:cSld>
     <p:spTree>
@@ -6439,8 +7767,8 @@
         </p:nvSpPr>
         <p:spPr>
           <a:xfrm>
-            <a:off x="1312111" y="2253441"/>
-            <a:ext cx="6568207" cy="646331"/>
+            <a:off x="1611415" y="2253441"/>
+            <a:ext cx="5969600" cy="830997"/>
           </a:xfrm>
           <a:prstGeom prst="rect">
             <a:avLst/>
@@ -6453,17 +7781,105 @@
           </a:bodyPr>
           <a:lstStyle/>
           <a:p>
-            <a:pPr algn="ctr"/>
-            <a:r>
-              <a:rPr lang="en-GB" dirty="0">
-                <a:solidFill>
-                  <a:schemeClr val="tx1">
+            <a:pPr lvl="0" algn="ctr" defTabSz="457200"/>
+            <a:r>
+              <a:rPr lang="en-GB" sz="1200" dirty="0">
+                <a:solidFill>
+                  <a:prstClr val="black">
                     <a:lumMod val="50000"/>
                     <a:lumOff val="50000"/>
-                  </a:schemeClr>
-                </a:solidFill>
-              </a:rPr>
-              <a:t>Click “Find sticky notes” to use image detection to find sticky notes in the image. Add new regions manually by clicking “Add region”</a:t>
+                  </a:prstClr>
+                </a:solidFill>
+              </a:rPr>
+              <a:t>Click “Find sticky notes” to use image detection to find sticky notes in the image.  This will add a series of ‘regions’ to the image. To </a:t>
+            </a:r>
+            <a:r>
+              <a:rPr lang="en-GB" sz="1200" b="1" dirty="0">
+                <a:solidFill>
+                  <a:prstClr val="black">
+                    <a:lumMod val="50000"/>
+                    <a:lumOff val="50000"/>
+                  </a:prstClr>
+                </a:solidFill>
+              </a:rPr>
+              <a:t>add</a:t>
+            </a:r>
+            <a:r>
+              <a:rPr lang="en-GB" sz="1200" dirty="0">
+                <a:solidFill>
+                  <a:prstClr val="black">
+                    <a:lumMod val="50000"/>
+                    <a:lumOff val="50000"/>
+                  </a:prstClr>
+                </a:solidFill>
+              </a:rPr>
+              <a:t> new regions manually, click “Add region”. To </a:t>
+            </a:r>
+            <a:r>
+              <a:rPr lang="en-GB" sz="1200" b="1" dirty="0">
+                <a:solidFill>
+                  <a:prstClr val="black">
+                    <a:lumMod val="50000"/>
+                    <a:lumOff val="50000"/>
+                  </a:prstClr>
+                </a:solidFill>
+              </a:rPr>
+              <a:t>move</a:t>
+            </a:r>
+            <a:r>
+              <a:rPr lang="en-GB" sz="1200" dirty="0">
+                <a:solidFill>
+                  <a:prstClr val="black">
+                    <a:lumMod val="50000"/>
+                    <a:lumOff val="50000"/>
+                  </a:prstClr>
+                </a:solidFill>
+              </a:rPr>
+              <a:t> a region, click and drag inside it. To </a:t>
+            </a:r>
+            <a:r>
+              <a:rPr lang="en-GB" sz="1200" b="1" dirty="0">
+                <a:solidFill>
+                  <a:prstClr val="black">
+                    <a:lumMod val="50000"/>
+                    <a:lumOff val="50000"/>
+                  </a:prstClr>
+                </a:solidFill>
+              </a:rPr>
+              <a:t>resize</a:t>
+            </a:r>
+            <a:r>
+              <a:rPr lang="en-GB" sz="1200" dirty="0">
+                <a:solidFill>
+                  <a:prstClr val="black">
+                    <a:lumMod val="50000"/>
+                    <a:lumOff val="50000"/>
+                  </a:prstClr>
+                </a:solidFill>
+              </a:rPr>
+              <a:t> a region, click and drag on one of the handles (top-left and bottom-right corners of each region). To </a:t>
+            </a:r>
+            <a:r>
+              <a:rPr lang="en-GB" sz="1200" b="1" dirty="0">
+                <a:solidFill>
+                  <a:prstClr val="black">
+                    <a:lumMod val="50000"/>
+                    <a:lumOff val="50000"/>
+                  </a:prstClr>
+                </a:solidFill>
+              </a:rPr>
+              <a:t>delete</a:t>
+            </a:r>
+            <a:r>
+              <a:rPr lang="en-GB" sz="1200" dirty="0">
+                <a:solidFill>
+                  <a:prstClr val="black">
+                    <a:lumMod val="50000"/>
+                    <a:lumOff val="50000"/>
+                  </a:prstClr>
+                </a:solidFill>
+              </a:rPr>
+              <a:t> a region, double-click inside it.</a:t>
             </a:r>
           </a:p>
         </p:txBody>
@@ -6593,7 +8009,7 @@
                   </a:schemeClr>
                 </a:solidFill>
               </a:rPr>
-              <a:t>[image preview frame]</a:t>
+              <a:t>[image pane]</a:t>
             </a:r>
           </a:p>
         </p:txBody>
@@ -7242,7 +8658,7 @@
         </p:nvSpPr>
         <p:spPr>
           <a:xfrm>
-            <a:off x="1178076" y="2446075"/>
+            <a:off x="1406674" y="2446075"/>
             <a:ext cx="285008" cy="284495"/>
           </a:xfrm>
           <a:prstGeom prst="ellipse">
@@ -7860,7 +9276,7 @@
 </p:sld>
 </file>
 
-<file path=ppt/slides/slide14.xml><?xml version="1.0" encoding="utf-8"?>
+<file path=ppt/slides/slide17.xml><?xml version="1.0" encoding="utf-8"?>
 <p:sld xmlns:a="http://schemas.openxmlformats.org/drawingml/2006/main" xmlns:r="http://schemas.openxmlformats.org/officeDocument/2006/relationships" xmlns:p="http://schemas.openxmlformats.org/presentationml/2006/main">
   <p:cSld>
     <p:spTree>
@@ -8050,7 +9466,7 @@
 </p:sld>
 </file>
 
-<file path=ppt/slides/slide15.xml><?xml version="1.0" encoding="utf-8"?>
+<file path=ppt/slides/slide18.xml><?xml version="1.0" encoding="utf-8"?>
 <p:sld xmlns:a="http://schemas.openxmlformats.org/drawingml/2006/main" xmlns:r="http://schemas.openxmlformats.org/officeDocument/2006/relationships" xmlns:p="http://schemas.openxmlformats.org/presentationml/2006/main">
   <p:cSld>
     <p:spTree>
@@ -8828,8 +10244,8 @@
         </p:nvSpPr>
         <p:spPr>
           <a:xfrm>
-            <a:off x="1087718" y="2205633"/>
-            <a:ext cx="7273364" cy="923330"/>
+            <a:off x="1479698" y="2205633"/>
+            <a:ext cx="6489404" cy="830997"/>
           </a:xfrm>
           <a:prstGeom prst="rect">
             <a:avLst/>
@@ -8844,7 +10260,7 @@
           <a:p>
             <a:pPr algn="ctr"/>
             <a:r>
-              <a:rPr lang="en-GB" dirty="0">
+              <a:rPr lang="en-GB" sz="1600" dirty="0">
                 <a:solidFill>
                   <a:schemeClr val="tx1">
                     <a:lumMod val="50000"/>
@@ -8982,7 +10398,7 @@
                   </a:schemeClr>
                 </a:solidFill>
               </a:rPr>
-              <a:t>[image preview frame]</a:t>
+              <a:t>[image pane]</a:t>
             </a:r>
           </a:p>
         </p:txBody>
@@ -9476,7 +10892,7 @@
         </p:nvSpPr>
         <p:spPr>
           <a:xfrm>
-            <a:off x="927061" y="2308627"/>
+            <a:off x="1347046" y="2308627"/>
             <a:ext cx="285008" cy="284495"/>
           </a:xfrm>
           <a:prstGeom prst="ellipse">
@@ -10161,7 +11577,7 @@
 </p:sld>
 </file>
 
-<file path=ppt/slides/slide16.xml><?xml version="1.0" encoding="utf-8"?>
+<file path=ppt/slides/slide19.xml><?xml version="1.0" encoding="utf-8"?>
 <p:sld xmlns:a="http://schemas.openxmlformats.org/drawingml/2006/main" xmlns:r="http://schemas.openxmlformats.org/officeDocument/2006/relationships" xmlns:p="http://schemas.openxmlformats.org/presentationml/2006/main">
   <p:cSld>
     <p:spTree>
@@ -10316,182 +11732,6 @@
     <p:extLst>
       <p:ext uri="{BB962C8B-B14F-4D97-AF65-F5344CB8AC3E}">
         <p14:creationId xmlns:p14="http://schemas.microsoft.com/office/powerpoint/2010/main" val="1167404419"/>
-      </p:ext>
-    </p:extLst>
-  </p:cSld>
-  <p:clrMapOvr>
-    <a:masterClrMapping/>
-  </p:clrMapOvr>
-</p:sld>
-</file>
-
-<file path=ppt/slides/slide17.xml><?xml version="1.0" encoding="utf-8"?>
-<p:sld xmlns:a="http://schemas.openxmlformats.org/drawingml/2006/main" xmlns:r="http://schemas.openxmlformats.org/officeDocument/2006/relationships" xmlns:p="http://schemas.openxmlformats.org/presentationml/2006/main">
-  <p:cSld>
-    <p:spTree>
-      <p:nvGrpSpPr>
-        <p:cNvPr id="1" name=""/>
-        <p:cNvGrpSpPr/>
-        <p:nvPr/>
-      </p:nvGrpSpPr>
-      <p:grpSpPr>
-        <a:xfrm>
-          <a:off x="0" y="0"/>
-          <a:ext cx="0" cy="0"/>
-          <a:chOff x="0" y="0"/>
-          <a:chExt cx="0" cy="0"/>
-        </a:xfrm>
-      </p:grpSpPr>
-      <p:sp>
-        <p:nvSpPr>
-          <p:cNvPr id="2" name="Title 1">
-            <a:extLst>
-              <a:ext uri="{FF2B5EF4-FFF2-40B4-BE49-F238E27FC236}">
-                <a16:creationId xmlns:a16="http://schemas.microsoft.com/office/drawing/2014/main" id="{A6ECEA39-C85F-4DD6-9557-338622D09926}"/>
-              </a:ext>
-            </a:extLst>
-          </p:cNvPr>
-          <p:cNvSpPr>
-            <a:spLocks noGrp="1"/>
-          </p:cNvSpPr>
-          <p:nvPr>
-            <p:ph type="title"/>
-          </p:nvPr>
-        </p:nvSpPr>
-        <p:spPr/>
-        <p:txBody>
-          <a:bodyPr/>
-          <a:lstStyle/>
-          <a:p>
-            <a:r>
-              <a:rPr lang="en-GB" dirty="0"/>
-              <a:t>FAQ page</a:t>
-            </a:r>
-          </a:p>
-        </p:txBody>
-      </p:sp>
-      <p:sp>
-        <p:nvSpPr>
-          <p:cNvPr id="3" name="Content Placeholder 2">
-            <a:extLst>
-              <a:ext uri="{FF2B5EF4-FFF2-40B4-BE49-F238E27FC236}">
-                <a16:creationId xmlns:a16="http://schemas.microsoft.com/office/drawing/2014/main" id="{74E41E85-F90A-4D8C-A76B-20DADD54E48C}"/>
-              </a:ext>
-            </a:extLst>
-          </p:cNvPr>
-          <p:cNvSpPr>
-            <a:spLocks noGrp="1"/>
-          </p:cNvSpPr>
-          <p:nvPr>
-            <p:ph idx="1"/>
-          </p:nvPr>
-        </p:nvSpPr>
-        <p:spPr>
-          <a:xfrm>
-            <a:off x="838202" y="1494430"/>
-            <a:ext cx="10515600" cy="4682533"/>
-          </a:xfrm>
-        </p:spPr>
-        <p:txBody>
-          <a:bodyPr>
-            <a:normAutofit fontScale="92500" lnSpcReduction="10000"/>
-          </a:bodyPr>
-          <a:lstStyle/>
-          <a:p>
-            <a:r>
-              <a:rPr lang="en-GB" dirty="0"/>
-              <a:t>Largely static text content</a:t>
-            </a:r>
-          </a:p>
-          <a:p>
-            <a:r>
-              <a:rPr lang="en-GB" dirty="0"/>
-              <a:t>Main questions list; either hyperlinked at top to more info, or collapsible paragraphs</a:t>
-            </a:r>
-          </a:p>
-          <a:p>
-            <a:r>
-              <a:rPr lang="en-GB" dirty="0"/>
-              <a:t>Some areas to cover:</a:t>
-            </a:r>
-          </a:p>
-          <a:p>
-            <a:pPr lvl="1"/>
-            <a:r>
-              <a:rPr lang="en-GB" dirty="0"/>
-              <a:t>Storage of images – Heroku doesn’t, but Azure (probably) does</a:t>
-            </a:r>
-          </a:p>
-          <a:p>
-            <a:pPr lvl="1"/>
-            <a:r>
-              <a:rPr lang="en-GB" dirty="0"/>
-              <a:t>Limitations on Azure services (e.g. number of images / day?)</a:t>
-            </a:r>
-          </a:p>
-          <a:p>
-            <a:pPr lvl="1"/>
-            <a:r>
-              <a:rPr lang="en-GB" dirty="0"/>
-              <a:t>Slow load-time on Heroku</a:t>
-            </a:r>
-          </a:p>
-          <a:p>
-            <a:pPr lvl="1"/>
-            <a:r>
-              <a:rPr lang="en-GB" dirty="0"/>
-              <a:t>Use on mobile devices (can be done, but not designed for this)</a:t>
-            </a:r>
-          </a:p>
-          <a:p>
-            <a:pPr lvl="1"/>
-            <a:r>
-              <a:rPr lang="en-GB" dirty="0"/>
-              <a:t>Quality of Azure services (e.g. OCR is very good, Post-it finder is so-so)</a:t>
-            </a:r>
-          </a:p>
-          <a:p>
-            <a:pPr lvl="1"/>
-            <a:r>
-              <a:rPr lang="en-GB" dirty="0"/>
-              <a:t>Cookies (i.e. there aren’t any)</a:t>
-            </a:r>
-          </a:p>
-          <a:p>
-            <a:pPr lvl="1"/>
-            <a:r>
-              <a:rPr lang="en-GB" dirty="0"/>
-              <a:t>Browser compatibility (e.g. won’t work properly on older browsers)</a:t>
-            </a:r>
-          </a:p>
-          <a:p>
-            <a:pPr lvl="1"/>
-            <a:r>
-              <a:rPr lang="en-GB" dirty="0"/>
-              <a:t>Support (e.g. “best effort”; how to raise a bug, provide feedback etc.)</a:t>
-            </a:r>
-          </a:p>
-          <a:p>
-            <a:pPr lvl="1"/>
-            <a:r>
-              <a:rPr lang="en-GB" dirty="0">
-                <a:solidFill>
-                  <a:srgbClr val="FF0000"/>
-                </a:solidFill>
-              </a:rPr>
-              <a:t>…what else?</a:t>
-            </a:r>
-          </a:p>
-          <a:p>
-            <a:pPr lvl="1"/>
-            <a:endParaRPr lang="en-GB" dirty="0"/>
-          </a:p>
-        </p:txBody>
-      </p:sp>
-    </p:spTree>
-    <p:extLst>
-      <p:ext uri="{BB962C8B-B14F-4D97-AF65-F5344CB8AC3E}">
-        <p14:creationId xmlns:p14="http://schemas.microsoft.com/office/powerpoint/2010/main" val="4158538450"/>
       </p:ext>
     </p:extLst>
   </p:cSld>
@@ -10604,6 +11844,2374 @@
     <p:extLst>
       <p:ext uri="{BB962C8B-B14F-4D97-AF65-F5344CB8AC3E}">
         <p14:creationId xmlns:p14="http://schemas.microsoft.com/office/powerpoint/2010/main" val="3494737879"/>
+      </p:ext>
+    </p:extLst>
+  </p:cSld>
+  <p:clrMapOvr>
+    <a:masterClrMapping/>
+  </p:clrMapOvr>
+</p:sld>
+</file>
+
+<file path=ppt/slides/slide20.xml><?xml version="1.0" encoding="utf-8"?>
+<p:sld xmlns:a="http://schemas.openxmlformats.org/drawingml/2006/main" xmlns:r="http://schemas.openxmlformats.org/officeDocument/2006/relationships" xmlns:p="http://schemas.openxmlformats.org/presentationml/2006/main">
+  <p:cSld>
+    <p:spTree>
+      <p:nvGrpSpPr>
+        <p:cNvPr id="1" name=""/>
+        <p:cNvGrpSpPr/>
+        <p:nvPr/>
+      </p:nvGrpSpPr>
+      <p:grpSpPr>
+        <a:xfrm>
+          <a:off x="0" y="0"/>
+          <a:ext cx="0" cy="0"/>
+          <a:chOff x="0" y="0"/>
+          <a:chExt cx="0" cy="0"/>
+        </a:xfrm>
+      </p:grpSpPr>
+      <p:sp>
+        <p:nvSpPr>
+          <p:cNvPr id="4" name="Rectangle 3">
+            <a:extLst>
+              <a:ext uri="{FF2B5EF4-FFF2-40B4-BE49-F238E27FC236}">
+                <a16:creationId xmlns:a16="http://schemas.microsoft.com/office/drawing/2014/main" id="{474646F2-29B2-4E0F-A49B-9B66535E2303}"/>
+              </a:ext>
+            </a:extLst>
+          </p:cNvPr>
+          <p:cNvSpPr/>
+          <p:nvPr/>
+        </p:nvSpPr>
+        <p:spPr>
+          <a:xfrm>
+            <a:off x="107586" y="101609"/>
+            <a:ext cx="8977256" cy="795468"/>
+          </a:xfrm>
+          <a:prstGeom prst="rect">
+            <a:avLst/>
+          </a:prstGeom>
+          <a:solidFill>
+            <a:schemeClr val="accent6">
+              <a:lumMod val="40000"/>
+              <a:lumOff val="60000"/>
+            </a:schemeClr>
+          </a:solidFill>
+          <a:ln>
+            <a:solidFill>
+              <a:schemeClr val="bg1">
+                <a:lumMod val="50000"/>
+              </a:schemeClr>
+            </a:solidFill>
+          </a:ln>
+          <a:effectLst>
+            <a:outerShdw blurRad="88900" dist="38100" dir="5400000" sx="99000" sy="99000" algn="t" rotWithShape="0">
+              <a:prstClr val="black">
+                <a:alpha val="27000"/>
+              </a:prstClr>
+            </a:outerShdw>
+          </a:effectLst>
+        </p:spPr>
+        <p:style>
+          <a:lnRef idx="2">
+            <a:schemeClr val="accent1">
+              <a:shade val="50000"/>
+            </a:schemeClr>
+          </a:lnRef>
+          <a:fillRef idx="1">
+            <a:schemeClr val="accent1"/>
+          </a:fillRef>
+          <a:effectRef idx="0">
+            <a:schemeClr val="accent1"/>
+          </a:effectRef>
+          <a:fontRef idx="minor">
+            <a:schemeClr val="lt1"/>
+          </a:fontRef>
+        </p:style>
+        <p:txBody>
+          <a:bodyPr rtlCol="0" anchor="ctr"/>
+          <a:lstStyle/>
+          <a:p>
+            <a:pPr algn="ctr"/>
+            <a:endParaRPr lang="en-GB" dirty="0"/>
+          </a:p>
+        </p:txBody>
+      </p:sp>
+      <p:sp>
+        <p:nvSpPr>
+          <p:cNvPr id="5" name="Rectangle 4">
+            <a:extLst>
+              <a:ext uri="{FF2B5EF4-FFF2-40B4-BE49-F238E27FC236}">
+                <a16:creationId xmlns:a16="http://schemas.microsoft.com/office/drawing/2014/main" id="{F52F8045-7215-4A92-A8C2-1DB0609EAFF5}"/>
+              </a:ext>
+            </a:extLst>
+          </p:cNvPr>
+          <p:cNvSpPr/>
+          <p:nvPr/>
+        </p:nvSpPr>
+        <p:spPr>
+          <a:xfrm>
+            <a:off x="193647" y="203209"/>
+            <a:ext cx="1253266" cy="613186"/>
+          </a:xfrm>
+          <a:prstGeom prst="rect">
+            <a:avLst/>
+          </a:prstGeom>
+          <a:solidFill>
+            <a:schemeClr val="bg1">
+              <a:lumMod val="95000"/>
+            </a:schemeClr>
+          </a:solidFill>
+          <a:ln w="25400">
+            <a:solidFill>
+              <a:schemeClr val="bg1">
+                <a:lumMod val="85000"/>
+              </a:schemeClr>
+            </a:solidFill>
+          </a:ln>
+        </p:spPr>
+        <p:style>
+          <a:lnRef idx="2">
+            <a:schemeClr val="accent1">
+              <a:shade val="50000"/>
+            </a:schemeClr>
+          </a:lnRef>
+          <a:fillRef idx="1">
+            <a:schemeClr val="accent1"/>
+          </a:fillRef>
+          <a:effectRef idx="0">
+            <a:schemeClr val="accent1"/>
+          </a:effectRef>
+          <a:fontRef idx="minor">
+            <a:schemeClr val="lt1"/>
+          </a:fontRef>
+        </p:style>
+        <p:txBody>
+          <a:bodyPr rtlCol="0" anchor="ctr"/>
+          <a:lstStyle/>
+          <a:p>
+            <a:pPr algn="ctr"/>
+            <a:r>
+              <a:rPr lang="en-GB" dirty="0">
+                <a:solidFill>
+                  <a:schemeClr val="bg1">
+                    <a:lumMod val="65000"/>
+                  </a:schemeClr>
+                </a:solidFill>
+              </a:rPr>
+              <a:t>[icon]</a:t>
+            </a:r>
+          </a:p>
+        </p:txBody>
+      </p:sp>
+      <p:sp>
+        <p:nvSpPr>
+          <p:cNvPr id="7" name="Rectangle 6">
+            <a:extLst>
+              <a:ext uri="{FF2B5EF4-FFF2-40B4-BE49-F238E27FC236}">
+                <a16:creationId xmlns:a16="http://schemas.microsoft.com/office/drawing/2014/main" id="{E6B2752D-9635-4126-9309-1A87DE85C2CE}"/>
+              </a:ext>
+            </a:extLst>
+          </p:cNvPr>
+          <p:cNvSpPr/>
+          <p:nvPr/>
+        </p:nvSpPr>
+        <p:spPr>
+          <a:xfrm>
+            <a:off x="107586" y="897078"/>
+            <a:ext cx="8977256" cy="5841402"/>
+          </a:xfrm>
+          <a:prstGeom prst="rect">
+            <a:avLst/>
+          </a:prstGeom>
+          <a:noFill/>
+          <a:ln>
+            <a:solidFill>
+              <a:schemeClr val="bg1">
+                <a:lumMod val="50000"/>
+              </a:schemeClr>
+            </a:solidFill>
+          </a:ln>
+        </p:spPr>
+        <p:style>
+          <a:lnRef idx="2">
+            <a:schemeClr val="accent1">
+              <a:shade val="50000"/>
+            </a:schemeClr>
+          </a:lnRef>
+          <a:fillRef idx="1">
+            <a:schemeClr val="accent1"/>
+          </a:fillRef>
+          <a:effectRef idx="0">
+            <a:schemeClr val="accent1"/>
+          </a:effectRef>
+          <a:fontRef idx="minor">
+            <a:schemeClr val="lt1"/>
+          </a:fontRef>
+        </p:style>
+        <p:txBody>
+          <a:bodyPr rtlCol="0" anchor="ctr"/>
+          <a:lstStyle/>
+          <a:p>
+            <a:pPr algn="ctr"/>
+            <a:endParaRPr lang="en-GB" dirty="0"/>
+          </a:p>
+        </p:txBody>
+      </p:sp>
+      <p:sp>
+        <p:nvSpPr>
+          <p:cNvPr id="8" name="TextBox 7">
+            <a:extLst>
+              <a:ext uri="{FF2B5EF4-FFF2-40B4-BE49-F238E27FC236}">
+                <a16:creationId xmlns:a16="http://schemas.microsoft.com/office/drawing/2014/main" id="{6D1ABD3C-5A69-4200-8E8D-EED6CCB5736A}"/>
+              </a:ext>
+            </a:extLst>
+          </p:cNvPr>
+          <p:cNvSpPr txBox="1"/>
+          <p:nvPr/>
+        </p:nvSpPr>
+        <p:spPr>
+          <a:xfrm>
+            <a:off x="1656657" y="436289"/>
+            <a:ext cx="760144" cy="369332"/>
+          </a:xfrm>
+          <a:prstGeom prst="rect">
+            <a:avLst/>
+          </a:prstGeom>
+          <a:noFill/>
+        </p:spPr>
+        <p:txBody>
+          <a:bodyPr wrap="none" rtlCol="0">
+            <a:spAutoFit/>
+          </a:bodyPr>
+          <a:lstStyle/>
+          <a:p>
+            <a:r>
+              <a:rPr lang="en-GB" u="sng" dirty="0"/>
+              <a:t>About</a:t>
+            </a:r>
+          </a:p>
+        </p:txBody>
+      </p:sp>
+      <p:sp>
+        <p:nvSpPr>
+          <p:cNvPr id="9" name="TextBox 8">
+            <a:extLst>
+              <a:ext uri="{FF2B5EF4-FFF2-40B4-BE49-F238E27FC236}">
+                <a16:creationId xmlns:a16="http://schemas.microsoft.com/office/drawing/2014/main" id="{7EE3AC39-F564-43EA-B006-A393596474BE}"/>
+              </a:ext>
+            </a:extLst>
+          </p:cNvPr>
+          <p:cNvSpPr txBox="1"/>
+          <p:nvPr/>
+        </p:nvSpPr>
+        <p:spPr>
+          <a:xfrm>
+            <a:off x="2400158" y="438081"/>
+            <a:ext cx="563488" cy="369332"/>
+          </a:xfrm>
+          <a:prstGeom prst="rect">
+            <a:avLst/>
+          </a:prstGeom>
+          <a:noFill/>
+        </p:spPr>
+        <p:txBody>
+          <a:bodyPr wrap="none" rtlCol="0">
+            <a:spAutoFit/>
+          </a:bodyPr>
+          <a:lstStyle/>
+          <a:p>
+            <a:r>
+              <a:rPr lang="en-GB" dirty="0"/>
+              <a:t>FAQ</a:t>
+            </a:r>
+          </a:p>
+        </p:txBody>
+      </p:sp>
+      <p:sp>
+        <p:nvSpPr>
+          <p:cNvPr id="36" name="Rectangle 35">
+            <a:extLst>
+              <a:ext uri="{FF2B5EF4-FFF2-40B4-BE49-F238E27FC236}">
+                <a16:creationId xmlns:a16="http://schemas.microsoft.com/office/drawing/2014/main" id="{B589E5E6-C441-44DB-8ED4-D16C34A04601}"/>
+              </a:ext>
+            </a:extLst>
+          </p:cNvPr>
+          <p:cNvSpPr/>
+          <p:nvPr/>
+        </p:nvSpPr>
+        <p:spPr>
+          <a:xfrm>
+            <a:off x="1728733" y="1231757"/>
+            <a:ext cx="5734963" cy="5431419"/>
+          </a:xfrm>
+          <a:prstGeom prst="rect">
+            <a:avLst/>
+          </a:prstGeom>
+          <a:noFill/>
+          <a:ln>
+            <a:solidFill>
+              <a:schemeClr val="bg1">
+                <a:lumMod val="85000"/>
+              </a:schemeClr>
+            </a:solidFill>
+          </a:ln>
+        </p:spPr>
+        <p:style>
+          <a:lnRef idx="2">
+            <a:schemeClr val="accent1">
+              <a:shade val="50000"/>
+            </a:schemeClr>
+          </a:lnRef>
+          <a:fillRef idx="1">
+            <a:schemeClr val="accent1"/>
+          </a:fillRef>
+          <a:effectRef idx="0">
+            <a:schemeClr val="accent1"/>
+          </a:effectRef>
+          <a:fontRef idx="minor">
+            <a:schemeClr val="lt1"/>
+          </a:fontRef>
+        </p:style>
+        <p:txBody>
+          <a:bodyPr rtlCol="0" anchor="t">
+            <a:normAutofit lnSpcReduction="10000"/>
+          </a:bodyPr>
+          <a:lstStyle/>
+          <a:p>
+            <a:r>
+              <a:rPr lang="en-GB" b="1" dirty="0">
+                <a:solidFill>
+                  <a:schemeClr val="bg1">
+                    <a:lumMod val="65000"/>
+                  </a:schemeClr>
+                </a:solidFill>
+              </a:rPr>
+              <a:t>Introduction</a:t>
+            </a:r>
+          </a:p>
+          <a:p>
+            <a:r>
+              <a:rPr lang="en-GB" sz="1600" dirty="0">
+                <a:solidFill>
+                  <a:schemeClr val="bg1">
+                    <a:lumMod val="65000"/>
+                  </a:schemeClr>
+                </a:solidFill>
+              </a:rPr>
+              <a:t>What the tool is for, bit on how it works (“uses AI and Machine Learning techniques”) etc.</a:t>
+            </a:r>
+          </a:p>
+          <a:p>
+            <a:endParaRPr lang="en-GB" dirty="0">
+              <a:solidFill>
+                <a:schemeClr val="bg1">
+                  <a:lumMod val="65000"/>
+                </a:schemeClr>
+              </a:solidFill>
+            </a:endParaRPr>
+          </a:p>
+          <a:p>
+            <a:r>
+              <a:rPr lang="en-GB" b="1" dirty="0">
+                <a:solidFill>
+                  <a:schemeClr val="bg1">
+                    <a:lumMod val="65000"/>
+                  </a:schemeClr>
+                </a:solidFill>
+              </a:rPr>
+              <a:t>Technologies and Architecture</a:t>
+            </a:r>
+          </a:p>
+          <a:p>
+            <a:r>
+              <a:rPr lang="en-GB" sz="1600" dirty="0">
+                <a:solidFill>
+                  <a:schemeClr val="bg1">
+                    <a:lumMod val="65000"/>
+                  </a:schemeClr>
+                </a:solidFill>
+              </a:rPr>
+              <a:t>Related to earlier slide; Django for the server code, Python to access Azure APIs, Selenium for functional testing, d3.js for the image editor, Bootstrap for the web design, Travis CI for the CI/CD pipeline, </a:t>
+            </a:r>
+            <a:r>
+              <a:rPr lang="en-GB" sz="1600" dirty="0" err="1">
+                <a:solidFill>
+                  <a:schemeClr val="bg1">
+                    <a:lumMod val="65000"/>
+                  </a:schemeClr>
+                </a:solidFill>
+              </a:rPr>
+              <a:t>Heroku</a:t>
+            </a:r>
+            <a:r>
+              <a:rPr lang="en-GB" sz="1600" dirty="0">
+                <a:solidFill>
+                  <a:schemeClr val="bg1">
+                    <a:lumMod val="65000"/>
+                  </a:schemeClr>
+                </a:solidFill>
+              </a:rPr>
+              <a:t> for deployment, Azure for the </a:t>
+            </a:r>
+            <a:r>
+              <a:rPr lang="en-GB" sz="1600" dirty="0" err="1">
+                <a:solidFill>
+                  <a:schemeClr val="bg1">
+                    <a:lumMod val="65000"/>
+                  </a:schemeClr>
+                </a:solidFill>
+              </a:rPr>
+              <a:t>Obj</a:t>
+            </a:r>
+            <a:r>
+              <a:rPr lang="en-GB" sz="1600" dirty="0">
+                <a:solidFill>
+                  <a:schemeClr val="bg1">
+                    <a:lumMod val="65000"/>
+                  </a:schemeClr>
+                </a:solidFill>
+              </a:rPr>
+              <a:t> Detection and OCR – anything else??</a:t>
+            </a:r>
+          </a:p>
+          <a:p>
+            <a:endParaRPr lang="en-GB" dirty="0">
+              <a:solidFill>
+                <a:schemeClr val="bg1">
+                  <a:lumMod val="65000"/>
+                </a:schemeClr>
+              </a:solidFill>
+            </a:endParaRPr>
+          </a:p>
+          <a:p>
+            <a:r>
+              <a:rPr lang="en-GB" b="1" dirty="0">
+                <a:solidFill>
+                  <a:schemeClr val="bg1">
+                    <a:lumMod val="65000"/>
+                  </a:schemeClr>
+                </a:solidFill>
+              </a:rPr>
+              <a:t>Limitations</a:t>
+            </a:r>
+          </a:p>
+          <a:p>
+            <a:r>
+              <a:rPr lang="en-GB" sz="1600" dirty="0">
+                <a:solidFill>
+                  <a:schemeClr val="bg1">
+                    <a:lumMod val="65000"/>
+                  </a:schemeClr>
+                </a:solidFill>
+              </a:rPr>
+              <a:t>Uses Azure’s Object Detection and OCR services; these are generally good, but I can’t influence their development. Also, bit about updates (i.e. they’ll be a bit ad-hoc, as it’s a personal project)</a:t>
+            </a:r>
+          </a:p>
+          <a:p>
+            <a:endParaRPr lang="en-GB" sz="1600" dirty="0">
+              <a:solidFill>
+                <a:schemeClr val="bg1">
+                  <a:lumMod val="65000"/>
+                </a:schemeClr>
+              </a:solidFill>
+            </a:endParaRPr>
+          </a:p>
+          <a:p>
+            <a:r>
+              <a:rPr lang="en-GB" b="1" dirty="0">
+                <a:solidFill>
+                  <a:schemeClr val="bg1">
+                    <a:lumMod val="65000"/>
+                  </a:schemeClr>
+                </a:solidFill>
+              </a:rPr>
+              <a:t>Development and Feedback</a:t>
+            </a:r>
+          </a:p>
+          <a:p>
+            <a:r>
+              <a:rPr lang="en-GB" sz="1600" dirty="0">
+                <a:solidFill>
+                  <a:schemeClr val="bg1">
+                    <a:lumMod val="65000"/>
+                  </a:schemeClr>
+                </a:solidFill>
+              </a:rPr>
+              <a:t>Link to </a:t>
+            </a:r>
+            <a:r>
+              <a:rPr lang="en-GB" sz="1600" dirty="0" err="1">
+                <a:solidFill>
+                  <a:schemeClr val="bg1">
+                    <a:lumMod val="65000"/>
+                  </a:schemeClr>
+                </a:solidFill>
+              </a:rPr>
+              <a:t>Github</a:t>
+            </a:r>
+            <a:r>
+              <a:rPr lang="en-GB" sz="1600" dirty="0">
+                <a:solidFill>
+                  <a:schemeClr val="bg1">
+                    <a:lumMod val="65000"/>
+                  </a:schemeClr>
+                </a:solidFill>
+              </a:rPr>
+              <a:t> repo, instructions for feedback (bugs and issues, improvements)</a:t>
+            </a:r>
+            <a:endParaRPr lang="en-GB" dirty="0">
+              <a:solidFill>
+                <a:schemeClr val="bg1">
+                  <a:lumMod val="65000"/>
+                </a:schemeClr>
+              </a:solidFill>
+            </a:endParaRPr>
+          </a:p>
+          <a:p>
+            <a:endParaRPr lang="en-GB" dirty="0">
+              <a:solidFill>
+                <a:schemeClr val="bg1">
+                  <a:lumMod val="65000"/>
+                </a:schemeClr>
+              </a:solidFill>
+            </a:endParaRPr>
+          </a:p>
+          <a:p>
+            <a:r>
+              <a:rPr lang="en-GB" b="1" dirty="0">
+                <a:solidFill>
+                  <a:schemeClr val="bg1">
+                    <a:lumMod val="65000"/>
+                  </a:schemeClr>
+                </a:solidFill>
+              </a:rPr>
+              <a:t>Version information</a:t>
+            </a:r>
+          </a:p>
+          <a:p>
+            <a:r>
+              <a:rPr lang="en-GB" sz="1600" dirty="0">
+                <a:solidFill>
+                  <a:schemeClr val="bg1">
+                    <a:lumMod val="65000"/>
+                  </a:schemeClr>
+                </a:solidFill>
+              </a:rPr>
+              <a:t>Version </a:t>
+            </a:r>
+            <a:r>
+              <a:rPr lang="en-GB" sz="1600" dirty="0" err="1">
+                <a:solidFill>
+                  <a:schemeClr val="bg1">
+                    <a:lumMod val="65000"/>
+                  </a:schemeClr>
+                </a:solidFill>
+              </a:rPr>
+              <a:t>num</a:t>
+            </a:r>
+            <a:r>
+              <a:rPr lang="en-GB" sz="1600" dirty="0">
+                <a:solidFill>
+                  <a:schemeClr val="bg1">
+                    <a:lumMod val="65000"/>
+                  </a:schemeClr>
+                </a:solidFill>
+              </a:rPr>
+              <a:t>, date and release / change summary</a:t>
+            </a:r>
+          </a:p>
+        </p:txBody>
+      </p:sp>
+      <p:sp>
+        <p:nvSpPr>
+          <p:cNvPr id="45" name="Rectangle 44">
+            <a:extLst>
+              <a:ext uri="{FF2B5EF4-FFF2-40B4-BE49-F238E27FC236}">
+                <a16:creationId xmlns:a16="http://schemas.microsoft.com/office/drawing/2014/main" id="{1EDE913D-829A-48A3-9DEE-F30FFCFF262A}"/>
+              </a:ext>
+            </a:extLst>
+          </p:cNvPr>
+          <p:cNvSpPr/>
+          <p:nvPr/>
+        </p:nvSpPr>
+        <p:spPr>
+          <a:xfrm>
+            <a:off x="9203765" y="101609"/>
+            <a:ext cx="2880649" cy="6636871"/>
+          </a:xfrm>
+          <a:prstGeom prst="rect">
+            <a:avLst/>
+          </a:prstGeom>
+          <a:noFill/>
+          <a:ln>
+            <a:solidFill>
+              <a:schemeClr val="bg1">
+                <a:lumMod val="50000"/>
+              </a:schemeClr>
+            </a:solidFill>
+          </a:ln>
+        </p:spPr>
+        <p:style>
+          <a:lnRef idx="2">
+            <a:schemeClr val="accent1">
+              <a:shade val="50000"/>
+            </a:schemeClr>
+          </a:lnRef>
+          <a:fillRef idx="1">
+            <a:schemeClr val="accent1"/>
+          </a:fillRef>
+          <a:effectRef idx="0">
+            <a:schemeClr val="accent1"/>
+          </a:effectRef>
+          <a:fontRef idx="minor">
+            <a:schemeClr val="lt1"/>
+          </a:fontRef>
+        </p:style>
+        <p:txBody>
+          <a:bodyPr rtlCol="0" anchor="t"/>
+          <a:lstStyle/>
+          <a:p>
+            <a:r>
+              <a:rPr lang="en-GB" b="1" dirty="0">
+                <a:solidFill>
+                  <a:schemeClr val="tx1">
+                    <a:lumMod val="50000"/>
+                    <a:lumOff val="50000"/>
+                  </a:schemeClr>
+                </a:solidFill>
+              </a:rPr>
+              <a:t>Notes</a:t>
+            </a:r>
+          </a:p>
+          <a:p>
+            <a:pPr marL="171450" indent="-171450">
+              <a:spcAft>
+                <a:spcPts val="400"/>
+              </a:spcAft>
+              <a:buFont typeface="Arial" panose="020B0604020202020204" pitchFamily="34" charset="0"/>
+              <a:buChar char="•"/>
+            </a:pPr>
+            <a:r>
+              <a:rPr lang="en-GB" sz="1200" dirty="0">
+                <a:solidFill>
+                  <a:schemeClr val="tx1">
+                    <a:lumMod val="50000"/>
+                    <a:lumOff val="50000"/>
+                  </a:schemeClr>
+                </a:solidFill>
+              </a:rPr>
+              <a:t>Item (1) should be templated across all pages</a:t>
+            </a:r>
+          </a:p>
+          <a:p>
+            <a:pPr marL="171450" indent="-171450">
+              <a:spcAft>
+                <a:spcPts val="400"/>
+              </a:spcAft>
+              <a:buFont typeface="Arial" panose="020B0604020202020204" pitchFamily="34" charset="0"/>
+              <a:buChar char="•"/>
+            </a:pPr>
+            <a:r>
+              <a:rPr lang="en-GB" sz="1200" dirty="0">
+                <a:solidFill>
+                  <a:schemeClr val="tx1">
+                    <a:lumMod val="50000"/>
+                    <a:lumOff val="50000"/>
+                  </a:schemeClr>
+                </a:solidFill>
+              </a:rPr>
+              <a:t>Put collapses on each of the headers?  Or a list of items at the top, with links to each paragraph?</a:t>
+            </a:r>
+          </a:p>
+          <a:p>
+            <a:pPr marL="628650" lvl="1" indent="-171450">
+              <a:spcAft>
+                <a:spcPts val="400"/>
+              </a:spcAft>
+              <a:buFont typeface="Arial" panose="020B0604020202020204" pitchFamily="34" charset="0"/>
+              <a:buChar char="•"/>
+            </a:pPr>
+            <a:r>
+              <a:rPr lang="en-GB" sz="1200" dirty="0">
+                <a:solidFill>
+                  <a:schemeClr val="tx1">
+                    <a:lumMod val="50000"/>
+                    <a:lumOff val="50000"/>
+                  </a:schemeClr>
+                </a:solidFill>
+              </a:rPr>
+              <a:t>May not be useful if the text is visible easily on one page</a:t>
+            </a:r>
+          </a:p>
+        </p:txBody>
+      </p:sp>
+      <p:sp>
+        <p:nvSpPr>
+          <p:cNvPr id="46" name="Oval 45">
+            <a:extLst>
+              <a:ext uri="{FF2B5EF4-FFF2-40B4-BE49-F238E27FC236}">
+                <a16:creationId xmlns:a16="http://schemas.microsoft.com/office/drawing/2014/main" id="{65F0A259-6623-4273-A4B5-437BDDE6F1A9}"/>
+              </a:ext>
+            </a:extLst>
+          </p:cNvPr>
+          <p:cNvSpPr>
+            <a:spLocks noChangeAspect="1"/>
+          </p:cNvSpPr>
+          <p:nvPr/>
+        </p:nvSpPr>
+        <p:spPr>
+          <a:xfrm>
+            <a:off x="1667838" y="203209"/>
+            <a:ext cx="285008" cy="284495"/>
+          </a:xfrm>
+          <a:prstGeom prst="ellipse">
+            <a:avLst/>
+          </a:prstGeom>
+          <a:solidFill>
+            <a:srgbClr val="FFFF00"/>
+          </a:solidFill>
+          <a:ln w="25400">
+            <a:solidFill>
+              <a:schemeClr val="tx1">
+                <a:lumMod val="75000"/>
+                <a:lumOff val="25000"/>
+              </a:schemeClr>
+            </a:solidFill>
+          </a:ln>
+        </p:spPr>
+        <p:style>
+          <a:lnRef idx="2">
+            <a:schemeClr val="accent1">
+              <a:shade val="50000"/>
+            </a:schemeClr>
+          </a:lnRef>
+          <a:fillRef idx="1">
+            <a:schemeClr val="accent1"/>
+          </a:fillRef>
+          <a:effectRef idx="0">
+            <a:schemeClr val="accent1"/>
+          </a:effectRef>
+          <a:fontRef idx="minor">
+            <a:schemeClr val="lt1"/>
+          </a:fontRef>
+        </p:style>
+        <p:txBody>
+          <a:bodyPr rtlCol="0" anchor="ctr"/>
+          <a:lstStyle/>
+          <a:p>
+            <a:pPr algn="ctr"/>
+            <a:r>
+              <a:rPr lang="en-GB" sz="1200" b="1" dirty="0">
+                <a:solidFill>
+                  <a:schemeClr val="tx1">
+                    <a:lumMod val="75000"/>
+                    <a:lumOff val="25000"/>
+                  </a:schemeClr>
+                </a:solidFill>
+              </a:rPr>
+              <a:t>1</a:t>
+            </a:r>
+          </a:p>
+        </p:txBody>
+      </p:sp>
+      <p:sp>
+        <p:nvSpPr>
+          <p:cNvPr id="47" name="Oval 46">
+            <a:extLst>
+              <a:ext uri="{FF2B5EF4-FFF2-40B4-BE49-F238E27FC236}">
+                <a16:creationId xmlns:a16="http://schemas.microsoft.com/office/drawing/2014/main" id="{E419682C-8A2D-42B7-A0FB-EE2C43FEE65D}"/>
+              </a:ext>
+            </a:extLst>
+          </p:cNvPr>
+          <p:cNvSpPr>
+            <a:spLocks noChangeAspect="1"/>
+          </p:cNvSpPr>
+          <p:nvPr/>
+        </p:nvSpPr>
+        <p:spPr>
+          <a:xfrm>
+            <a:off x="1441720" y="1276817"/>
+            <a:ext cx="285008" cy="284495"/>
+          </a:xfrm>
+          <a:prstGeom prst="ellipse">
+            <a:avLst/>
+          </a:prstGeom>
+          <a:solidFill>
+            <a:srgbClr val="FFFF00"/>
+          </a:solidFill>
+          <a:ln w="25400">
+            <a:solidFill>
+              <a:schemeClr val="tx1">
+                <a:lumMod val="75000"/>
+                <a:lumOff val="25000"/>
+              </a:schemeClr>
+            </a:solidFill>
+          </a:ln>
+        </p:spPr>
+        <p:style>
+          <a:lnRef idx="2">
+            <a:schemeClr val="accent1">
+              <a:shade val="50000"/>
+            </a:schemeClr>
+          </a:lnRef>
+          <a:fillRef idx="1">
+            <a:schemeClr val="accent1"/>
+          </a:fillRef>
+          <a:effectRef idx="0">
+            <a:schemeClr val="accent1"/>
+          </a:effectRef>
+          <a:fontRef idx="minor">
+            <a:schemeClr val="lt1"/>
+          </a:fontRef>
+        </p:style>
+        <p:txBody>
+          <a:bodyPr rtlCol="0" anchor="ctr"/>
+          <a:lstStyle/>
+          <a:p>
+            <a:pPr algn="ctr"/>
+            <a:r>
+              <a:rPr lang="en-GB" sz="1200" b="1" dirty="0">
+                <a:solidFill>
+                  <a:schemeClr val="tx1">
+                    <a:lumMod val="75000"/>
+                    <a:lumOff val="25000"/>
+                  </a:schemeClr>
+                </a:solidFill>
+              </a:rPr>
+              <a:t>2</a:t>
+            </a:r>
+          </a:p>
+        </p:txBody>
+      </p:sp>
+      <p:sp>
+        <p:nvSpPr>
+          <p:cNvPr id="42" name="Oval 41">
+            <a:extLst>
+              <a:ext uri="{FF2B5EF4-FFF2-40B4-BE49-F238E27FC236}">
+                <a16:creationId xmlns:a16="http://schemas.microsoft.com/office/drawing/2014/main" id="{E419682C-8A2D-42B7-A0FB-EE2C43FEE65D}"/>
+              </a:ext>
+            </a:extLst>
+          </p:cNvPr>
+          <p:cNvSpPr>
+            <a:spLocks noChangeAspect="1"/>
+          </p:cNvSpPr>
+          <p:nvPr/>
+        </p:nvSpPr>
+        <p:spPr>
+          <a:xfrm>
+            <a:off x="1441720" y="2201369"/>
+            <a:ext cx="285008" cy="284495"/>
+          </a:xfrm>
+          <a:prstGeom prst="ellipse">
+            <a:avLst/>
+          </a:prstGeom>
+          <a:solidFill>
+            <a:srgbClr val="FFFF00"/>
+          </a:solidFill>
+          <a:ln w="25400">
+            <a:solidFill>
+              <a:schemeClr val="tx1">
+                <a:lumMod val="75000"/>
+                <a:lumOff val="25000"/>
+              </a:schemeClr>
+            </a:solidFill>
+          </a:ln>
+        </p:spPr>
+        <p:style>
+          <a:lnRef idx="2">
+            <a:schemeClr val="accent1">
+              <a:shade val="50000"/>
+            </a:schemeClr>
+          </a:lnRef>
+          <a:fillRef idx="1">
+            <a:schemeClr val="accent1"/>
+          </a:fillRef>
+          <a:effectRef idx="0">
+            <a:schemeClr val="accent1"/>
+          </a:effectRef>
+          <a:fontRef idx="minor">
+            <a:schemeClr val="lt1"/>
+          </a:fontRef>
+        </p:style>
+        <p:txBody>
+          <a:bodyPr rtlCol="0" anchor="ctr"/>
+          <a:lstStyle/>
+          <a:p>
+            <a:pPr algn="ctr"/>
+            <a:r>
+              <a:rPr lang="en-GB" sz="1200" b="1" dirty="0">
+                <a:solidFill>
+                  <a:schemeClr val="tx1">
+                    <a:lumMod val="75000"/>
+                    <a:lumOff val="25000"/>
+                  </a:schemeClr>
+                </a:solidFill>
+              </a:rPr>
+              <a:t>3</a:t>
+            </a:r>
+          </a:p>
+        </p:txBody>
+      </p:sp>
+      <p:sp>
+        <p:nvSpPr>
+          <p:cNvPr id="43" name="Oval 42">
+            <a:extLst>
+              <a:ext uri="{FF2B5EF4-FFF2-40B4-BE49-F238E27FC236}">
+                <a16:creationId xmlns:a16="http://schemas.microsoft.com/office/drawing/2014/main" id="{E419682C-8A2D-42B7-A0FB-EE2C43FEE65D}"/>
+              </a:ext>
+            </a:extLst>
+          </p:cNvPr>
+          <p:cNvSpPr>
+            <a:spLocks noChangeAspect="1"/>
+          </p:cNvSpPr>
+          <p:nvPr/>
+        </p:nvSpPr>
+        <p:spPr>
+          <a:xfrm>
+            <a:off x="1441720" y="3780630"/>
+            <a:ext cx="285008" cy="284495"/>
+          </a:xfrm>
+          <a:prstGeom prst="ellipse">
+            <a:avLst/>
+          </a:prstGeom>
+          <a:solidFill>
+            <a:srgbClr val="FFFF00"/>
+          </a:solidFill>
+          <a:ln w="25400">
+            <a:solidFill>
+              <a:schemeClr val="tx1">
+                <a:lumMod val="75000"/>
+                <a:lumOff val="25000"/>
+              </a:schemeClr>
+            </a:solidFill>
+          </a:ln>
+        </p:spPr>
+        <p:style>
+          <a:lnRef idx="2">
+            <a:schemeClr val="accent1">
+              <a:shade val="50000"/>
+            </a:schemeClr>
+          </a:lnRef>
+          <a:fillRef idx="1">
+            <a:schemeClr val="accent1"/>
+          </a:fillRef>
+          <a:effectRef idx="0">
+            <a:schemeClr val="accent1"/>
+          </a:effectRef>
+          <a:fontRef idx="minor">
+            <a:schemeClr val="lt1"/>
+          </a:fontRef>
+        </p:style>
+        <p:txBody>
+          <a:bodyPr rtlCol="0" anchor="ctr"/>
+          <a:lstStyle/>
+          <a:p>
+            <a:pPr algn="ctr"/>
+            <a:r>
+              <a:rPr lang="en-GB" sz="1200" b="1" dirty="0">
+                <a:solidFill>
+                  <a:schemeClr val="tx1">
+                    <a:lumMod val="75000"/>
+                    <a:lumOff val="25000"/>
+                  </a:schemeClr>
+                </a:solidFill>
+              </a:rPr>
+              <a:t>4</a:t>
+            </a:r>
+          </a:p>
+        </p:txBody>
+      </p:sp>
+      <p:sp>
+        <p:nvSpPr>
+          <p:cNvPr id="44" name="Oval 43">
+            <a:extLst>
+              <a:ext uri="{FF2B5EF4-FFF2-40B4-BE49-F238E27FC236}">
+                <a16:creationId xmlns:a16="http://schemas.microsoft.com/office/drawing/2014/main" id="{E419682C-8A2D-42B7-A0FB-EE2C43FEE65D}"/>
+              </a:ext>
+            </a:extLst>
+          </p:cNvPr>
+          <p:cNvSpPr>
+            <a:spLocks noChangeAspect="1"/>
+          </p:cNvSpPr>
+          <p:nvPr/>
+        </p:nvSpPr>
+        <p:spPr>
+          <a:xfrm>
+            <a:off x="1441720" y="4894728"/>
+            <a:ext cx="285008" cy="284495"/>
+          </a:xfrm>
+          <a:prstGeom prst="ellipse">
+            <a:avLst/>
+          </a:prstGeom>
+          <a:solidFill>
+            <a:srgbClr val="FFFF00"/>
+          </a:solidFill>
+          <a:ln w="25400">
+            <a:solidFill>
+              <a:schemeClr val="tx1">
+                <a:lumMod val="75000"/>
+                <a:lumOff val="25000"/>
+              </a:schemeClr>
+            </a:solidFill>
+          </a:ln>
+        </p:spPr>
+        <p:style>
+          <a:lnRef idx="2">
+            <a:schemeClr val="accent1">
+              <a:shade val="50000"/>
+            </a:schemeClr>
+          </a:lnRef>
+          <a:fillRef idx="1">
+            <a:schemeClr val="accent1"/>
+          </a:fillRef>
+          <a:effectRef idx="0">
+            <a:schemeClr val="accent1"/>
+          </a:effectRef>
+          <a:fontRef idx="minor">
+            <a:schemeClr val="lt1"/>
+          </a:fontRef>
+        </p:style>
+        <p:txBody>
+          <a:bodyPr rtlCol="0" anchor="ctr"/>
+          <a:lstStyle/>
+          <a:p>
+            <a:pPr algn="ctr"/>
+            <a:r>
+              <a:rPr lang="en-GB" sz="1200" b="1" dirty="0">
+                <a:solidFill>
+                  <a:schemeClr val="tx1">
+                    <a:lumMod val="75000"/>
+                    <a:lumOff val="25000"/>
+                  </a:schemeClr>
+                </a:solidFill>
+              </a:rPr>
+              <a:t>5</a:t>
+            </a:r>
+          </a:p>
+        </p:txBody>
+      </p:sp>
+      <p:sp>
+        <p:nvSpPr>
+          <p:cNvPr id="51" name="Oval 50">
+            <a:extLst>
+              <a:ext uri="{FF2B5EF4-FFF2-40B4-BE49-F238E27FC236}">
+                <a16:creationId xmlns:a16="http://schemas.microsoft.com/office/drawing/2014/main" id="{E419682C-8A2D-42B7-A0FB-EE2C43FEE65D}"/>
+              </a:ext>
+            </a:extLst>
+          </p:cNvPr>
+          <p:cNvSpPr>
+            <a:spLocks noChangeAspect="1"/>
+          </p:cNvSpPr>
+          <p:nvPr/>
+        </p:nvSpPr>
+        <p:spPr>
+          <a:xfrm>
+            <a:off x="1441720" y="5838330"/>
+            <a:ext cx="285008" cy="284495"/>
+          </a:xfrm>
+          <a:prstGeom prst="ellipse">
+            <a:avLst/>
+          </a:prstGeom>
+          <a:solidFill>
+            <a:srgbClr val="FFFF00"/>
+          </a:solidFill>
+          <a:ln w="25400">
+            <a:solidFill>
+              <a:schemeClr val="tx1">
+                <a:lumMod val="75000"/>
+                <a:lumOff val="25000"/>
+              </a:schemeClr>
+            </a:solidFill>
+          </a:ln>
+        </p:spPr>
+        <p:style>
+          <a:lnRef idx="2">
+            <a:schemeClr val="accent1">
+              <a:shade val="50000"/>
+            </a:schemeClr>
+          </a:lnRef>
+          <a:fillRef idx="1">
+            <a:schemeClr val="accent1"/>
+          </a:fillRef>
+          <a:effectRef idx="0">
+            <a:schemeClr val="accent1"/>
+          </a:effectRef>
+          <a:fontRef idx="minor">
+            <a:schemeClr val="lt1"/>
+          </a:fontRef>
+        </p:style>
+        <p:txBody>
+          <a:bodyPr rtlCol="0" anchor="ctr"/>
+          <a:lstStyle/>
+          <a:p>
+            <a:pPr algn="ctr"/>
+            <a:r>
+              <a:rPr lang="en-GB" sz="1200" b="1" dirty="0">
+                <a:solidFill>
+                  <a:schemeClr val="tx1">
+                    <a:lumMod val="75000"/>
+                    <a:lumOff val="25000"/>
+                  </a:schemeClr>
+                </a:solidFill>
+              </a:rPr>
+              <a:t>6</a:t>
+            </a:r>
+          </a:p>
+        </p:txBody>
+      </p:sp>
+    </p:spTree>
+    <p:extLst>
+      <p:ext uri="{BB962C8B-B14F-4D97-AF65-F5344CB8AC3E}">
+        <p14:creationId xmlns:p14="http://schemas.microsoft.com/office/powerpoint/2010/main" val="873542540"/>
+      </p:ext>
+    </p:extLst>
+  </p:cSld>
+  <p:clrMapOvr>
+    <a:masterClrMapping/>
+  </p:clrMapOvr>
+</p:sld>
+</file>
+
+<file path=ppt/slides/slide21.xml><?xml version="1.0" encoding="utf-8"?>
+<p:sld xmlns:a="http://schemas.openxmlformats.org/drawingml/2006/main" xmlns:r="http://schemas.openxmlformats.org/officeDocument/2006/relationships" xmlns:p="http://schemas.openxmlformats.org/presentationml/2006/main">
+  <p:cSld>
+    <p:spTree>
+      <p:nvGrpSpPr>
+        <p:cNvPr id="1" name=""/>
+        <p:cNvGrpSpPr/>
+        <p:nvPr/>
+      </p:nvGrpSpPr>
+      <p:grpSpPr>
+        <a:xfrm>
+          <a:off x="0" y="0"/>
+          <a:ext cx="0" cy="0"/>
+          <a:chOff x="0" y="0"/>
+          <a:chExt cx="0" cy="0"/>
+        </a:xfrm>
+      </p:grpSpPr>
+      <p:sp>
+        <p:nvSpPr>
+          <p:cNvPr id="2" name="Title 1">
+            <a:extLst>
+              <a:ext uri="{FF2B5EF4-FFF2-40B4-BE49-F238E27FC236}">
+                <a16:creationId xmlns:a16="http://schemas.microsoft.com/office/drawing/2014/main" id="{A6ECEA39-C85F-4DD6-9557-338622D09926}"/>
+              </a:ext>
+            </a:extLst>
+          </p:cNvPr>
+          <p:cNvSpPr>
+            <a:spLocks noGrp="1"/>
+          </p:cNvSpPr>
+          <p:nvPr>
+            <p:ph type="title"/>
+          </p:nvPr>
+        </p:nvSpPr>
+        <p:spPr/>
+        <p:txBody>
+          <a:bodyPr/>
+          <a:lstStyle/>
+          <a:p>
+            <a:r>
+              <a:rPr lang="en-GB" dirty="0"/>
+              <a:t>FAQ page</a:t>
+            </a:r>
+          </a:p>
+        </p:txBody>
+      </p:sp>
+      <p:sp>
+        <p:nvSpPr>
+          <p:cNvPr id="3" name="Content Placeholder 2">
+            <a:extLst>
+              <a:ext uri="{FF2B5EF4-FFF2-40B4-BE49-F238E27FC236}">
+                <a16:creationId xmlns:a16="http://schemas.microsoft.com/office/drawing/2014/main" id="{74E41E85-F90A-4D8C-A76B-20DADD54E48C}"/>
+              </a:ext>
+            </a:extLst>
+          </p:cNvPr>
+          <p:cNvSpPr>
+            <a:spLocks noGrp="1"/>
+          </p:cNvSpPr>
+          <p:nvPr>
+            <p:ph idx="1"/>
+          </p:nvPr>
+        </p:nvSpPr>
+        <p:spPr>
+          <a:xfrm>
+            <a:off x="838202" y="1494430"/>
+            <a:ext cx="10515600" cy="4682533"/>
+          </a:xfrm>
+        </p:spPr>
+        <p:txBody>
+          <a:bodyPr>
+            <a:normAutofit fontScale="92500" lnSpcReduction="10000"/>
+          </a:bodyPr>
+          <a:lstStyle/>
+          <a:p>
+            <a:r>
+              <a:rPr lang="en-GB" dirty="0"/>
+              <a:t>Largely static text content</a:t>
+            </a:r>
+          </a:p>
+          <a:p>
+            <a:r>
+              <a:rPr lang="en-GB" dirty="0"/>
+              <a:t>Main questions list; either hyperlinked at top to more info, or collapsible paragraphs</a:t>
+            </a:r>
+          </a:p>
+          <a:p>
+            <a:r>
+              <a:rPr lang="en-GB" dirty="0"/>
+              <a:t>Some areas to cover:</a:t>
+            </a:r>
+          </a:p>
+          <a:p>
+            <a:pPr lvl="1"/>
+            <a:r>
+              <a:rPr lang="en-GB" dirty="0"/>
+              <a:t>Storage of images – Heroku doesn’t, but Azure (probably) does</a:t>
+            </a:r>
+          </a:p>
+          <a:p>
+            <a:pPr lvl="1"/>
+            <a:r>
+              <a:rPr lang="en-GB" dirty="0"/>
+              <a:t>Limitations on Azure services (e.g. number of images / day?)</a:t>
+            </a:r>
+          </a:p>
+          <a:p>
+            <a:pPr lvl="1"/>
+            <a:r>
+              <a:rPr lang="en-GB" dirty="0"/>
+              <a:t>Slow load-time on Heroku</a:t>
+            </a:r>
+          </a:p>
+          <a:p>
+            <a:pPr lvl="1"/>
+            <a:r>
+              <a:rPr lang="en-GB" dirty="0"/>
+              <a:t>Use on mobile devices (can be done, but not designed for this)</a:t>
+            </a:r>
+          </a:p>
+          <a:p>
+            <a:pPr lvl="1"/>
+            <a:r>
+              <a:rPr lang="en-GB" dirty="0"/>
+              <a:t>Quality of Azure services (e.g. OCR is very good, Post-it finder is so-so)</a:t>
+            </a:r>
+          </a:p>
+          <a:p>
+            <a:pPr lvl="1"/>
+            <a:r>
+              <a:rPr lang="en-GB" dirty="0"/>
+              <a:t>Cookies (i.e. there aren’t any)</a:t>
+            </a:r>
+          </a:p>
+          <a:p>
+            <a:pPr lvl="1"/>
+            <a:r>
+              <a:rPr lang="en-GB" dirty="0"/>
+              <a:t>Browser compatibility (e.g. won’t work properly on older browsers)</a:t>
+            </a:r>
+          </a:p>
+          <a:p>
+            <a:pPr lvl="1"/>
+            <a:r>
+              <a:rPr lang="en-GB" dirty="0"/>
+              <a:t>Support (e.g. “best effort”; how to raise a bug, provide feedback etc.)</a:t>
+            </a:r>
+          </a:p>
+          <a:p>
+            <a:pPr lvl="1"/>
+            <a:r>
+              <a:rPr lang="en-GB" dirty="0">
+                <a:solidFill>
+                  <a:srgbClr val="FF0000"/>
+                </a:solidFill>
+              </a:rPr>
+              <a:t>…what else?</a:t>
+            </a:r>
+          </a:p>
+          <a:p>
+            <a:pPr lvl="1"/>
+            <a:endParaRPr lang="en-GB" dirty="0"/>
+          </a:p>
+        </p:txBody>
+      </p:sp>
+    </p:spTree>
+    <p:extLst>
+      <p:ext uri="{BB962C8B-B14F-4D97-AF65-F5344CB8AC3E}">
+        <p14:creationId xmlns:p14="http://schemas.microsoft.com/office/powerpoint/2010/main" val="4158538450"/>
+      </p:ext>
+    </p:extLst>
+  </p:cSld>
+  <p:clrMapOvr>
+    <a:masterClrMapping/>
+  </p:clrMapOvr>
+</p:sld>
+</file>
+
+<file path=ppt/slides/slide22.xml><?xml version="1.0" encoding="utf-8"?>
+<p:sld xmlns:a="http://schemas.openxmlformats.org/drawingml/2006/main" xmlns:r="http://schemas.openxmlformats.org/officeDocument/2006/relationships" xmlns:p="http://schemas.openxmlformats.org/presentationml/2006/main">
+  <p:cSld>
+    <p:spTree>
+      <p:nvGrpSpPr>
+        <p:cNvPr id="1" name=""/>
+        <p:cNvGrpSpPr/>
+        <p:nvPr/>
+      </p:nvGrpSpPr>
+      <p:grpSpPr>
+        <a:xfrm>
+          <a:off x="0" y="0"/>
+          <a:ext cx="0" cy="0"/>
+          <a:chOff x="0" y="0"/>
+          <a:chExt cx="0" cy="0"/>
+        </a:xfrm>
+      </p:grpSpPr>
+      <p:sp>
+        <p:nvSpPr>
+          <p:cNvPr id="4" name="Rectangle 3">
+            <a:extLst>
+              <a:ext uri="{FF2B5EF4-FFF2-40B4-BE49-F238E27FC236}">
+                <a16:creationId xmlns:a16="http://schemas.microsoft.com/office/drawing/2014/main" id="{474646F2-29B2-4E0F-A49B-9B66535E2303}"/>
+              </a:ext>
+            </a:extLst>
+          </p:cNvPr>
+          <p:cNvSpPr/>
+          <p:nvPr/>
+        </p:nvSpPr>
+        <p:spPr>
+          <a:xfrm>
+            <a:off x="107586" y="101609"/>
+            <a:ext cx="8977256" cy="795468"/>
+          </a:xfrm>
+          <a:prstGeom prst="rect">
+            <a:avLst/>
+          </a:prstGeom>
+          <a:solidFill>
+            <a:schemeClr val="accent6">
+              <a:lumMod val="40000"/>
+              <a:lumOff val="60000"/>
+            </a:schemeClr>
+          </a:solidFill>
+          <a:ln>
+            <a:solidFill>
+              <a:schemeClr val="bg1">
+                <a:lumMod val="50000"/>
+              </a:schemeClr>
+            </a:solidFill>
+          </a:ln>
+          <a:effectLst>
+            <a:outerShdw blurRad="88900" dist="38100" dir="5400000" sx="99000" sy="99000" algn="t" rotWithShape="0">
+              <a:prstClr val="black">
+                <a:alpha val="27000"/>
+              </a:prstClr>
+            </a:outerShdw>
+          </a:effectLst>
+        </p:spPr>
+        <p:style>
+          <a:lnRef idx="2">
+            <a:schemeClr val="accent1">
+              <a:shade val="50000"/>
+            </a:schemeClr>
+          </a:lnRef>
+          <a:fillRef idx="1">
+            <a:schemeClr val="accent1"/>
+          </a:fillRef>
+          <a:effectRef idx="0">
+            <a:schemeClr val="accent1"/>
+          </a:effectRef>
+          <a:fontRef idx="minor">
+            <a:schemeClr val="lt1"/>
+          </a:fontRef>
+        </p:style>
+        <p:txBody>
+          <a:bodyPr rtlCol="0" anchor="ctr"/>
+          <a:lstStyle/>
+          <a:p>
+            <a:pPr algn="ctr"/>
+            <a:endParaRPr lang="en-GB" dirty="0"/>
+          </a:p>
+        </p:txBody>
+      </p:sp>
+      <p:sp>
+        <p:nvSpPr>
+          <p:cNvPr id="5" name="Rectangle 4">
+            <a:extLst>
+              <a:ext uri="{FF2B5EF4-FFF2-40B4-BE49-F238E27FC236}">
+                <a16:creationId xmlns:a16="http://schemas.microsoft.com/office/drawing/2014/main" id="{F52F8045-7215-4A92-A8C2-1DB0609EAFF5}"/>
+              </a:ext>
+            </a:extLst>
+          </p:cNvPr>
+          <p:cNvSpPr/>
+          <p:nvPr/>
+        </p:nvSpPr>
+        <p:spPr>
+          <a:xfrm>
+            <a:off x="193647" y="203209"/>
+            <a:ext cx="1253266" cy="613186"/>
+          </a:xfrm>
+          <a:prstGeom prst="rect">
+            <a:avLst/>
+          </a:prstGeom>
+          <a:solidFill>
+            <a:schemeClr val="bg1">
+              <a:lumMod val="95000"/>
+            </a:schemeClr>
+          </a:solidFill>
+          <a:ln w="25400">
+            <a:solidFill>
+              <a:schemeClr val="bg1">
+                <a:lumMod val="85000"/>
+              </a:schemeClr>
+            </a:solidFill>
+          </a:ln>
+        </p:spPr>
+        <p:style>
+          <a:lnRef idx="2">
+            <a:schemeClr val="accent1">
+              <a:shade val="50000"/>
+            </a:schemeClr>
+          </a:lnRef>
+          <a:fillRef idx="1">
+            <a:schemeClr val="accent1"/>
+          </a:fillRef>
+          <a:effectRef idx="0">
+            <a:schemeClr val="accent1"/>
+          </a:effectRef>
+          <a:fontRef idx="minor">
+            <a:schemeClr val="lt1"/>
+          </a:fontRef>
+        </p:style>
+        <p:txBody>
+          <a:bodyPr rtlCol="0" anchor="ctr"/>
+          <a:lstStyle/>
+          <a:p>
+            <a:pPr algn="ctr"/>
+            <a:r>
+              <a:rPr lang="en-GB" dirty="0">
+                <a:solidFill>
+                  <a:schemeClr val="bg1">
+                    <a:lumMod val="65000"/>
+                  </a:schemeClr>
+                </a:solidFill>
+              </a:rPr>
+              <a:t>[icon]</a:t>
+            </a:r>
+          </a:p>
+        </p:txBody>
+      </p:sp>
+      <p:sp>
+        <p:nvSpPr>
+          <p:cNvPr id="7" name="Rectangle 6">
+            <a:extLst>
+              <a:ext uri="{FF2B5EF4-FFF2-40B4-BE49-F238E27FC236}">
+                <a16:creationId xmlns:a16="http://schemas.microsoft.com/office/drawing/2014/main" id="{E6B2752D-9635-4126-9309-1A87DE85C2CE}"/>
+              </a:ext>
+            </a:extLst>
+          </p:cNvPr>
+          <p:cNvSpPr/>
+          <p:nvPr/>
+        </p:nvSpPr>
+        <p:spPr>
+          <a:xfrm>
+            <a:off x="107586" y="897078"/>
+            <a:ext cx="8977256" cy="5841402"/>
+          </a:xfrm>
+          <a:prstGeom prst="rect">
+            <a:avLst/>
+          </a:prstGeom>
+          <a:noFill/>
+          <a:ln>
+            <a:solidFill>
+              <a:schemeClr val="bg1">
+                <a:lumMod val="50000"/>
+              </a:schemeClr>
+            </a:solidFill>
+          </a:ln>
+        </p:spPr>
+        <p:style>
+          <a:lnRef idx="2">
+            <a:schemeClr val="accent1">
+              <a:shade val="50000"/>
+            </a:schemeClr>
+          </a:lnRef>
+          <a:fillRef idx="1">
+            <a:schemeClr val="accent1"/>
+          </a:fillRef>
+          <a:effectRef idx="0">
+            <a:schemeClr val="accent1"/>
+          </a:effectRef>
+          <a:fontRef idx="minor">
+            <a:schemeClr val="lt1"/>
+          </a:fontRef>
+        </p:style>
+        <p:txBody>
+          <a:bodyPr rtlCol="0" anchor="ctr"/>
+          <a:lstStyle/>
+          <a:p>
+            <a:pPr algn="ctr"/>
+            <a:endParaRPr lang="en-GB" dirty="0"/>
+          </a:p>
+        </p:txBody>
+      </p:sp>
+      <p:sp>
+        <p:nvSpPr>
+          <p:cNvPr id="8" name="TextBox 7">
+            <a:extLst>
+              <a:ext uri="{FF2B5EF4-FFF2-40B4-BE49-F238E27FC236}">
+                <a16:creationId xmlns:a16="http://schemas.microsoft.com/office/drawing/2014/main" id="{6D1ABD3C-5A69-4200-8E8D-EED6CCB5736A}"/>
+              </a:ext>
+            </a:extLst>
+          </p:cNvPr>
+          <p:cNvSpPr txBox="1"/>
+          <p:nvPr/>
+        </p:nvSpPr>
+        <p:spPr>
+          <a:xfrm>
+            <a:off x="1656657" y="436289"/>
+            <a:ext cx="760144" cy="369332"/>
+          </a:xfrm>
+          <a:prstGeom prst="rect">
+            <a:avLst/>
+          </a:prstGeom>
+          <a:noFill/>
+        </p:spPr>
+        <p:txBody>
+          <a:bodyPr wrap="none" rtlCol="0">
+            <a:spAutoFit/>
+          </a:bodyPr>
+          <a:lstStyle/>
+          <a:p>
+            <a:r>
+              <a:rPr lang="en-GB" dirty="0"/>
+              <a:t>About</a:t>
+            </a:r>
+          </a:p>
+        </p:txBody>
+      </p:sp>
+      <p:sp>
+        <p:nvSpPr>
+          <p:cNvPr id="9" name="TextBox 8">
+            <a:extLst>
+              <a:ext uri="{FF2B5EF4-FFF2-40B4-BE49-F238E27FC236}">
+                <a16:creationId xmlns:a16="http://schemas.microsoft.com/office/drawing/2014/main" id="{7EE3AC39-F564-43EA-B006-A393596474BE}"/>
+              </a:ext>
+            </a:extLst>
+          </p:cNvPr>
+          <p:cNvSpPr txBox="1"/>
+          <p:nvPr/>
+        </p:nvSpPr>
+        <p:spPr>
+          <a:xfrm>
+            <a:off x="2400158" y="438081"/>
+            <a:ext cx="563488" cy="369332"/>
+          </a:xfrm>
+          <a:prstGeom prst="rect">
+            <a:avLst/>
+          </a:prstGeom>
+          <a:noFill/>
+        </p:spPr>
+        <p:txBody>
+          <a:bodyPr wrap="none" rtlCol="0">
+            <a:spAutoFit/>
+          </a:bodyPr>
+          <a:lstStyle/>
+          <a:p>
+            <a:r>
+              <a:rPr lang="en-GB" u="sng" dirty="0"/>
+              <a:t>FAQ</a:t>
+            </a:r>
+          </a:p>
+        </p:txBody>
+      </p:sp>
+      <p:sp>
+        <p:nvSpPr>
+          <p:cNvPr id="36" name="Rectangle 35">
+            <a:extLst>
+              <a:ext uri="{FF2B5EF4-FFF2-40B4-BE49-F238E27FC236}">
+                <a16:creationId xmlns:a16="http://schemas.microsoft.com/office/drawing/2014/main" id="{B589E5E6-C441-44DB-8ED4-D16C34A04601}"/>
+              </a:ext>
+            </a:extLst>
+          </p:cNvPr>
+          <p:cNvSpPr/>
+          <p:nvPr/>
+        </p:nvSpPr>
+        <p:spPr>
+          <a:xfrm>
+            <a:off x="1728733" y="1231757"/>
+            <a:ext cx="5734963" cy="5431419"/>
+          </a:xfrm>
+          <a:prstGeom prst="rect">
+            <a:avLst/>
+          </a:prstGeom>
+          <a:noFill/>
+          <a:ln>
+            <a:solidFill>
+              <a:schemeClr val="bg1">
+                <a:lumMod val="85000"/>
+              </a:schemeClr>
+            </a:solidFill>
+          </a:ln>
+        </p:spPr>
+        <p:style>
+          <a:lnRef idx="2">
+            <a:schemeClr val="accent1">
+              <a:shade val="50000"/>
+            </a:schemeClr>
+          </a:lnRef>
+          <a:fillRef idx="1">
+            <a:schemeClr val="accent1"/>
+          </a:fillRef>
+          <a:effectRef idx="0">
+            <a:schemeClr val="accent1"/>
+          </a:effectRef>
+          <a:fontRef idx="minor">
+            <a:schemeClr val="lt1"/>
+          </a:fontRef>
+        </p:style>
+        <p:txBody>
+          <a:bodyPr rtlCol="0" anchor="t">
+            <a:normAutofit lnSpcReduction="10000"/>
+          </a:bodyPr>
+          <a:lstStyle/>
+          <a:p>
+            <a:r>
+              <a:rPr lang="en-GB" b="1" dirty="0">
+                <a:solidFill>
+                  <a:srgbClr val="FF0000"/>
+                </a:solidFill>
+              </a:rPr>
+              <a:t>Introduction</a:t>
+            </a:r>
+          </a:p>
+          <a:p>
+            <a:r>
+              <a:rPr lang="en-GB" sz="1600" dirty="0">
+                <a:solidFill>
+                  <a:srgbClr val="FF0000"/>
+                </a:solidFill>
+              </a:rPr>
+              <a:t>What the tool is for, bit on how it works (“uses AI and Machine Learning techniques”) etc.</a:t>
+            </a:r>
+          </a:p>
+          <a:p>
+            <a:endParaRPr lang="en-GB" dirty="0">
+              <a:solidFill>
+                <a:srgbClr val="FF0000"/>
+              </a:solidFill>
+            </a:endParaRPr>
+          </a:p>
+          <a:p>
+            <a:r>
+              <a:rPr lang="en-GB" b="1" dirty="0">
+                <a:solidFill>
+                  <a:srgbClr val="FF0000"/>
+                </a:solidFill>
+              </a:rPr>
+              <a:t>Technologies and Architecture</a:t>
+            </a:r>
+          </a:p>
+          <a:p>
+            <a:r>
+              <a:rPr lang="en-GB" sz="1600" dirty="0">
+                <a:solidFill>
+                  <a:srgbClr val="FF0000"/>
+                </a:solidFill>
+              </a:rPr>
+              <a:t>Related to earlier slide; Django for the server code, Python to access Azure APIs, Selenium for functional testing, d3.js for the image editor, Bootstrap for the web design, Travis CI for the CI/CD pipeline, </a:t>
+            </a:r>
+            <a:r>
+              <a:rPr lang="en-GB" sz="1600" dirty="0" err="1">
+                <a:solidFill>
+                  <a:srgbClr val="FF0000"/>
+                </a:solidFill>
+              </a:rPr>
+              <a:t>Heroku</a:t>
+            </a:r>
+            <a:r>
+              <a:rPr lang="en-GB" sz="1600" dirty="0">
+                <a:solidFill>
+                  <a:srgbClr val="FF0000"/>
+                </a:solidFill>
+              </a:rPr>
+              <a:t> for deployment, Azure for the </a:t>
+            </a:r>
+            <a:r>
+              <a:rPr lang="en-GB" sz="1600" dirty="0" err="1">
+                <a:solidFill>
+                  <a:srgbClr val="FF0000"/>
+                </a:solidFill>
+              </a:rPr>
+              <a:t>Obj</a:t>
+            </a:r>
+            <a:r>
+              <a:rPr lang="en-GB" sz="1600" dirty="0">
+                <a:solidFill>
+                  <a:srgbClr val="FF0000"/>
+                </a:solidFill>
+              </a:rPr>
+              <a:t> Detection and OCR – anything else??</a:t>
+            </a:r>
+          </a:p>
+          <a:p>
+            <a:endParaRPr lang="en-GB" dirty="0">
+              <a:solidFill>
+                <a:srgbClr val="FF0000"/>
+              </a:solidFill>
+            </a:endParaRPr>
+          </a:p>
+          <a:p>
+            <a:r>
+              <a:rPr lang="en-GB" b="1" dirty="0">
+                <a:solidFill>
+                  <a:srgbClr val="FF0000"/>
+                </a:solidFill>
+              </a:rPr>
+              <a:t>Limitations</a:t>
+            </a:r>
+          </a:p>
+          <a:p>
+            <a:r>
+              <a:rPr lang="en-GB" sz="1600" dirty="0">
+                <a:solidFill>
+                  <a:srgbClr val="FF0000"/>
+                </a:solidFill>
+              </a:rPr>
+              <a:t>Uses Azure’s Object Detection and OCR services; these are generally good, but I can’t influence their development. Also, bit about updates (i.e. they’ll be a bit ad-hoc, as it’s a personal project)</a:t>
+            </a:r>
+          </a:p>
+          <a:p>
+            <a:endParaRPr lang="en-GB" sz="1600" dirty="0">
+              <a:solidFill>
+                <a:srgbClr val="FF0000"/>
+              </a:solidFill>
+            </a:endParaRPr>
+          </a:p>
+          <a:p>
+            <a:r>
+              <a:rPr lang="en-GB" b="1" dirty="0">
+                <a:solidFill>
+                  <a:srgbClr val="FF0000"/>
+                </a:solidFill>
+              </a:rPr>
+              <a:t>Development and Feedback</a:t>
+            </a:r>
+          </a:p>
+          <a:p>
+            <a:r>
+              <a:rPr lang="en-GB" sz="1600" dirty="0">
+                <a:solidFill>
+                  <a:srgbClr val="FF0000"/>
+                </a:solidFill>
+              </a:rPr>
+              <a:t>Link to </a:t>
+            </a:r>
+            <a:r>
+              <a:rPr lang="en-GB" sz="1600" dirty="0" err="1">
+                <a:solidFill>
+                  <a:srgbClr val="FF0000"/>
+                </a:solidFill>
+              </a:rPr>
+              <a:t>Github</a:t>
+            </a:r>
+            <a:r>
+              <a:rPr lang="en-GB" sz="1600" dirty="0">
+                <a:solidFill>
+                  <a:srgbClr val="FF0000"/>
+                </a:solidFill>
+              </a:rPr>
+              <a:t> repo, instructions for feedback (bugs and issues, improvements)</a:t>
+            </a:r>
+            <a:endParaRPr lang="en-GB" dirty="0">
+              <a:solidFill>
+                <a:srgbClr val="FF0000"/>
+              </a:solidFill>
+            </a:endParaRPr>
+          </a:p>
+          <a:p>
+            <a:endParaRPr lang="en-GB" dirty="0">
+              <a:solidFill>
+                <a:srgbClr val="FF0000"/>
+              </a:solidFill>
+            </a:endParaRPr>
+          </a:p>
+          <a:p>
+            <a:r>
+              <a:rPr lang="en-GB" b="1" dirty="0">
+                <a:solidFill>
+                  <a:srgbClr val="FF0000"/>
+                </a:solidFill>
+              </a:rPr>
+              <a:t>Version information</a:t>
+            </a:r>
+          </a:p>
+          <a:p>
+            <a:r>
+              <a:rPr lang="en-GB" sz="1600" dirty="0">
+                <a:solidFill>
+                  <a:srgbClr val="FF0000"/>
+                </a:solidFill>
+              </a:rPr>
+              <a:t>Version </a:t>
+            </a:r>
+            <a:r>
+              <a:rPr lang="en-GB" sz="1600" dirty="0" err="1">
+                <a:solidFill>
+                  <a:srgbClr val="FF0000"/>
+                </a:solidFill>
+              </a:rPr>
+              <a:t>num</a:t>
+            </a:r>
+            <a:r>
+              <a:rPr lang="en-GB" sz="1600" dirty="0">
+                <a:solidFill>
+                  <a:srgbClr val="FF0000"/>
+                </a:solidFill>
+              </a:rPr>
+              <a:t>, date and release / change summary</a:t>
+            </a:r>
+          </a:p>
+        </p:txBody>
+      </p:sp>
+      <p:sp>
+        <p:nvSpPr>
+          <p:cNvPr id="45" name="Rectangle 44">
+            <a:extLst>
+              <a:ext uri="{FF2B5EF4-FFF2-40B4-BE49-F238E27FC236}">
+                <a16:creationId xmlns:a16="http://schemas.microsoft.com/office/drawing/2014/main" id="{1EDE913D-829A-48A3-9DEE-F30FFCFF262A}"/>
+              </a:ext>
+            </a:extLst>
+          </p:cNvPr>
+          <p:cNvSpPr/>
+          <p:nvPr/>
+        </p:nvSpPr>
+        <p:spPr>
+          <a:xfrm>
+            <a:off x="9203765" y="101609"/>
+            <a:ext cx="2880649" cy="6636871"/>
+          </a:xfrm>
+          <a:prstGeom prst="rect">
+            <a:avLst/>
+          </a:prstGeom>
+          <a:noFill/>
+          <a:ln>
+            <a:solidFill>
+              <a:schemeClr val="bg1">
+                <a:lumMod val="50000"/>
+              </a:schemeClr>
+            </a:solidFill>
+          </a:ln>
+        </p:spPr>
+        <p:style>
+          <a:lnRef idx="2">
+            <a:schemeClr val="accent1">
+              <a:shade val="50000"/>
+            </a:schemeClr>
+          </a:lnRef>
+          <a:fillRef idx="1">
+            <a:schemeClr val="accent1"/>
+          </a:fillRef>
+          <a:effectRef idx="0">
+            <a:schemeClr val="accent1"/>
+          </a:effectRef>
+          <a:fontRef idx="minor">
+            <a:schemeClr val="lt1"/>
+          </a:fontRef>
+        </p:style>
+        <p:txBody>
+          <a:bodyPr rtlCol="0" anchor="t"/>
+          <a:lstStyle/>
+          <a:p>
+            <a:r>
+              <a:rPr lang="en-GB" b="1" dirty="0">
+                <a:solidFill>
+                  <a:schemeClr val="tx1">
+                    <a:lumMod val="50000"/>
+                    <a:lumOff val="50000"/>
+                  </a:schemeClr>
+                </a:solidFill>
+              </a:rPr>
+              <a:t>Notes</a:t>
+            </a:r>
+          </a:p>
+          <a:p>
+            <a:pPr marL="171450" indent="-171450">
+              <a:spcAft>
+                <a:spcPts val="400"/>
+              </a:spcAft>
+              <a:buFont typeface="Arial" panose="020B0604020202020204" pitchFamily="34" charset="0"/>
+              <a:buChar char="•"/>
+            </a:pPr>
+            <a:r>
+              <a:rPr lang="en-GB" sz="1200" dirty="0">
+                <a:solidFill>
+                  <a:schemeClr val="tx1">
+                    <a:lumMod val="50000"/>
+                    <a:lumOff val="50000"/>
+                  </a:schemeClr>
+                </a:solidFill>
+              </a:rPr>
+              <a:t>Item (1) should be templated across all pages</a:t>
+            </a:r>
+          </a:p>
+          <a:p>
+            <a:pPr marL="171450" indent="-171450">
+              <a:spcAft>
+                <a:spcPts val="400"/>
+              </a:spcAft>
+              <a:buFont typeface="Arial" panose="020B0604020202020204" pitchFamily="34" charset="0"/>
+              <a:buChar char="•"/>
+            </a:pPr>
+            <a:r>
+              <a:rPr lang="en-GB" sz="1200" dirty="0">
+                <a:solidFill>
+                  <a:schemeClr val="tx1">
+                    <a:lumMod val="50000"/>
+                    <a:lumOff val="50000"/>
+                  </a:schemeClr>
+                </a:solidFill>
+              </a:rPr>
+              <a:t>Put collapses on each of the headers?  Or a list of items at the top, with links to each paragraph?</a:t>
+            </a:r>
+          </a:p>
+          <a:p>
+            <a:pPr marL="628650" lvl="1" indent="-171450">
+              <a:spcAft>
+                <a:spcPts val="400"/>
+              </a:spcAft>
+              <a:buFont typeface="Arial" panose="020B0604020202020204" pitchFamily="34" charset="0"/>
+              <a:buChar char="•"/>
+            </a:pPr>
+            <a:r>
+              <a:rPr lang="en-GB" sz="1200" dirty="0">
+                <a:solidFill>
+                  <a:schemeClr val="tx1">
+                    <a:lumMod val="50000"/>
+                    <a:lumOff val="50000"/>
+                  </a:schemeClr>
+                </a:solidFill>
+              </a:rPr>
+              <a:t>May not be useful if the text is visible easily on one page</a:t>
+            </a:r>
+          </a:p>
+        </p:txBody>
+      </p:sp>
+      <p:sp>
+        <p:nvSpPr>
+          <p:cNvPr id="46" name="Oval 45">
+            <a:extLst>
+              <a:ext uri="{FF2B5EF4-FFF2-40B4-BE49-F238E27FC236}">
+                <a16:creationId xmlns:a16="http://schemas.microsoft.com/office/drawing/2014/main" id="{65F0A259-6623-4273-A4B5-437BDDE6F1A9}"/>
+              </a:ext>
+            </a:extLst>
+          </p:cNvPr>
+          <p:cNvSpPr>
+            <a:spLocks noChangeAspect="1"/>
+          </p:cNvSpPr>
+          <p:nvPr/>
+        </p:nvSpPr>
+        <p:spPr>
+          <a:xfrm>
+            <a:off x="1667838" y="203209"/>
+            <a:ext cx="285008" cy="284495"/>
+          </a:xfrm>
+          <a:prstGeom prst="ellipse">
+            <a:avLst/>
+          </a:prstGeom>
+          <a:solidFill>
+            <a:srgbClr val="FFFF00"/>
+          </a:solidFill>
+          <a:ln w="25400">
+            <a:solidFill>
+              <a:schemeClr val="tx1">
+                <a:lumMod val="75000"/>
+                <a:lumOff val="25000"/>
+              </a:schemeClr>
+            </a:solidFill>
+          </a:ln>
+        </p:spPr>
+        <p:style>
+          <a:lnRef idx="2">
+            <a:schemeClr val="accent1">
+              <a:shade val="50000"/>
+            </a:schemeClr>
+          </a:lnRef>
+          <a:fillRef idx="1">
+            <a:schemeClr val="accent1"/>
+          </a:fillRef>
+          <a:effectRef idx="0">
+            <a:schemeClr val="accent1"/>
+          </a:effectRef>
+          <a:fontRef idx="minor">
+            <a:schemeClr val="lt1"/>
+          </a:fontRef>
+        </p:style>
+        <p:txBody>
+          <a:bodyPr rtlCol="0" anchor="ctr"/>
+          <a:lstStyle/>
+          <a:p>
+            <a:pPr algn="ctr"/>
+            <a:r>
+              <a:rPr lang="en-GB" sz="1200" b="1" dirty="0">
+                <a:solidFill>
+                  <a:schemeClr val="tx1">
+                    <a:lumMod val="75000"/>
+                    <a:lumOff val="25000"/>
+                  </a:schemeClr>
+                </a:solidFill>
+              </a:rPr>
+              <a:t>1</a:t>
+            </a:r>
+          </a:p>
+        </p:txBody>
+      </p:sp>
+      <p:sp>
+        <p:nvSpPr>
+          <p:cNvPr id="47" name="Oval 46">
+            <a:extLst>
+              <a:ext uri="{FF2B5EF4-FFF2-40B4-BE49-F238E27FC236}">
+                <a16:creationId xmlns:a16="http://schemas.microsoft.com/office/drawing/2014/main" id="{E419682C-8A2D-42B7-A0FB-EE2C43FEE65D}"/>
+              </a:ext>
+            </a:extLst>
+          </p:cNvPr>
+          <p:cNvSpPr>
+            <a:spLocks noChangeAspect="1"/>
+          </p:cNvSpPr>
+          <p:nvPr/>
+        </p:nvSpPr>
+        <p:spPr>
+          <a:xfrm>
+            <a:off x="1441720" y="1276817"/>
+            <a:ext cx="285008" cy="284495"/>
+          </a:xfrm>
+          <a:prstGeom prst="ellipse">
+            <a:avLst/>
+          </a:prstGeom>
+          <a:solidFill>
+            <a:srgbClr val="FFFF00"/>
+          </a:solidFill>
+          <a:ln w="25400">
+            <a:solidFill>
+              <a:schemeClr val="tx1">
+                <a:lumMod val="75000"/>
+                <a:lumOff val="25000"/>
+              </a:schemeClr>
+            </a:solidFill>
+          </a:ln>
+        </p:spPr>
+        <p:style>
+          <a:lnRef idx="2">
+            <a:schemeClr val="accent1">
+              <a:shade val="50000"/>
+            </a:schemeClr>
+          </a:lnRef>
+          <a:fillRef idx="1">
+            <a:schemeClr val="accent1"/>
+          </a:fillRef>
+          <a:effectRef idx="0">
+            <a:schemeClr val="accent1"/>
+          </a:effectRef>
+          <a:fontRef idx="minor">
+            <a:schemeClr val="lt1"/>
+          </a:fontRef>
+        </p:style>
+        <p:txBody>
+          <a:bodyPr rtlCol="0" anchor="ctr"/>
+          <a:lstStyle/>
+          <a:p>
+            <a:pPr algn="ctr"/>
+            <a:r>
+              <a:rPr lang="en-GB" sz="1200" b="1" dirty="0">
+                <a:solidFill>
+                  <a:schemeClr val="tx1">
+                    <a:lumMod val="75000"/>
+                    <a:lumOff val="25000"/>
+                  </a:schemeClr>
+                </a:solidFill>
+              </a:rPr>
+              <a:t>2</a:t>
+            </a:r>
+          </a:p>
+        </p:txBody>
+      </p:sp>
+      <p:sp>
+        <p:nvSpPr>
+          <p:cNvPr id="42" name="Oval 41">
+            <a:extLst>
+              <a:ext uri="{FF2B5EF4-FFF2-40B4-BE49-F238E27FC236}">
+                <a16:creationId xmlns:a16="http://schemas.microsoft.com/office/drawing/2014/main" id="{E419682C-8A2D-42B7-A0FB-EE2C43FEE65D}"/>
+              </a:ext>
+            </a:extLst>
+          </p:cNvPr>
+          <p:cNvSpPr>
+            <a:spLocks noChangeAspect="1"/>
+          </p:cNvSpPr>
+          <p:nvPr/>
+        </p:nvSpPr>
+        <p:spPr>
+          <a:xfrm>
+            <a:off x="1441720" y="2201369"/>
+            <a:ext cx="285008" cy="284495"/>
+          </a:xfrm>
+          <a:prstGeom prst="ellipse">
+            <a:avLst/>
+          </a:prstGeom>
+          <a:solidFill>
+            <a:srgbClr val="FFFF00"/>
+          </a:solidFill>
+          <a:ln w="25400">
+            <a:solidFill>
+              <a:schemeClr val="tx1">
+                <a:lumMod val="75000"/>
+                <a:lumOff val="25000"/>
+              </a:schemeClr>
+            </a:solidFill>
+          </a:ln>
+        </p:spPr>
+        <p:style>
+          <a:lnRef idx="2">
+            <a:schemeClr val="accent1">
+              <a:shade val="50000"/>
+            </a:schemeClr>
+          </a:lnRef>
+          <a:fillRef idx="1">
+            <a:schemeClr val="accent1"/>
+          </a:fillRef>
+          <a:effectRef idx="0">
+            <a:schemeClr val="accent1"/>
+          </a:effectRef>
+          <a:fontRef idx="minor">
+            <a:schemeClr val="lt1"/>
+          </a:fontRef>
+        </p:style>
+        <p:txBody>
+          <a:bodyPr rtlCol="0" anchor="ctr"/>
+          <a:lstStyle/>
+          <a:p>
+            <a:pPr algn="ctr"/>
+            <a:r>
+              <a:rPr lang="en-GB" sz="1200" b="1" dirty="0">
+                <a:solidFill>
+                  <a:schemeClr val="tx1">
+                    <a:lumMod val="75000"/>
+                    <a:lumOff val="25000"/>
+                  </a:schemeClr>
+                </a:solidFill>
+              </a:rPr>
+              <a:t>3</a:t>
+            </a:r>
+          </a:p>
+        </p:txBody>
+      </p:sp>
+      <p:sp>
+        <p:nvSpPr>
+          <p:cNvPr id="43" name="Oval 42">
+            <a:extLst>
+              <a:ext uri="{FF2B5EF4-FFF2-40B4-BE49-F238E27FC236}">
+                <a16:creationId xmlns:a16="http://schemas.microsoft.com/office/drawing/2014/main" id="{E419682C-8A2D-42B7-A0FB-EE2C43FEE65D}"/>
+              </a:ext>
+            </a:extLst>
+          </p:cNvPr>
+          <p:cNvSpPr>
+            <a:spLocks noChangeAspect="1"/>
+          </p:cNvSpPr>
+          <p:nvPr/>
+        </p:nvSpPr>
+        <p:spPr>
+          <a:xfrm>
+            <a:off x="1441720" y="3780630"/>
+            <a:ext cx="285008" cy="284495"/>
+          </a:xfrm>
+          <a:prstGeom prst="ellipse">
+            <a:avLst/>
+          </a:prstGeom>
+          <a:solidFill>
+            <a:srgbClr val="FFFF00"/>
+          </a:solidFill>
+          <a:ln w="25400">
+            <a:solidFill>
+              <a:schemeClr val="tx1">
+                <a:lumMod val="75000"/>
+                <a:lumOff val="25000"/>
+              </a:schemeClr>
+            </a:solidFill>
+          </a:ln>
+        </p:spPr>
+        <p:style>
+          <a:lnRef idx="2">
+            <a:schemeClr val="accent1">
+              <a:shade val="50000"/>
+            </a:schemeClr>
+          </a:lnRef>
+          <a:fillRef idx="1">
+            <a:schemeClr val="accent1"/>
+          </a:fillRef>
+          <a:effectRef idx="0">
+            <a:schemeClr val="accent1"/>
+          </a:effectRef>
+          <a:fontRef idx="minor">
+            <a:schemeClr val="lt1"/>
+          </a:fontRef>
+        </p:style>
+        <p:txBody>
+          <a:bodyPr rtlCol="0" anchor="ctr"/>
+          <a:lstStyle/>
+          <a:p>
+            <a:pPr algn="ctr"/>
+            <a:r>
+              <a:rPr lang="en-GB" sz="1200" b="1" dirty="0">
+                <a:solidFill>
+                  <a:schemeClr val="tx1">
+                    <a:lumMod val="75000"/>
+                    <a:lumOff val="25000"/>
+                  </a:schemeClr>
+                </a:solidFill>
+              </a:rPr>
+              <a:t>4</a:t>
+            </a:r>
+          </a:p>
+        </p:txBody>
+      </p:sp>
+      <p:sp>
+        <p:nvSpPr>
+          <p:cNvPr id="44" name="Oval 43">
+            <a:extLst>
+              <a:ext uri="{FF2B5EF4-FFF2-40B4-BE49-F238E27FC236}">
+                <a16:creationId xmlns:a16="http://schemas.microsoft.com/office/drawing/2014/main" id="{E419682C-8A2D-42B7-A0FB-EE2C43FEE65D}"/>
+              </a:ext>
+            </a:extLst>
+          </p:cNvPr>
+          <p:cNvSpPr>
+            <a:spLocks noChangeAspect="1"/>
+          </p:cNvSpPr>
+          <p:nvPr/>
+        </p:nvSpPr>
+        <p:spPr>
+          <a:xfrm>
+            <a:off x="1441720" y="4894728"/>
+            <a:ext cx="285008" cy="284495"/>
+          </a:xfrm>
+          <a:prstGeom prst="ellipse">
+            <a:avLst/>
+          </a:prstGeom>
+          <a:solidFill>
+            <a:srgbClr val="FFFF00"/>
+          </a:solidFill>
+          <a:ln w="25400">
+            <a:solidFill>
+              <a:schemeClr val="tx1">
+                <a:lumMod val="75000"/>
+                <a:lumOff val="25000"/>
+              </a:schemeClr>
+            </a:solidFill>
+          </a:ln>
+        </p:spPr>
+        <p:style>
+          <a:lnRef idx="2">
+            <a:schemeClr val="accent1">
+              <a:shade val="50000"/>
+            </a:schemeClr>
+          </a:lnRef>
+          <a:fillRef idx="1">
+            <a:schemeClr val="accent1"/>
+          </a:fillRef>
+          <a:effectRef idx="0">
+            <a:schemeClr val="accent1"/>
+          </a:effectRef>
+          <a:fontRef idx="minor">
+            <a:schemeClr val="lt1"/>
+          </a:fontRef>
+        </p:style>
+        <p:txBody>
+          <a:bodyPr rtlCol="0" anchor="ctr"/>
+          <a:lstStyle/>
+          <a:p>
+            <a:pPr algn="ctr"/>
+            <a:r>
+              <a:rPr lang="en-GB" sz="1200" b="1" dirty="0">
+                <a:solidFill>
+                  <a:schemeClr val="tx1">
+                    <a:lumMod val="75000"/>
+                    <a:lumOff val="25000"/>
+                  </a:schemeClr>
+                </a:solidFill>
+              </a:rPr>
+              <a:t>5</a:t>
+            </a:r>
+          </a:p>
+        </p:txBody>
+      </p:sp>
+      <p:sp>
+        <p:nvSpPr>
+          <p:cNvPr id="51" name="Oval 50">
+            <a:extLst>
+              <a:ext uri="{FF2B5EF4-FFF2-40B4-BE49-F238E27FC236}">
+                <a16:creationId xmlns:a16="http://schemas.microsoft.com/office/drawing/2014/main" id="{E419682C-8A2D-42B7-A0FB-EE2C43FEE65D}"/>
+              </a:ext>
+            </a:extLst>
+          </p:cNvPr>
+          <p:cNvSpPr>
+            <a:spLocks noChangeAspect="1"/>
+          </p:cNvSpPr>
+          <p:nvPr/>
+        </p:nvSpPr>
+        <p:spPr>
+          <a:xfrm>
+            <a:off x="1441720" y="5838330"/>
+            <a:ext cx="285008" cy="284495"/>
+          </a:xfrm>
+          <a:prstGeom prst="ellipse">
+            <a:avLst/>
+          </a:prstGeom>
+          <a:solidFill>
+            <a:srgbClr val="FFFF00"/>
+          </a:solidFill>
+          <a:ln w="25400">
+            <a:solidFill>
+              <a:schemeClr val="tx1">
+                <a:lumMod val="75000"/>
+                <a:lumOff val="25000"/>
+              </a:schemeClr>
+            </a:solidFill>
+          </a:ln>
+        </p:spPr>
+        <p:style>
+          <a:lnRef idx="2">
+            <a:schemeClr val="accent1">
+              <a:shade val="50000"/>
+            </a:schemeClr>
+          </a:lnRef>
+          <a:fillRef idx="1">
+            <a:schemeClr val="accent1"/>
+          </a:fillRef>
+          <a:effectRef idx="0">
+            <a:schemeClr val="accent1"/>
+          </a:effectRef>
+          <a:fontRef idx="minor">
+            <a:schemeClr val="lt1"/>
+          </a:fontRef>
+        </p:style>
+        <p:txBody>
+          <a:bodyPr rtlCol="0" anchor="ctr"/>
+          <a:lstStyle/>
+          <a:p>
+            <a:pPr algn="ctr"/>
+            <a:r>
+              <a:rPr lang="en-GB" sz="1200" b="1" dirty="0">
+                <a:solidFill>
+                  <a:schemeClr val="tx1">
+                    <a:lumMod val="75000"/>
+                    <a:lumOff val="25000"/>
+                  </a:schemeClr>
+                </a:solidFill>
+              </a:rPr>
+              <a:t>6</a:t>
+            </a:r>
+          </a:p>
+        </p:txBody>
+      </p:sp>
+    </p:spTree>
+    <p:extLst>
+      <p:ext uri="{BB962C8B-B14F-4D97-AF65-F5344CB8AC3E}">
+        <p14:creationId xmlns:p14="http://schemas.microsoft.com/office/powerpoint/2010/main" val="2934466975"/>
       </p:ext>
     </p:extLst>
   </p:cSld>
@@ -14167,7 +17775,7 @@
           <a:p>
             <a:r>
               <a:rPr lang="en-GB" dirty="0"/>
-              <a:t>App#1: Sticky Note Info Processor (SNIP)</a:t>
+              <a:t>App#1: Sticky Note Information Processor (SNIP)</a:t>
             </a:r>
           </a:p>
         </p:txBody>
@@ -14273,18 +17881,15 @@
         </p:nvSpPr>
         <p:spPr/>
         <p:txBody>
-          <a:bodyPr/>
+          <a:bodyPr>
+            <a:normAutofit fontScale="92500"/>
+          </a:bodyPr>
           <a:lstStyle/>
           <a:p>
             <a:r>
               <a:rPr lang="en-GB" dirty="0"/>
-              <a:t>The Sticky Note Info Processor (SNIP) is the first app in the Design Thinking </a:t>
-            </a:r>
-            <a:r>
-              <a:rPr lang="en-GB" dirty="0" err="1"/>
-              <a:t>Tookit</a:t>
-            </a:r>
-            <a:endParaRPr lang="en-GB" dirty="0"/>
+              <a:t>The Sticky Note Information Processor (SNIP) is the first app in the Design Thinking Toolkit</a:t>
+            </a:r>
           </a:p>
           <a:p>
             <a:r>
@@ -14309,7 +17914,7 @@
             </a:pPr>
             <a:r>
               <a:rPr lang="en-GB" dirty="0"/>
-              <a:t>The image is processed to identify believed sticky notes, and to find text in the image</a:t>
+              <a:t>The image is processed to identify believed sticky notes (if the user wishes)</a:t>
             </a:r>
           </a:p>
           <a:p>
@@ -14319,7 +17924,25 @@
             </a:pPr>
             <a:r>
               <a:rPr lang="en-GB" dirty="0"/>
-              <a:t>The results are displayed to the user, who can then edit (create more boxes, update (move, resize) existing boxes, delete wrong boxes)</a:t>
+              <a:t>The results are displayed to the user, who can then edit; create more regions, update (move, resize) existing regions, delete wrong regions.</a:t>
+            </a:r>
+          </a:p>
+          <a:p>
+            <a:pPr marL="1428755" lvl="2" indent="-514350">
+              <a:buFont typeface="+mj-lt"/>
+              <a:buAutoNum type="romanLcPeriod"/>
+            </a:pPr>
+            <a:r>
+              <a:rPr lang="en-GB" dirty="0"/>
+              <a:t>If the user didn’t want to discover </a:t>
+            </a:r>
+            <a:r>
+              <a:rPr lang="en-GB" dirty="0" err="1"/>
+              <a:t>stickies</a:t>
+            </a:r>
+            <a:r>
+              <a:rPr lang="en-GB" dirty="0"/>
+              <a:t>, they can assign regions manually in this way</a:t>
             </a:r>
           </a:p>
           <a:p>
@@ -14329,7 +17952,7 @@
             </a:pPr>
             <a:r>
               <a:rPr lang="en-GB" dirty="0"/>
-              <a:t>The text found in (2) is then matched to the boxes provided by the user</a:t>
+              <a:t>The image is then analysed to find text (printed and/or handwritten). The text found is matched to the boxes provided by the user</a:t>
             </a:r>
           </a:p>
           <a:p>
@@ -14347,7 +17970,7 @@
     </p:spTree>
     <p:extLst>
       <p:ext uri="{BB962C8B-B14F-4D97-AF65-F5344CB8AC3E}">
-        <p14:creationId xmlns:p14="http://schemas.microsoft.com/office/powerpoint/2010/main" val="2846055649"/>
+        <p14:creationId xmlns:p14="http://schemas.microsoft.com/office/powerpoint/2010/main" val="3925559518"/>
       </p:ext>
     </p:extLst>
   </p:cSld>

</xml_diff>

<commit_message>
Tasks 174 and 175; added stub for Analyse Text page, and updated Set Regions page. Also updated tests in several places, as well as config.json, .js files and Design doc
</commit_message>
<xml_diff>
--- a/documents/Design.pptx
+++ b/documents/Design.pptx
@@ -21,12 +21,13 @@
     <p:sldId id="279" r:id="rId15"/>
     <p:sldId id="267" r:id="rId16"/>
     <p:sldId id="268" r:id="rId17"/>
-    <p:sldId id="269" r:id="rId18"/>
-    <p:sldId id="270" r:id="rId19"/>
-    <p:sldId id="271" r:id="rId20"/>
-    <p:sldId id="274" r:id="rId21"/>
-    <p:sldId id="272" r:id="rId22"/>
-    <p:sldId id="275" r:id="rId23"/>
+    <p:sldId id="280" r:id="rId18"/>
+    <p:sldId id="269" r:id="rId19"/>
+    <p:sldId id="270" r:id="rId20"/>
+    <p:sldId id="271" r:id="rId21"/>
+    <p:sldId id="274" r:id="rId22"/>
+    <p:sldId id="272" r:id="rId23"/>
+    <p:sldId id="275" r:id="rId24"/>
   </p:sldIdLst>
   <p:sldSz cx="12192000" cy="6858000"/>
   <p:notesSz cx="6858000" cy="9144000"/>
@@ -135,7 +136,7 @@
 
 <file path=ppt/commentAuthors.xml><?xml version="1.0" encoding="utf-8"?>
 <p:cmAuthorLst xmlns:a="http://schemas.openxmlformats.org/drawingml/2006/main" xmlns:r="http://schemas.openxmlformats.org/officeDocument/2006/relationships" xmlns:p="http://schemas.openxmlformats.org/presentationml/2006/main">
-  <p:cmAuthor id="1" name="Alasdair Vincent" initials="AV" lastIdx="3" clrIdx="0">
+  <p:cmAuthor id="1" name="Alasdair Vincent" initials="AV" lastIdx="5" clrIdx="0">
     <p:extLst>
       <p:ext uri="{19B8F6BF-5375-455C-9EA6-DF929625EA0E}">
         <p15:presenceInfo xmlns:p15="http://schemas.microsoft.com/office/powerpoint/2012/main" userId="f16fae25c47a012e" providerId="Windows Live"/>
@@ -148,7 +149,7 @@
 <file path=ppt/revisionInfo.xml><?xml version="1.0" encoding="utf-8"?>
 <p1510:revInfo xmlns:a="http://schemas.openxmlformats.org/drawingml/2006/main" xmlns:r="http://schemas.openxmlformats.org/officeDocument/2006/relationships" xmlns:p1510="http://schemas.microsoft.com/office/powerpoint/2015/10/main">
   <p1510:revLst>
-    <p1510:client id="{4DFDA945-E2B5-4F7B-AAFF-AF16EDADDE14}" v="13" dt="2020-03-18T09:28:14.089"/>
+    <p1510:client id="{4DFDA945-E2B5-4F7B-AAFF-AF16EDADDE14}" v="19" dt="2020-05-10T20:22:27.404"/>
   </p1510:revLst>
 </p1510:revInfo>
 </file>
@@ -158,7 +159,7 @@
   <pc:docChgLst>
     <pc:chgData name="Alasdair Vincent" userId="f16fae25c47a012e" providerId="LiveId" clId="{4DFDA945-E2B5-4F7B-AAFF-AF16EDADDE14}"/>
     <pc:docChg chg="custSel addSld delSld modSld sldOrd">
-      <pc:chgData name="Alasdair Vincent" userId="f16fae25c47a012e" providerId="LiveId" clId="{4DFDA945-E2B5-4F7B-AAFF-AF16EDADDE14}" dt="2020-03-18T09:28:25.588" v="213"/>
+      <pc:chgData name="Alasdair Vincent" userId="f16fae25c47a012e" providerId="LiveId" clId="{4DFDA945-E2B5-4F7B-AAFF-AF16EDADDE14}" dt="2020-05-10T20:22:27.404" v="363"/>
       <pc:docMkLst>
         <pc:docMk/>
       </pc:docMkLst>
@@ -183,6 +184,21 @@
           <pc:docMk/>
           <pc:sldMk cId="2846055649" sldId="260"/>
         </pc:sldMkLst>
+      </pc:sldChg>
+      <pc:sldChg chg="modSp mod addCm modCm">
+        <pc:chgData name="Alasdair Vincent" userId="f16fae25c47a012e" providerId="LiveId" clId="{4DFDA945-E2B5-4F7B-AAFF-AF16EDADDE14}" dt="2020-05-10T20:22:27.404" v="363"/>
+        <pc:sldMkLst>
+          <pc:docMk/>
+          <pc:sldMk cId="4257750821" sldId="264"/>
+        </pc:sldMkLst>
+        <pc:spChg chg="mod">
+          <ac:chgData name="Alasdair Vincent" userId="f16fae25c47a012e" providerId="LiveId" clId="{4DFDA945-E2B5-4F7B-AAFF-AF16EDADDE14}" dt="2020-05-10T20:20:47.334" v="359" actId="27636"/>
+          <ac:spMkLst>
+            <pc:docMk/>
+            <pc:sldMk cId="4257750821" sldId="264"/>
+            <ac:spMk id="3" creationId="{9C0291AE-CD63-4EFA-9CDB-925831D0855F}"/>
+          </ac:spMkLst>
+        </pc:spChg>
       </pc:sldChg>
       <pc:sldChg chg="modSp">
         <pc:chgData name="Alasdair Vincent" userId="f16fae25c47a012e" providerId="LiveId" clId="{4DFDA945-E2B5-4F7B-AAFF-AF16EDADDE14}" dt="2020-03-18T08:35:46.134" v="208" actId="1076"/>
@@ -238,6 +254,21 @@
             <ac:grpSpMk id="44" creationId="{06645BF3-C5EB-432D-B881-A2D8E04FAB9C}"/>
           </ac:grpSpMkLst>
         </pc:grpChg>
+      </pc:sldChg>
+      <pc:sldChg chg="modSp mod">
+        <pc:chgData name="Alasdair Vincent" userId="f16fae25c47a012e" providerId="LiveId" clId="{4DFDA945-E2B5-4F7B-AAFF-AF16EDADDE14}" dt="2020-05-10T19:22:56.544" v="279" actId="20577"/>
+        <pc:sldMkLst>
+          <pc:docMk/>
+          <pc:sldMk cId="1026633950" sldId="267"/>
+        </pc:sldMkLst>
+        <pc:spChg chg="mod">
+          <ac:chgData name="Alasdair Vincent" userId="f16fae25c47a012e" providerId="LiveId" clId="{4DFDA945-E2B5-4F7B-AAFF-AF16EDADDE14}" dt="2020-05-10T19:22:56.544" v="279" actId="20577"/>
+          <ac:spMkLst>
+            <pc:docMk/>
+            <pc:sldMk cId="1026633950" sldId="267"/>
+            <ac:spMk id="2" creationId="{ABDAA724-9D49-488C-A0FE-3B562E31594D}"/>
+          </ac:spMkLst>
+        </pc:spChg>
       </pc:sldChg>
       <pc:sldChg chg="modSp">
         <pc:chgData name="Alasdair Vincent" userId="f16fae25c47a012e" providerId="LiveId" clId="{4DFDA945-E2B5-4F7B-AAFF-AF16EDADDE14}" dt="2020-03-18T08:34:15.440" v="73" actId="1038"/>
@@ -351,6 +382,13 @@
           <pc:sldMk cId="484274913" sldId="279"/>
         </pc:sldMkLst>
       </pc:sldChg>
+      <pc:sldChg chg="add">
+        <pc:chgData name="Alasdair Vincent" userId="f16fae25c47a012e" providerId="LiveId" clId="{4DFDA945-E2B5-4F7B-AAFF-AF16EDADDE14}" dt="2020-05-10T19:23:03.968" v="280"/>
+        <pc:sldMkLst>
+          <pc:docMk/>
+          <pc:sldMk cId="1657320246" sldId="280"/>
+        </pc:sldMkLst>
+      </pc:sldChg>
     </pc:docChg>
   </pc:docChgLst>
 </pc:chgInfo>
@@ -371,6 +409,30 @@
 </file>
 
 <file path=ppt/comments/comment2.xml><?xml version="1.0" encoding="utf-8"?>
+<p:cmLst xmlns:a="http://schemas.openxmlformats.org/drawingml/2006/main" xmlns:r="http://schemas.openxmlformats.org/officeDocument/2006/relationships" xmlns:p="http://schemas.openxmlformats.org/presentationml/2006/main">
+  <p:cm authorId="1" dt="2020-05-10T20:21:51.953" idx="4">
+    <p:pos x="6018" y="1420"/>
+    <p:text>Better as two separate pages?</p:text>
+    <p:extLst>
+      <p:ext uri="{C676402C-5697-4E1C-873F-D02D1690AC5C}">
+        <p15:threadingInfo xmlns:p15="http://schemas.microsoft.com/office/powerpoint/2012/main" timeZoneBias="-60"/>
+      </p:ext>
+    </p:extLst>
+  </p:cm>
+  <p:cm authorId="1" dt="2020-05-10T21:20:56.835" idx="5">
+    <p:pos x="4263" y="1072"/>
+    <p:text>Should this be a "Select Image" page, with Home an overall home page with app information etc.?
+If so; should SNIP logo link to the "Select Image" page, or to the Home page?</p:text>
+    <p:extLst>
+      <p:ext uri="{C676402C-5697-4E1C-873F-D02D1690AC5C}">
+        <p15:threadingInfo xmlns:p15="http://schemas.microsoft.com/office/powerpoint/2012/main" timeZoneBias="-60"/>
+      </p:ext>
+    </p:extLst>
+  </p:cm>
+</p:cmLst>
+</file>
+
+<file path=ppt/comments/comment3.xml><?xml version="1.0" encoding="utf-8"?>
 <p:cmLst xmlns:a="http://schemas.openxmlformats.org/drawingml/2006/main" xmlns:r="http://schemas.openxmlformats.org/officeDocument/2006/relationships" xmlns:p="http://schemas.openxmlformats.org/presentationml/2006/main">
   <p:cm authorId="1" dt="2020-03-10T17:53:36.264" idx="2">
     <p:pos x="6938" y="2654"/>
@@ -534,7 +596,7 @@
           <a:p>
             <a:fld id="{FD45BEEB-65D0-4EF7-B3AA-8A98DD3CB55B}" type="datetimeFigureOut">
               <a:rPr lang="en-GB" smtClean="0"/>
-              <a:t>18/03/2020</a:t>
+              <a:t>10/05/2020</a:t>
             </a:fld>
             <a:endParaRPr lang="en-GB"/>
           </a:p>
@@ -734,7 +796,7 @@
           <a:p>
             <a:fld id="{FD45BEEB-65D0-4EF7-B3AA-8A98DD3CB55B}" type="datetimeFigureOut">
               <a:rPr lang="en-GB" smtClean="0"/>
-              <a:t>18/03/2020</a:t>
+              <a:t>10/05/2020</a:t>
             </a:fld>
             <a:endParaRPr lang="en-GB"/>
           </a:p>
@@ -944,7 +1006,7 @@
           <a:p>
             <a:fld id="{FD45BEEB-65D0-4EF7-B3AA-8A98DD3CB55B}" type="datetimeFigureOut">
               <a:rPr lang="en-GB" smtClean="0"/>
-              <a:t>18/03/2020</a:t>
+              <a:t>10/05/2020</a:t>
             </a:fld>
             <a:endParaRPr lang="en-GB"/>
           </a:p>
@@ -1144,7 +1206,7 @@
           <a:p>
             <a:fld id="{FD45BEEB-65D0-4EF7-B3AA-8A98DD3CB55B}" type="datetimeFigureOut">
               <a:rPr lang="en-GB" smtClean="0"/>
-              <a:t>18/03/2020</a:t>
+              <a:t>10/05/2020</a:t>
             </a:fld>
             <a:endParaRPr lang="en-GB"/>
           </a:p>
@@ -1420,7 +1482,7 @@
           <a:p>
             <a:fld id="{FD45BEEB-65D0-4EF7-B3AA-8A98DD3CB55B}" type="datetimeFigureOut">
               <a:rPr lang="en-GB" smtClean="0"/>
-              <a:t>18/03/2020</a:t>
+              <a:t>10/05/2020</a:t>
             </a:fld>
             <a:endParaRPr lang="en-GB"/>
           </a:p>
@@ -1688,7 +1750,7 @@
           <a:p>
             <a:fld id="{FD45BEEB-65D0-4EF7-B3AA-8A98DD3CB55B}" type="datetimeFigureOut">
               <a:rPr lang="en-GB" smtClean="0"/>
-              <a:t>18/03/2020</a:t>
+              <a:t>10/05/2020</a:t>
             </a:fld>
             <a:endParaRPr lang="en-GB"/>
           </a:p>
@@ -2103,7 +2165,7 @@
           <a:p>
             <a:fld id="{FD45BEEB-65D0-4EF7-B3AA-8A98DD3CB55B}" type="datetimeFigureOut">
               <a:rPr lang="en-GB" smtClean="0"/>
-              <a:t>18/03/2020</a:t>
+              <a:t>10/05/2020</a:t>
             </a:fld>
             <a:endParaRPr lang="en-GB"/>
           </a:p>
@@ -2245,7 +2307,7 @@
           <a:p>
             <a:fld id="{FD45BEEB-65D0-4EF7-B3AA-8A98DD3CB55B}" type="datetimeFigureOut">
               <a:rPr lang="en-GB" smtClean="0"/>
-              <a:t>18/03/2020</a:t>
+              <a:t>10/05/2020</a:t>
             </a:fld>
             <a:endParaRPr lang="en-GB"/>
           </a:p>
@@ -2358,7 +2420,7 @@
           <a:p>
             <a:fld id="{FD45BEEB-65D0-4EF7-B3AA-8A98DD3CB55B}" type="datetimeFigureOut">
               <a:rPr lang="en-GB" smtClean="0"/>
-              <a:t>18/03/2020</a:t>
+              <a:t>10/05/2020</a:t>
             </a:fld>
             <a:endParaRPr lang="en-GB"/>
           </a:p>
@@ -2671,7 +2733,7 @@
           <a:p>
             <a:fld id="{FD45BEEB-65D0-4EF7-B3AA-8A98DD3CB55B}" type="datetimeFigureOut">
               <a:rPr lang="en-GB" smtClean="0"/>
-              <a:t>18/03/2020</a:t>
+              <a:t>10/05/2020</a:t>
             </a:fld>
             <a:endParaRPr lang="en-GB"/>
           </a:p>
@@ -2960,7 +3022,7 @@
           <a:p>
             <a:fld id="{FD45BEEB-65D0-4EF7-B3AA-8A98DD3CB55B}" type="datetimeFigureOut">
               <a:rPr lang="en-GB" smtClean="0"/>
-              <a:t>18/03/2020</a:t>
+              <a:t>10/05/2020</a:t>
             </a:fld>
             <a:endParaRPr lang="en-GB"/>
           </a:p>
@@ -3203,7 +3265,7 @@
           <a:p>
             <a:fld id="{FD45BEEB-65D0-4EF7-B3AA-8A98DD3CB55B}" type="datetimeFigureOut">
               <a:rPr lang="en-GB" smtClean="0"/>
-              <a:t>18/03/2020</a:t>
+              <a:t>10/05/2020</a:t>
             </a:fld>
             <a:endParaRPr lang="en-GB"/>
           </a:p>
@@ -6839,7 +6901,7 @@
           <a:p>
             <a:r>
               <a:rPr lang="en-GB" dirty="0"/>
-              <a:t>Region Setter page</a:t>
+              <a:t>Set Regions page</a:t>
             </a:r>
           </a:p>
         </p:txBody>
@@ -9293,6 +9355,907 @@
           <a:chExt cx="0" cy="0"/>
         </a:xfrm>
       </p:grpSpPr>
+      <p:pic>
+        <p:nvPicPr>
+          <p:cNvPr id="39" name="Picture 38"/>
+          <p:cNvPicPr>
+            <a:picLocks noChangeAspect="1"/>
+          </p:cNvPicPr>
+          <p:nvPr/>
+        </p:nvPicPr>
+        <p:blipFill>
+          <a:blip r:embed="rId2"/>
+          <a:stretch>
+            <a:fillRect/>
+          </a:stretch>
+        </p:blipFill>
+        <p:spPr>
+          <a:xfrm>
+            <a:off x="1554086" y="78957"/>
+            <a:ext cx="9083827" cy="6700085"/>
+          </a:xfrm>
+          <a:prstGeom prst="rect">
+            <a:avLst/>
+          </a:prstGeom>
+        </p:spPr>
+      </p:pic>
+      <p:sp>
+        <p:nvSpPr>
+          <p:cNvPr id="6" name="Rectangle 5"/>
+          <p:cNvSpPr/>
+          <p:nvPr/>
+        </p:nvSpPr>
+        <p:spPr>
+          <a:xfrm>
+            <a:off x="1594562" y="133003"/>
+            <a:ext cx="9000000" cy="791998"/>
+          </a:xfrm>
+          <a:prstGeom prst="rect">
+            <a:avLst/>
+          </a:prstGeom>
+          <a:solidFill>
+            <a:schemeClr val="bg1">
+              <a:alpha val="70000"/>
+            </a:schemeClr>
+          </a:solidFill>
+          <a:ln>
+            <a:solidFill>
+              <a:schemeClr val="bg1">
+                <a:lumMod val="65000"/>
+              </a:schemeClr>
+            </a:solidFill>
+          </a:ln>
+        </p:spPr>
+        <p:style>
+          <a:lnRef idx="2">
+            <a:schemeClr val="accent1">
+              <a:shade val="50000"/>
+            </a:schemeClr>
+          </a:lnRef>
+          <a:fillRef idx="1">
+            <a:schemeClr val="accent1"/>
+          </a:fillRef>
+          <a:effectRef idx="0">
+            <a:schemeClr val="accent1"/>
+          </a:effectRef>
+          <a:fontRef idx="minor">
+            <a:schemeClr val="lt1"/>
+          </a:fontRef>
+        </p:style>
+        <p:txBody>
+          <a:bodyPr rtlCol="0" anchor="ctr"/>
+          <a:lstStyle/>
+          <a:p>
+            <a:r>
+              <a:rPr lang="en-GB" sz="1600" i="1" dirty="0">
+                <a:solidFill>
+                  <a:schemeClr val="tx1"/>
+                </a:solidFill>
+              </a:rPr>
+              <a:t>&lt;</a:t>
+            </a:r>
+            <a:r>
+              <a:rPr lang="en-GB" sz="1600" i="1" dirty="0" err="1">
+                <a:solidFill>
+                  <a:schemeClr val="tx1"/>
+                </a:solidFill>
+              </a:rPr>
+              <a:t>nav</a:t>
+            </a:r>
+            <a:r>
+              <a:rPr lang="en-GB" sz="1600" i="1" dirty="0">
+                <a:solidFill>
+                  <a:schemeClr val="tx1"/>
+                </a:solidFill>
+              </a:rPr>
+              <a:t> class=“</a:t>
+            </a:r>
+            <a:r>
+              <a:rPr lang="en-GB" sz="1600" i="1" dirty="0" err="1">
+                <a:solidFill>
+                  <a:schemeClr val="tx1"/>
+                </a:solidFill>
+              </a:rPr>
+              <a:t>navbar</a:t>
+            </a:r>
+            <a:r>
+              <a:rPr lang="en-GB" sz="1600" i="1" dirty="0">
+                <a:solidFill>
+                  <a:schemeClr val="tx1"/>
+                </a:solidFill>
+              </a:rPr>
+              <a:t> </a:t>
+            </a:r>
+            <a:r>
+              <a:rPr lang="en-GB" sz="1600" i="1" dirty="0" err="1">
+                <a:solidFill>
+                  <a:schemeClr val="tx1"/>
+                </a:solidFill>
+              </a:rPr>
+              <a:t>navbar</a:t>
+            </a:r>
+            <a:r>
+              <a:rPr lang="en-GB" sz="1600" i="1" dirty="0">
+                <a:solidFill>
+                  <a:schemeClr val="tx1"/>
+                </a:solidFill>
+              </a:rPr>
+              <a:t>-expand-</a:t>
+            </a:r>
+            <a:r>
+              <a:rPr lang="en-GB" sz="1600" i="1" dirty="0" err="1">
+                <a:solidFill>
+                  <a:schemeClr val="tx1"/>
+                </a:solidFill>
+              </a:rPr>
+              <a:t>lg</a:t>
+            </a:r>
+            <a:r>
+              <a:rPr lang="en-GB" sz="1600" i="1" dirty="0">
+                <a:solidFill>
+                  <a:schemeClr val="tx1"/>
+                </a:solidFill>
+              </a:rPr>
+              <a:t> (etc.)”&gt;</a:t>
+            </a:r>
+          </a:p>
+        </p:txBody>
+      </p:sp>
+      <p:sp>
+        <p:nvSpPr>
+          <p:cNvPr id="7" name="Rectangle 6"/>
+          <p:cNvSpPr/>
+          <p:nvPr/>
+        </p:nvSpPr>
+        <p:spPr>
+          <a:xfrm>
+            <a:off x="3223035" y="925002"/>
+            <a:ext cx="5721432" cy="5854039"/>
+          </a:xfrm>
+          <a:prstGeom prst="rect">
+            <a:avLst/>
+          </a:prstGeom>
+          <a:solidFill>
+            <a:schemeClr val="bg1">
+              <a:alpha val="50000"/>
+            </a:schemeClr>
+          </a:solidFill>
+          <a:ln>
+            <a:solidFill>
+              <a:schemeClr val="bg1">
+                <a:lumMod val="65000"/>
+              </a:schemeClr>
+            </a:solidFill>
+          </a:ln>
+        </p:spPr>
+        <p:style>
+          <a:lnRef idx="2">
+            <a:schemeClr val="accent1">
+              <a:shade val="50000"/>
+            </a:schemeClr>
+          </a:lnRef>
+          <a:fillRef idx="1">
+            <a:schemeClr val="accent1"/>
+          </a:fillRef>
+          <a:effectRef idx="0">
+            <a:schemeClr val="accent1"/>
+          </a:effectRef>
+          <a:fontRef idx="minor">
+            <a:schemeClr val="lt1"/>
+          </a:fontRef>
+        </p:style>
+        <p:txBody>
+          <a:bodyPr lIns="36000" rIns="36000" rtlCol="0" anchor="t"/>
+          <a:lstStyle/>
+          <a:p>
+            <a:r>
+              <a:rPr lang="en-GB" sz="1200" i="1" dirty="0">
+                <a:solidFill>
+                  <a:schemeClr val="tx1"/>
+                </a:solidFill>
+              </a:rPr>
+              <a:t>&lt;div class=“container”&gt;</a:t>
+            </a:r>
+          </a:p>
+        </p:txBody>
+      </p:sp>
+      <p:sp>
+        <p:nvSpPr>
+          <p:cNvPr id="8" name="Rectangle 7"/>
+          <p:cNvSpPr/>
+          <p:nvPr/>
+        </p:nvSpPr>
+        <p:spPr>
+          <a:xfrm>
+            <a:off x="3275852" y="1189299"/>
+            <a:ext cx="5623702" cy="914100"/>
+          </a:xfrm>
+          <a:prstGeom prst="rect">
+            <a:avLst/>
+          </a:prstGeom>
+          <a:solidFill>
+            <a:schemeClr val="bg1">
+              <a:alpha val="0"/>
+            </a:schemeClr>
+          </a:solidFill>
+          <a:ln>
+            <a:solidFill>
+              <a:schemeClr val="bg1">
+                <a:lumMod val="65000"/>
+              </a:schemeClr>
+            </a:solidFill>
+          </a:ln>
+        </p:spPr>
+        <p:style>
+          <a:lnRef idx="2">
+            <a:schemeClr val="accent1">
+              <a:shade val="50000"/>
+            </a:schemeClr>
+          </a:lnRef>
+          <a:fillRef idx="1">
+            <a:schemeClr val="accent1"/>
+          </a:fillRef>
+          <a:effectRef idx="0">
+            <a:schemeClr val="accent1"/>
+          </a:effectRef>
+          <a:fontRef idx="minor">
+            <a:schemeClr val="lt1"/>
+          </a:fontRef>
+        </p:style>
+        <p:txBody>
+          <a:bodyPr lIns="36000" rIns="36000" rtlCol="0" anchor="t"/>
+          <a:lstStyle/>
+          <a:p>
+            <a:pPr marL="176213"/>
+            <a:r>
+              <a:rPr lang="en-GB" sz="1200" i="1" dirty="0">
+                <a:solidFill>
+                  <a:schemeClr val="tx1"/>
+                </a:solidFill>
+              </a:rPr>
+              <a:t>&lt;div class=“row”&gt;</a:t>
+            </a:r>
+          </a:p>
+        </p:txBody>
+      </p:sp>
+      <p:sp>
+        <p:nvSpPr>
+          <p:cNvPr id="9" name="Rectangle 8"/>
+          <p:cNvSpPr/>
+          <p:nvPr/>
+        </p:nvSpPr>
+        <p:spPr>
+          <a:xfrm>
+            <a:off x="3275852" y="2153995"/>
+            <a:ext cx="5623702" cy="648000"/>
+          </a:xfrm>
+          <a:prstGeom prst="rect">
+            <a:avLst/>
+          </a:prstGeom>
+          <a:solidFill>
+            <a:schemeClr val="bg1">
+              <a:alpha val="0"/>
+            </a:schemeClr>
+          </a:solidFill>
+          <a:ln>
+            <a:solidFill>
+              <a:schemeClr val="bg1">
+                <a:lumMod val="65000"/>
+              </a:schemeClr>
+            </a:solidFill>
+          </a:ln>
+        </p:spPr>
+        <p:style>
+          <a:lnRef idx="2">
+            <a:schemeClr val="accent1">
+              <a:shade val="50000"/>
+            </a:schemeClr>
+          </a:lnRef>
+          <a:fillRef idx="1">
+            <a:schemeClr val="accent1"/>
+          </a:fillRef>
+          <a:effectRef idx="0">
+            <a:schemeClr val="accent1"/>
+          </a:effectRef>
+          <a:fontRef idx="minor">
+            <a:schemeClr val="lt1"/>
+          </a:fontRef>
+        </p:style>
+        <p:txBody>
+          <a:bodyPr lIns="36000" rIns="36000" rtlCol="0" anchor="t"/>
+          <a:lstStyle/>
+          <a:p>
+            <a:pPr marL="176213"/>
+            <a:r>
+              <a:rPr lang="en-GB" sz="1200" i="1" dirty="0">
+                <a:solidFill>
+                  <a:schemeClr val="tx1"/>
+                </a:solidFill>
+              </a:rPr>
+              <a:t>&lt;div class=“row”&gt;</a:t>
+            </a:r>
+          </a:p>
+        </p:txBody>
+      </p:sp>
+      <p:sp>
+        <p:nvSpPr>
+          <p:cNvPr id="12" name="Rectangle 11"/>
+          <p:cNvSpPr/>
+          <p:nvPr/>
+        </p:nvSpPr>
+        <p:spPr>
+          <a:xfrm>
+            <a:off x="3282711" y="2838447"/>
+            <a:ext cx="5623702" cy="852310"/>
+          </a:xfrm>
+          <a:prstGeom prst="rect">
+            <a:avLst/>
+          </a:prstGeom>
+          <a:solidFill>
+            <a:schemeClr val="bg1">
+              <a:alpha val="0"/>
+            </a:schemeClr>
+          </a:solidFill>
+          <a:ln>
+            <a:solidFill>
+              <a:schemeClr val="bg1">
+                <a:lumMod val="65000"/>
+              </a:schemeClr>
+            </a:solidFill>
+          </a:ln>
+        </p:spPr>
+        <p:style>
+          <a:lnRef idx="2">
+            <a:schemeClr val="accent1">
+              <a:shade val="50000"/>
+            </a:schemeClr>
+          </a:lnRef>
+          <a:fillRef idx="1">
+            <a:schemeClr val="accent1"/>
+          </a:fillRef>
+          <a:effectRef idx="0">
+            <a:schemeClr val="accent1"/>
+          </a:effectRef>
+          <a:fontRef idx="minor">
+            <a:schemeClr val="lt1"/>
+          </a:fontRef>
+        </p:style>
+        <p:txBody>
+          <a:bodyPr lIns="36000" rIns="36000" rtlCol="0" anchor="t"/>
+          <a:lstStyle/>
+          <a:p>
+            <a:pPr marL="176213"/>
+            <a:r>
+              <a:rPr lang="en-GB" sz="1200" i="1" dirty="0">
+                <a:solidFill>
+                  <a:schemeClr val="tx1"/>
+                </a:solidFill>
+              </a:rPr>
+              <a:t>&lt;div class=“row”&gt;</a:t>
+            </a:r>
+          </a:p>
+        </p:txBody>
+      </p:sp>
+      <p:sp>
+        <p:nvSpPr>
+          <p:cNvPr id="13" name="Rectangle 12"/>
+          <p:cNvSpPr/>
+          <p:nvPr/>
+        </p:nvSpPr>
+        <p:spPr>
+          <a:xfrm>
+            <a:off x="3271900" y="3746184"/>
+            <a:ext cx="5623702" cy="2950179"/>
+          </a:xfrm>
+          <a:prstGeom prst="rect">
+            <a:avLst/>
+          </a:prstGeom>
+          <a:solidFill>
+            <a:schemeClr val="bg1">
+              <a:alpha val="0"/>
+            </a:schemeClr>
+          </a:solidFill>
+          <a:ln>
+            <a:solidFill>
+              <a:schemeClr val="bg1">
+                <a:lumMod val="65000"/>
+              </a:schemeClr>
+            </a:solidFill>
+          </a:ln>
+        </p:spPr>
+        <p:style>
+          <a:lnRef idx="2">
+            <a:schemeClr val="accent1">
+              <a:shade val="50000"/>
+            </a:schemeClr>
+          </a:lnRef>
+          <a:fillRef idx="1">
+            <a:schemeClr val="accent1"/>
+          </a:fillRef>
+          <a:effectRef idx="0">
+            <a:schemeClr val="accent1"/>
+          </a:effectRef>
+          <a:fontRef idx="minor">
+            <a:schemeClr val="lt1"/>
+          </a:fontRef>
+        </p:style>
+        <p:txBody>
+          <a:bodyPr lIns="36000" rIns="36000" rtlCol="0" anchor="t"/>
+          <a:lstStyle/>
+          <a:p>
+            <a:pPr marL="176213"/>
+            <a:r>
+              <a:rPr lang="en-GB" sz="1200" i="1" dirty="0">
+                <a:solidFill>
+                  <a:schemeClr val="tx1"/>
+                </a:solidFill>
+              </a:rPr>
+              <a:t>&lt;div class=“row” &gt;</a:t>
+            </a:r>
+          </a:p>
+        </p:txBody>
+      </p:sp>
+      <p:sp>
+        <p:nvSpPr>
+          <p:cNvPr id="14" name="Rectangle 13"/>
+          <p:cNvSpPr/>
+          <p:nvPr/>
+        </p:nvSpPr>
+        <p:spPr>
+          <a:xfrm>
+            <a:off x="3325092" y="1606293"/>
+            <a:ext cx="5533566" cy="442451"/>
+          </a:xfrm>
+          <a:prstGeom prst="rect">
+            <a:avLst/>
+          </a:prstGeom>
+          <a:solidFill>
+            <a:schemeClr val="bg1">
+              <a:alpha val="0"/>
+            </a:schemeClr>
+          </a:solidFill>
+          <a:ln>
+            <a:solidFill>
+              <a:schemeClr val="bg1">
+                <a:lumMod val="65000"/>
+              </a:schemeClr>
+            </a:solidFill>
+          </a:ln>
+        </p:spPr>
+        <p:style>
+          <a:lnRef idx="2">
+            <a:schemeClr val="accent1">
+              <a:shade val="50000"/>
+            </a:schemeClr>
+          </a:lnRef>
+          <a:fillRef idx="1">
+            <a:schemeClr val="accent1"/>
+          </a:fillRef>
+          <a:effectRef idx="0">
+            <a:schemeClr val="accent1"/>
+          </a:effectRef>
+          <a:fontRef idx="minor">
+            <a:schemeClr val="lt1"/>
+          </a:fontRef>
+        </p:style>
+        <p:txBody>
+          <a:bodyPr lIns="36000" rIns="36000" rtlCol="0" anchor="t"/>
+          <a:lstStyle/>
+          <a:p>
+            <a:pPr marL="360363"/>
+            <a:r>
+              <a:rPr lang="en-GB" sz="1200" i="1" dirty="0">
+                <a:solidFill>
+                  <a:schemeClr val="tx1"/>
+                </a:solidFill>
+              </a:rPr>
+              <a:t>&lt;div class=“col-12” id=“</a:t>
+            </a:r>
+            <a:r>
+              <a:rPr lang="en-GB" sz="1200" i="1" dirty="0" err="1">
+                <a:solidFill>
+                  <a:schemeClr val="tx1"/>
+                </a:solidFill>
+              </a:rPr>
+              <a:t>nav</a:t>
+            </a:r>
+            <a:r>
+              <a:rPr lang="en-GB" sz="1200" i="1" dirty="0">
+                <a:solidFill>
+                  <a:schemeClr val="tx1"/>
+                </a:solidFill>
+              </a:rPr>
+              <a:t>-app-steps”&gt;</a:t>
+            </a:r>
+          </a:p>
+        </p:txBody>
+      </p:sp>
+      <p:sp>
+        <p:nvSpPr>
+          <p:cNvPr id="15" name="Rectangle 14"/>
+          <p:cNvSpPr/>
+          <p:nvPr/>
+        </p:nvSpPr>
+        <p:spPr>
+          <a:xfrm>
+            <a:off x="3338951" y="2356545"/>
+            <a:ext cx="5533566" cy="386655"/>
+          </a:xfrm>
+          <a:prstGeom prst="rect">
+            <a:avLst/>
+          </a:prstGeom>
+          <a:solidFill>
+            <a:schemeClr val="bg1">
+              <a:alpha val="0"/>
+            </a:schemeClr>
+          </a:solidFill>
+          <a:ln>
+            <a:solidFill>
+              <a:schemeClr val="bg1">
+                <a:lumMod val="65000"/>
+              </a:schemeClr>
+            </a:solidFill>
+          </a:ln>
+        </p:spPr>
+        <p:style>
+          <a:lnRef idx="2">
+            <a:schemeClr val="accent1">
+              <a:shade val="50000"/>
+            </a:schemeClr>
+          </a:lnRef>
+          <a:fillRef idx="1">
+            <a:schemeClr val="accent1"/>
+          </a:fillRef>
+          <a:effectRef idx="0">
+            <a:schemeClr val="accent1"/>
+          </a:effectRef>
+          <a:fontRef idx="minor">
+            <a:schemeClr val="lt1"/>
+          </a:fontRef>
+        </p:style>
+        <p:txBody>
+          <a:bodyPr lIns="36000" rIns="36000" rtlCol="0" anchor="ctr"/>
+          <a:lstStyle/>
+          <a:p>
+            <a:pPr marL="360363"/>
+            <a:r>
+              <a:rPr lang="en-GB" sz="1200" i="1" dirty="0">
+                <a:solidFill>
+                  <a:schemeClr val="tx1"/>
+                </a:solidFill>
+              </a:rPr>
+              <a:t>&lt;div class=“col-12” id=“txt-step-description”&gt;</a:t>
+            </a:r>
+          </a:p>
+        </p:txBody>
+      </p:sp>
+      <p:sp>
+        <p:nvSpPr>
+          <p:cNvPr id="16" name="Rectangle 15"/>
+          <p:cNvSpPr/>
+          <p:nvPr/>
+        </p:nvSpPr>
+        <p:spPr>
+          <a:xfrm>
+            <a:off x="4618885" y="3062465"/>
+            <a:ext cx="2929730" cy="585076"/>
+          </a:xfrm>
+          <a:prstGeom prst="rect">
+            <a:avLst/>
+          </a:prstGeom>
+          <a:solidFill>
+            <a:schemeClr val="bg1">
+              <a:alpha val="0"/>
+            </a:schemeClr>
+          </a:solidFill>
+          <a:ln>
+            <a:solidFill>
+              <a:schemeClr val="bg1">
+                <a:lumMod val="65000"/>
+              </a:schemeClr>
+            </a:solidFill>
+          </a:ln>
+        </p:spPr>
+        <p:style>
+          <a:lnRef idx="2">
+            <a:schemeClr val="accent1">
+              <a:shade val="50000"/>
+            </a:schemeClr>
+          </a:lnRef>
+          <a:fillRef idx="1">
+            <a:schemeClr val="accent1"/>
+          </a:fillRef>
+          <a:effectRef idx="0">
+            <a:schemeClr val="accent1"/>
+          </a:effectRef>
+          <a:fontRef idx="minor">
+            <a:schemeClr val="lt1"/>
+          </a:fontRef>
+        </p:style>
+        <p:txBody>
+          <a:bodyPr lIns="36000" rIns="36000" rtlCol="0" anchor="ctr"/>
+          <a:lstStyle/>
+          <a:p>
+            <a:r>
+              <a:rPr lang="en-GB" sz="1200" i="1" dirty="0">
+                <a:solidFill>
+                  <a:schemeClr val="tx1"/>
+                </a:solidFill>
+              </a:rPr>
+              <a:t>&lt;div class=“col-8” id=“</a:t>
+            </a:r>
+            <a:r>
+              <a:rPr lang="en-GB" sz="1200" i="1" dirty="0" err="1">
+                <a:solidFill>
+                  <a:schemeClr val="tx1"/>
+                </a:solidFill>
+              </a:rPr>
+              <a:t>btn</a:t>
+            </a:r>
+            <a:r>
+              <a:rPr lang="en-GB" sz="1200" i="1" dirty="0">
+                <a:solidFill>
+                  <a:schemeClr val="tx1"/>
+                </a:solidFill>
+              </a:rPr>
+              <a:t>-image-selector”&gt;</a:t>
+            </a:r>
+          </a:p>
+        </p:txBody>
+      </p:sp>
+      <p:sp>
+        <p:nvSpPr>
+          <p:cNvPr id="17" name="Rectangle 16"/>
+          <p:cNvSpPr/>
+          <p:nvPr/>
+        </p:nvSpPr>
+        <p:spPr>
+          <a:xfrm>
+            <a:off x="3357431" y="4158143"/>
+            <a:ext cx="5533566" cy="2459991"/>
+          </a:xfrm>
+          <a:prstGeom prst="rect">
+            <a:avLst/>
+          </a:prstGeom>
+          <a:solidFill>
+            <a:schemeClr val="bg1">
+              <a:alpha val="0"/>
+            </a:schemeClr>
+          </a:solidFill>
+          <a:ln>
+            <a:solidFill>
+              <a:schemeClr val="bg1">
+                <a:lumMod val="65000"/>
+              </a:schemeClr>
+            </a:solidFill>
+          </a:ln>
+        </p:spPr>
+        <p:style>
+          <a:lnRef idx="2">
+            <a:schemeClr val="accent1">
+              <a:shade val="50000"/>
+            </a:schemeClr>
+          </a:lnRef>
+          <a:fillRef idx="1">
+            <a:schemeClr val="accent1"/>
+          </a:fillRef>
+          <a:effectRef idx="0">
+            <a:schemeClr val="accent1"/>
+          </a:effectRef>
+          <a:fontRef idx="minor">
+            <a:schemeClr val="lt1"/>
+          </a:fontRef>
+        </p:style>
+        <p:txBody>
+          <a:bodyPr lIns="36000" rIns="36000" rtlCol="0" anchor="t"/>
+          <a:lstStyle/>
+          <a:p>
+            <a:pPr marL="360363"/>
+            <a:r>
+              <a:rPr lang="en-GB" sz="1200" i="1" dirty="0">
+                <a:solidFill>
+                  <a:schemeClr val="tx1"/>
+                </a:solidFill>
+              </a:rPr>
+              <a:t>&lt;div class=“col-12” id=“</a:t>
+            </a:r>
+            <a:r>
+              <a:rPr lang="en-GB" sz="1200" i="1" dirty="0" err="1">
+                <a:solidFill>
+                  <a:schemeClr val="tx1"/>
+                </a:solidFill>
+              </a:rPr>
+              <a:t>img</a:t>
+            </a:r>
+            <a:r>
+              <a:rPr lang="en-GB" sz="1200" i="1" dirty="0">
+                <a:solidFill>
+                  <a:schemeClr val="tx1"/>
+                </a:solidFill>
+              </a:rPr>
+              <a:t>-selected-image”&gt;</a:t>
+            </a:r>
+          </a:p>
+        </p:txBody>
+      </p:sp>
+      <p:sp>
+        <p:nvSpPr>
+          <p:cNvPr id="40" name="Rectangle 39"/>
+          <p:cNvSpPr/>
+          <p:nvPr/>
+        </p:nvSpPr>
+        <p:spPr>
+          <a:xfrm>
+            <a:off x="7596347" y="3067218"/>
+            <a:ext cx="1262311" cy="585076"/>
+          </a:xfrm>
+          <a:prstGeom prst="rect">
+            <a:avLst/>
+          </a:prstGeom>
+          <a:solidFill>
+            <a:schemeClr val="bg1">
+              <a:alpha val="0"/>
+            </a:schemeClr>
+          </a:solidFill>
+          <a:ln>
+            <a:solidFill>
+              <a:schemeClr val="bg1">
+                <a:lumMod val="65000"/>
+              </a:schemeClr>
+            </a:solidFill>
+          </a:ln>
+        </p:spPr>
+        <p:style>
+          <a:lnRef idx="2">
+            <a:schemeClr val="accent1">
+              <a:shade val="50000"/>
+            </a:schemeClr>
+          </a:lnRef>
+          <a:fillRef idx="1">
+            <a:schemeClr val="accent1"/>
+          </a:fillRef>
+          <a:effectRef idx="0">
+            <a:schemeClr val="accent1"/>
+          </a:effectRef>
+          <a:fontRef idx="minor">
+            <a:schemeClr val="lt1"/>
+          </a:fontRef>
+        </p:style>
+        <p:txBody>
+          <a:bodyPr lIns="36000" rIns="36000" rtlCol="0" anchor="ctr"/>
+          <a:lstStyle/>
+          <a:p>
+            <a:r>
+              <a:rPr lang="en-GB" sz="1200" i="1" dirty="0">
+                <a:solidFill>
+                  <a:schemeClr val="tx1"/>
+                </a:solidFill>
+              </a:rPr>
+              <a:t>&lt;div class=“col-2” id=“</a:t>
+            </a:r>
+            <a:r>
+              <a:rPr lang="en-GB" sz="1200" i="1" dirty="0" err="1">
+                <a:solidFill>
+                  <a:schemeClr val="tx1"/>
+                </a:solidFill>
+              </a:rPr>
+              <a:t>btn</a:t>
+            </a:r>
+            <a:r>
+              <a:rPr lang="en-GB" sz="1200" i="1" dirty="0">
+                <a:solidFill>
+                  <a:schemeClr val="tx1"/>
+                </a:solidFill>
+              </a:rPr>
+              <a:t>-next&gt;</a:t>
+            </a:r>
+          </a:p>
+        </p:txBody>
+      </p:sp>
+      <p:sp>
+        <p:nvSpPr>
+          <p:cNvPr id="41" name="Rectangle 40"/>
+          <p:cNvSpPr/>
+          <p:nvPr/>
+        </p:nvSpPr>
+        <p:spPr>
+          <a:xfrm>
+            <a:off x="3310606" y="3062465"/>
+            <a:ext cx="1262311" cy="585076"/>
+          </a:xfrm>
+          <a:prstGeom prst="rect">
+            <a:avLst/>
+          </a:prstGeom>
+          <a:solidFill>
+            <a:schemeClr val="bg1">
+              <a:alpha val="0"/>
+            </a:schemeClr>
+          </a:solidFill>
+          <a:ln>
+            <a:solidFill>
+              <a:schemeClr val="bg1">
+                <a:lumMod val="65000"/>
+              </a:schemeClr>
+            </a:solidFill>
+          </a:ln>
+        </p:spPr>
+        <p:style>
+          <a:lnRef idx="2">
+            <a:schemeClr val="accent1">
+              <a:shade val="50000"/>
+            </a:schemeClr>
+          </a:lnRef>
+          <a:fillRef idx="1">
+            <a:schemeClr val="accent1"/>
+          </a:fillRef>
+          <a:effectRef idx="0">
+            <a:schemeClr val="accent1"/>
+          </a:effectRef>
+          <a:fontRef idx="minor">
+            <a:schemeClr val="lt1"/>
+          </a:fontRef>
+        </p:style>
+        <p:txBody>
+          <a:bodyPr lIns="36000" rIns="36000" rtlCol="0" anchor="ctr"/>
+          <a:lstStyle/>
+          <a:p>
+            <a:r>
+              <a:rPr lang="en-GB" sz="1200" i="1" dirty="0">
+                <a:solidFill>
+                  <a:schemeClr val="tx1"/>
+                </a:solidFill>
+              </a:rPr>
+              <a:t>&lt;div class=“col-2” id=“</a:t>
+            </a:r>
+            <a:r>
+              <a:rPr lang="en-GB" sz="1200" i="1" dirty="0" err="1">
+                <a:solidFill>
+                  <a:schemeClr val="tx1"/>
+                </a:solidFill>
+              </a:rPr>
+              <a:t>btn</a:t>
+            </a:r>
+            <a:r>
+              <a:rPr lang="en-GB" sz="1200" i="1" dirty="0">
+                <a:solidFill>
+                  <a:schemeClr val="tx1"/>
+                </a:solidFill>
+              </a:rPr>
+              <a:t>-previous&gt;</a:t>
+            </a:r>
+          </a:p>
+        </p:txBody>
+      </p:sp>
+    </p:spTree>
+    <p:extLst>
+      <p:ext uri="{BB962C8B-B14F-4D97-AF65-F5344CB8AC3E}">
+        <p14:creationId xmlns:p14="http://schemas.microsoft.com/office/powerpoint/2010/main" val="1657320246"/>
+      </p:ext>
+    </p:extLst>
+  </p:cSld>
+  <p:clrMapOvr>
+    <a:masterClrMapping/>
+  </p:clrMapOvr>
+</p:sld>
+</file>
+
+<file path=ppt/slides/slide18.xml><?xml version="1.0" encoding="utf-8"?>
+<p:sld xmlns:a="http://schemas.openxmlformats.org/drawingml/2006/main" xmlns:r="http://schemas.openxmlformats.org/officeDocument/2006/relationships" xmlns:p="http://schemas.openxmlformats.org/presentationml/2006/main">
+  <p:cSld>
+    <p:spTree>
+      <p:nvGrpSpPr>
+        <p:cNvPr id="1" name=""/>
+        <p:cNvGrpSpPr/>
+        <p:nvPr/>
+      </p:nvGrpSpPr>
+      <p:grpSpPr>
+        <a:xfrm>
+          <a:off x="0" y="0"/>
+          <a:ext cx="0" cy="0"/>
+          <a:chOff x="0" y="0"/>
+          <a:chExt cx="0" cy="0"/>
+        </a:xfrm>
+      </p:grpSpPr>
       <p:sp>
         <p:nvSpPr>
           <p:cNvPr id="2" name="Title 1">
@@ -9466,7 +10429,7 @@
 </p:sld>
 </file>
 
-<file path=ppt/slides/slide18.xml><?xml version="1.0" encoding="utf-8"?>
+<file path=ppt/slides/slide19.xml><?xml version="1.0" encoding="utf-8"?>
 <p:sld xmlns:a="http://schemas.openxmlformats.org/drawingml/2006/main" xmlns:r="http://schemas.openxmlformats.org/officeDocument/2006/relationships" xmlns:p="http://schemas.openxmlformats.org/presentationml/2006/main">
   <p:cSld>
     <p:spTree>
@@ -11577,170 +12540,6 @@
 </p:sld>
 </file>
 
-<file path=ppt/slides/slide19.xml><?xml version="1.0" encoding="utf-8"?>
-<p:sld xmlns:a="http://schemas.openxmlformats.org/drawingml/2006/main" xmlns:r="http://schemas.openxmlformats.org/officeDocument/2006/relationships" xmlns:p="http://schemas.openxmlformats.org/presentationml/2006/main">
-  <p:cSld>
-    <p:spTree>
-      <p:nvGrpSpPr>
-        <p:cNvPr id="1" name=""/>
-        <p:cNvGrpSpPr/>
-        <p:nvPr/>
-      </p:nvGrpSpPr>
-      <p:grpSpPr>
-        <a:xfrm>
-          <a:off x="0" y="0"/>
-          <a:ext cx="0" cy="0"/>
-          <a:chOff x="0" y="0"/>
-          <a:chExt cx="0" cy="0"/>
-        </a:xfrm>
-      </p:grpSpPr>
-      <p:sp>
-        <p:nvSpPr>
-          <p:cNvPr id="2" name="Title 1">
-            <a:extLst>
-              <a:ext uri="{FF2B5EF4-FFF2-40B4-BE49-F238E27FC236}">
-                <a16:creationId xmlns:a16="http://schemas.microsoft.com/office/drawing/2014/main" id="{ABDAA724-9D49-488C-A0FE-3B562E31594D}"/>
-              </a:ext>
-            </a:extLst>
-          </p:cNvPr>
-          <p:cNvSpPr>
-            <a:spLocks noGrp="1"/>
-          </p:cNvSpPr>
-          <p:nvPr>
-            <p:ph type="title"/>
-          </p:nvPr>
-        </p:nvSpPr>
-        <p:spPr/>
-        <p:txBody>
-          <a:bodyPr/>
-          <a:lstStyle/>
-          <a:p>
-            <a:r>
-              <a:rPr lang="en-GB" dirty="0"/>
-              <a:t>About page</a:t>
-            </a:r>
-          </a:p>
-        </p:txBody>
-      </p:sp>
-      <p:sp>
-        <p:nvSpPr>
-          <p:cNvPr id="3" name="Content Placeholder 2">
-            <a:extLst>
-              <a:ext uri="{FF2B5EF4-FFF2-40B4-BE49-F238E27FC236}">
-                <a16:creationId xmlns:a16="http://schemas.microsoft.com/office/drawing/2014/main" id="{3B87FDD8-A6DB-473E-A932-CB818BA5EBF9}"/>
-              </a:ext>
-            </a:extLst>
-          </p:cNvPr>
-          <p:cNvSpPr>
-            <a:spLocks noGrp="1"/>
-          </p:cNvSpPr>
-          <p:nvPr>
-            <p:ph idx="1"/>
-          </p:nvPr>
-        </p:nvSpPr>
-        <p:spPr/>
-        <p:txBody>
-          <a:bodyPr>
-            <a:normAutofit/>
-          </a:bodyPr>
-          <a:lstStyle/>
-          <a:p>
-            <a:r>
-              <a:rPr lang="en-GB" dirty="0"/>
-              <a:t>Largely static text content (potentially some images)</a:t>
-            </a:r>
-          </a:p>
-          <a:p>
-            <a:r>
-              <a:rPr lang="en-GB" dirty="0"/>
-              <a:t>Provides the following information:</a:t>
-            </a:r>
-          </a:p>
-          <a:p>
-            <a:pPr marL="914405" lvl="1" indent="-457200">
-              <a:buFont typeface="+mj-lt"/>
-              <a:buAutoNum type="arabicPeriod"/>
-            </a:pPr>
-            <a:r>
-              <a:rPr lang="en-GB" dirty="0"/>
-              <a:t>Navbar, with icon, “About”, “FAQ”</a:t>
-            </a:r>
-          </a:p>
-          <a:p>
-            <a:pPr marL="914405" lvl="1" indent="-457200">
-              <a:buFont typeface="+mj-lt"/>
-              <a:buAutoNum type="arabicPeriod"/>
-            </a:pPr>
-            <a:r>
-              <a:rPr lang="en-GB" dirty="0">
-                <a:sym typeface="Wingdings" panose="05000000000000000000" pitchFamily="2" charset="2"/>
-              </a:rPr>
-              <a:t>Introduction to the tool – what it’s for, how it works (briefly), known limitations etc.</a:t>
-            </a:r>
-          </a:p>
-          <a:p>
-            <a:pPr marL="914405" lvl="1" indent="-457200">
-              <a:buFont typeface="+mj-lt"/>
-              <a:buAutoNum type="arabicPeriod"/>
-            </a:pPr>
-            <a:r>
-              <a:rPr lang="en-GB" dirty="0">
-                <a:sym typeface="Wingdings" panose="05000000000000000000" pitchFamily="2" charset="2"/>
-              </a:rPr>
-              <a:t>Bit about the architecture / technologies used? [E.g. arch diagram?]</a:t>
-            </a:r>
-          </a:p>
-          <a:p>
-            <a:pPr marL="914405" lvl="1" indent="-457200">
-              <a:buFont typeface="+mj-lt"/>
-              <a:buAutoNum type="arabicPeriod"/>
-            </a:pPr>
-            <a:r>
-              <a:rPr lang="en-GB" dirty="0">
-                <a:sym typeface="Wingdings" panose="05000000000000000000" pitchFamily="2" charset="2"/>
-              </a:rPr>
-              <a:t>Link </a:t>
-            </a:r>
-            <a:r>
-              <a:rPr lang="en-GB" dirty="0" err="1">
-                <a:sym typeface="Wingdings" panose="05000000000000000000" pitchFamily="2" charset="2"/>
-              </a:rPr>
-              <a:t>github</a:t>
-            </a:r>
-            <a:r>
-              <a:rPr lang="en-GB" dirty="0">
-                <a:sym typeface="Wingdings" panose="05000000000000000000" pitchFamily="2" charset="2"/>
-              </a:rPr>
-              <a:t> repo(?)</a:t>
-            </a:r>
-          </a:p>
-          <a:p>
-            <a:pPr marL="914405" lvl="1" indent="-457200">
-              <a:buFont typeface="+mj-lt"/>
-              <a:buAutoNum type="arabicPeriod"/>
-            </a:pPr>
-            <a:r>
-              <a:rPr lang="en-GB" dirty="0">
-                <a:sym typeface="Wingdings" panose="05000000000000000000" pitchFamily="2" charset="2"/>
-              </a:rPr>
-              <a:t>Version information (e.g. log for future changes)</a:t>
-            </a:r>
-          </a:p>
-        </p:txBody>
-      </p:sp>
-    </p:spTree>
-    <p:extLst>
-      <p:ext uri="{BB962C8B-B14F-4D97-AF65-F5344CB8AC3E}">
-        <p14:creationId xmlns:p14="http://schemas.microsoft.com/office/powerpoint/2010/main" val="1167404419"/>
-      </p:ext>
-    </p:extLst>
-  </p:cSld>
-  <p:clrMapOvr>
-    <a:masterClrMapping/>
-  </p:clrMapOvr>
-</p:sld>
-</file>
-
 <file path=ppt/slides/slide2.xml><?xml version="1.0" encoding="utf-8"?>
 <p:sld xmlns:a="http://schemas.openxmlformats.org/drawingml/2006/main" xmlns:r="http://schemas.openxmlformats.org/officeDocument/2006/relationships" xmlns:p="http://schemas.openxmlformats.org/presentationml/2006/main">
   <p:cSld>
@@ -11854,6 +12653,170 @@
 </file>
 
 <file path=ppt/slides/slide20.xml><?xml version="1.0" encoding="utf-8"?>
+<p:sld xmlns:a="http://schemas.openxmlformats.org/drawingml/2006/main" xmlns:r="http://schemas.openxmlformats.org/officeDocument/2006/relationships" xmlns:p="http://schemas.openxmlformats.org/presentationml/2006/main">
+  <p:cSld>
+    <p:spTree>
+      <p:nvGrpSpPr>
+        <p:cNvPr id="1" name=""/>
+        <p:cNvGrpSpPr/>
+        <p:nvPr/>
+      </p:nvGrpSpPr>
+      <p:grpSpPr>
+        <a:xfrm>
+          <a:off x="0" y="0"/>
+          <a:ext cx="0" cy="0"/>
+          <a:chOff x="0" y="0"/>
+          <a:chExt cx="0" cy="0"/>
+        </a:xfrm>
+      </p:grpSpPr>
+      <p:sp>
+        <p:nvSpPr>
+          <p:cNvPr id="2" name="Title 1">
+            <a:extLst>
+              <a:ext uri="{FF2B5EF4-FFF2-40B4-BE49-F238E27FC236}">
+                <a16:creationId xmlns:a16="http://schemas.microsoft.com/office/drawing/2014/main" id="{ABDAA724-9D49-488C-A0FE-3B562E31594D}"/>
+              </a:ext>
+            </a:extLst>
+          </p:cNvPr>
+          <p:cNvSpPr>
+            <a:spLocks noGrp="1"/>
+          </p:cNvSpPr>
+          <p:nvPr>
+            <p:ph type="title"/>
+          </p:nvPr>
+        </p:nvSpPr>
+        <p:spPr/>
+        <p:txBody>
+          <a:bodyPr/>
+          <a:lstStyle/>
+          <a:p>
+            <a:r>
+              <a:rPr lang="en-GB" dirty="0"/>
+              <a:t>About page</a:t>
+            </a:r>
+          </a:p>
+        </p:txBody>
+      </p:sp>
+      <p:sp>
+        <p:nvSpPr>
+          <p:cNvPr id="3" name="Content Placeholder 2">
+            <a:extLst>
+              <a:ext uri="{FF2B5EF4-FFF2-40B4-BE49-F238E27FC236}">
+                <a16:creationId xmlns:a16="http://schemas.microsoft.com/office/drawing/2014/main" id="{3B87FDD8-A6DB-473E-A932-CB818BA5EBF9}"/>
+              </a:ext>
+            </a:extLst>
+          </p:cNvPr>
+          <p:cNvSpPr>
+            <a:spLocks noGrp="1"/>
+          </p:cNvSpPr>
+          <p:nvPr>
+            <p:ph idx="1"/>
+          </p:nvPr>
+        </p:nvSpPr>
+        <p:spPr/>
+        <p:txBody>
+          <a:bodyPr>
+            <a:normAutofit/>
+          </a:bodyPr>
+          <a:lstStyle/>
+          <a:p>
+            <a:r>
+              <a:rPr lang="en-GB" dirty="0"/>
+              <a:t>Largely static text content (potentially some images)</a:t>
+            </a:r>
+          </a:p>
+          <a:p>
+            <a:r>
+              <a:rPr lang="en-GB" dirty="0"/>
+              <a:t>Provides the following information:</a:t>
+            </a:r>
+          </a:p>
+          <a:p>
+            <a:pPr marL="914405" lvl="1" indent="-457200">
+              <a:buFont typeface="+mj-lt"/>
+              <a:buAutoNum type="arabicPeriod"/>
+            </a:pPr>
+            <a:r>
+              <a:rPr lang="en-GB" dirty="0"/>
+              <a:t>Navbar, with icon, “About”, “FAQ”</a:t>
+            </a:r>
+          </a:p>
+          <a:p>
+            <a:pPr marL="914405" lvl="1" indent="-457200">
+              <a:buFont typeface="+mj-lt"/>
+              <a:buAutoNum type="arabicPeriod"/>
+            </a:pPr>
+            <a:r>
+              <a:rPr lang="en-GB" dirty="0">
+                <a:sym typeface="Wingdings" panose="05000000000000000000" pitchFamily="2" charset="2"/>
+              </a:rPr>
+              <a:t>Introduction to the tool – what it’s for, how it works (briefly), known limitations etc.</a:t>
+            </a:r>
+          </a:p>
+          <a:p>
+            <a:pPr marL="914405" lvl="1" indent="-457200">
+              <a:buFont typeface="+mj-lt"/>
+              <a:buAutoNum type="arabicPeriod"/>
+            </a:pPr>
+            <a:r>
+              <a:rPr lang="en-GB" dirty="0">
+                <a:sym typeface="Wingdings" panose="05000000000000000000" pitchFamily="2" charset="2"/>
+              </a:rPr>
+              <a:t>Bit about the architecture / technologies used? [E.g. arch diagram?]</a:t>
+            </a:r>
+          </a:p>
+          <a:p>
+            <a:pPr marL="914405" lvl="1" indent="-457200">
+              <a:buFont typeface="+mj-lt"/>
+              <a:buAutoNum type="arabicPeriod"/>
+            </a:pPr>
+            <a:r>
+              <a:rPr lang="en-GB" dirty="0">
+                <a:sym typeface="Wingdings" panose="05000000000000000000" pitchFamily="2" charset="2"/>
+              </a:rPr>
+              <a:t>Link </a:t>
+            </a:r>
+            <a:r>
+              <a:rPr lang="en-GB" dirty="0" err="1">
+                <a:sym typeface="Wingdings" panose="05000000000000000000" pitchFamily="2" charset="2"/>
+              </a:rPr>
+              <a:t>github</a:t>
+            </a:r>
+            <a:r>
+              <a:rPr lang="en-GB" dirty="0">
+                <a:sym typeface="Wingdings" panose="05000000000000000000" pitchFamily="2" charset="2"/>
+              </a:rPr>
+              <a:t> repo(?)</a:t>
+            </a:r>
+          </a:p>
+          <a:p>
+            <a:pPr marL="914405" lvl="1" indent="-457200">
+              <a:buFont typeface="+mj-lt"/>
+              <a:buAutoNum type="arabicPeriod"/>
+            </a:pPr>
+            <a:r>
+              <a:rPr lang="en-GB" dirty="0">
+                <a:sym typeface="Wingdings" panose="05000000000000000000" pitchFamily="2" charset="2"/>
+              </a:rPr>
+              <a:t>Version information (e.g. log for future changes)</a:t>
+            </a:r>
+          </a:p>
+        </p:txBody>
+      </p:sp>
+    </p:spTree>
+    <p:extLst>
+      <p:ext uri="{BB962C8B-B14F-4D97-AF65-F5344CB8AC3E}">
+        <p14:creationId xmlns:p14="http://schemas.microsoft.com/office/powerpoint/2010/main" val="1167404419"/>
+      </p:ext>
+    </p:extLst>
+  </p:cSld>
+  <p:clrMapOvr>
+    <a:masterClrMapping/>
+  </p:clrMapOvr>
+</p:sld>
+</file>
+
+<file path=ppt/slides/slide21.xml><?xml version="1.0" encoding="utf-8"?>
 <p:sld xmlns:a="http://schemas.openxmlformats.org/drawingml/2006/main" xmlns:r="http://schemas.openxmlformats.org/officeDocument/2006/relationships" xmlns:p="http://schemas.openxmlformats.org/presentationml/2006/main">
   <p:cSld>
     <p:spTree>
@@ -12972,7 +13935,7 @@
 </p:sld>
 </file>
 
-<file path=ppt/slides/slide21.xml><?xml version="1.0" encoding="utf-8"?>
+<file path=ppt/slides/slide22.xml><?xml version="1.0" encoding="utf-8"?>
 <p:sld xmlns:a="http://schemas.openxmlformats.org/drawingml/2006/main" xmlns:r="http://schemas.openxmlformats.org/officeDocument/2006/relationships" xmlns:p="http://schemas.openxmlformats.org/presentationml/2006/main">
   <p:cSld>
     <p:spTree>
@@ -13148,7 +14111,7 @@
 </p:sld>
 </file>
 
-<file path=ppt/slides/slide22.xml><?xml version="1.0" encoding="utf-8"?>
+<file path=ppt/slides/slide23.xml><?xml version="1.0" encoding="utf-8"?>
 <p:sld xmlns:a="http://schemas.openxmlformats.org/drawingml/2006/main" xmlns:r="http://schemas.openxmlformats.org/officeDocument/2006/relationships" xmlns:p="http://schemas.openxmlformats.org/presentationml/2006/main">
   <p:cSld>
     <p:spTree>
@@ -18232,14 +19195,14 @@
             <a:pPr lvl="1"/>
             <a:r>
               <a:rPr lang="en-GB" dirty="0"/>
-              <a:t>“Region setter” page; user discovers post-its, sets regions on the image</a:t>
+              <a:t>“Set Regions” page; user discovers post-its, sets regions on the image</a:t>
             </a:r>
           </a:p>
           <a:p>
             <a:pPr lvl="1"/>
             <a:r>
               <a:rPr lang="en-GB" dirty="0"/>
-              <a:t>“Text analysis” page; user views text output, can download as files</a:t>
+              <a:t>“Text Analysis &amp; Output” page; user views text output, can download as files</a:t>
             </a:r>
           </a:p>
           <a:p>
@@ -18253,7 +19216,7 @@
                   <a:srgbClr val="FF0000"/>
                 </a:solidFill>
               </a:rPr>
-              <a:t>(three?) </a:t>
+              <a:t>(four?) </a:t>
             </a:r>
             <a:r>
               <a:rPr lang="en-GB" dirty="0"/>
@@ -18272,6 +19235,17 @@
             <a:r>
               <a:rPr lang="en-GB" dirty="0"/>
               <a:t>“FAQ”; contains info about how the app works, if / where the images are stored, accuracy of the prediction, files that can be analysed, cookies / privacy etc.</a:t>
+            </a:r>
+          </a:p>
+          <a:p>
+            <a:pPr lvl="1"/>
+            <a:r>
+              <a:rPr lang="en-GB" dirty="0">
+                <a:solidFill>
+                  <a:srgbClr val="FF0000"/>
+                </a:solidFill>
+              </a:rPr>
+              <a:t>Overall “Home” page, explaining what the app is for?!</a:t>
             </a:r>
           </a:p>
           <a:p>

</xml_diff>